<commit_message>
the times! they're changing...!
</commit_message>
<xml_diff>
--- a/projectBD.pptx
+++ b/projectBD.pptx
@@ -2979,7 +2979,7 @@
         </p:nvGrpSpPr>
         <p:grpSpPr>
           <a:xfrm>
-            <a:off x="3786919" y="8452819"/>
+            <a:off x="4509295" y="12087161"/>
             <a:ext cx="1212646" cy="1135731"/>
             <a:chOff x="1095271" y="1200778"/>
             <a:chExt cx="1140488" cy="1075174"/>
@@ -3075,7 +3075,7 @@
         </p:nvGrpSpPr>
         <p:grpSpPr>
           <a:xfrm>
-            <a:off x="1615857" y="10394510"/>
+            <a:off x="2338233" y="14028852"/>
             <a:ext cx="1186455" cy="524902"/>
             <a:chOff x="2725743" y="3980367"/>
             <a:chExt cx="1186459" cy="524902"/>
@@ -3166,7 +3166,7 @@
         </p:nvGrpSpPr>
         <p:grpSpPr>
           <a:xfrm>
-            <a:off x="3761647" y="10393104"/>
+            <a:off x="4484023" y="14027446"/>
             <a:ext cx="1186463" cy="524902"/>
             <a:chOff x="5629717" y="-842841"/>
             <a:chExt cx="1186459" cy="524902"/>
@@ -3257,7 +3257,7 @@
         </p:nvCxnSpPr>
         <p:spPr>
           <a:xfrm>
-            <a:off x="2205918" y="9609155"/>
+            <a:off x="2928294" y="13243497"/>
             <a:ext cx="0" cy="775208"/>
           </a:xfrm>
           <a:prstGeom prst="line">
@@ -3292,7 +3292,7 @@
         </p:nvCxnSpPr>
         <p:spPr>
           <a:xfrm>
-            <a:off x="4393266" y="9603223"/>
+            <a:off x="5115642" y="13237565"/>
             <a:ext cx="0" cy="775208"/>
           </a:xfrm>
           <a:prstGeom prst="line">
@@ -3327,7 +3327,7 @@
         </p:nvGrpSpPr>
         <p:grpSpPr>
           <a:xfrm>
-            <a:off x="2318628" y="5038567"/>
+            <a:off x="3041004" y="8672909"/>
             <a:ext cx="1817742" cy="515715"/>
             <a:chOff x="2710653" y="3980367"/>
             <a:chExt cx="1817743" cy="515714"/>
@@ -3418,7 +3418,7 @@
         </p:nvGrpSpPr>
         <p:grpSpPr>
           <a:xfrm>
-            <a:off x="2652318" y="5981867"/>
+            <a:off x="3374694" y="9616209"/>
             <a:ext cx="1114598" cy="735848"/>
             <a:chOff x="1987422" y="1147198"/>
             <a:chExt cx="1114594" cy="735849"/>
@@ -3516,7 +3516,7 @@
         </p:nvCxnSpPr>
         <p:spPr>
           <a:xfrm>
-            <a:off x="3209620" y="5554285"/>
+            <a:off x="3931996" y="9188627"/>
             <a:ext cx="0" cy="427583"/>
           </a:xfrm>
           <a:prstGeom prst="line">
@@ -3551,7 +3551,7 @@
         </p:nvGrpSpPr>
         <p:grpSpPr>
           <a:xfrm>
-            <a:off x="3766917" y="7145296"/>
+            <a:off x="4489293" y="10779638"/>
             <a:ext cx="1175924" cy="730516"/>
             <a:chOff x="2725743" y="3980367"/>
             <a:chExt cx="1751806" cy="775328"/>
@@ -3644,7 +3644,7 @@
         </p:nvCxnSpPr>
         <p:spPr>
           <a:xfrm flipH="1">
-            <a:off x="2204866" y="6349782"/>
+            <a:off x="2927242" y="9984124"/>
             <a:ext cx="726113" cy="795510"/>
           </a:xfrm>
           <a:prstGeom prst="line">
@@ -3678,7 +3678,7 @@
         </p:nvCxnSpPr>
         <p:spPr>
           <a:xfrm>
-            <a:off x="3488267" y="6349791"/>
+            <a:off x="4210643" y="9984133"/>
             <a:ext cx="866612" cy="795505"/>
           </a:xfrm>
           <a:prstGeom prst="line">
@@ -3709,7 +3709,7 @@
         </p:nvCxnSpPr>
         <p:spPr>
           <a:xfrm flipV="1">
-            <a:off x="2201684" y="7650534"/>
+            <a:off x="2924060" y="11284876"/>
             <a:ext cx="3173" cy="795510"/>
           </a:xfrm>
           <a:prstGeom prst="straightConnector1">
@@ -3745,7 +3745,7 @@
         </p:nvCxnSpPr>
         <p:spPr>
           <a:xfrm>
-            <a:off x="2212274" y="10941692"/>
+            <a:off x="2934650" y="14576034"/>
             <a:ext cx="0" cy="775208"/>
           </a:xfrm>
           <a:prstGeom prst="line">
@@ -3780,7 +3780,7 @@
         </p:nvGrpSpPr>
         <p:grpSpPr>
           <a:xfrm>
-            <a:off x="1642026" y="11726470"/>
+            <a:off x="2364402" y="15360812"/>
             <a:ext cx="1140488" cy="1075178"/>
             <a:chOff x="1095271" y="1200778"/>
             <a:chExt cx="1140488" cy="1075174"/>
@@ -3876,7 +3876,7 @@
         </p:nvCxnSpPr>
         <p:spPr>
           <a:xfrm>
-            <a:off x="2215984" y="12815120"/>
+            <a:off x="2938360" y="16449462"/>
             <a:ext cx="1" cy="775209"/>
           </a:xfrm>
           <a:prstGeom prst="line">
@@ -3911,7 +3911,7 @@
         </p:nvGrpSpPr>
         <p:grpSpPr>
           <a:xfrm>
-            <a:off x="402591" y="5290482"/>
+            <a:off x="1124967" y="8924824"/>
             <a:ext cx="1563626" cy="646936"/>
             <a:chOff x="5367366" y="876525"/>
             <a:chExt cx="1682712" cy="771011"/>
@@ -4010,7 +4010,7 @@
         </p:nvCxnSpPr>
         <p:spPr>
           <a:xfrm flipV="1">
-            <a:off x="1737229" y="5296425"/>
+            <a:off x="2459605" y="8930767"/>
             <a:ext cx="596489" cy="65197"/>
           </a:xfrm>
           <a:prstGeom prst="line">
@@ -4041,7 +4041,7 @@
         </p:nvCxnSpPr>
         <p:spPr>
           <a:xfrm flipV="1">
-            <a:off x="4393242" y="7630810"/>
+            <a:off x="5115618" y="11265152"/>
             <a:ext cx="3173" cy="795510"/>
           </a:xfrm>
           <a:prstGeom prst="straightConnector1">
@@ -4077,7 +4077,7 @@
         </p:nvGrpSpPr>
         <p:grpSpPr>
           <a:xfrm>
-            <a:off x="1616862" y="13603801"/>
+            <a:off x="2339238" y="17238143"/>
             <a:ext cx="1186455" cy="524902"/>
             <a:chOff x="2725743" y="3980367"/>
             <a:chExt cx="1186459" cy="524902"/>
@@ -4168,7 +4168,7 @@
         </p:nvGrpSpPr>
         <p:grpSpPr>
           <a:xfrm>
-            <a:off x="1606594" y="7160464"/>
+            <a:off x="2328970" y="10794806"/>
             <a:ext cx="1248158" cy="485907"/>
             <a:chOff x="2725743" y="3980367"/>
             <a:chExt cx="1859415" cy="515714"/>
@@ -4259,7 +4259,7 @@
         </p:nvGrpSpPr>
         <p:grpSpPr>
           <a:xfrm>
-            <a:off x="216207" y="4260097"/>
+            <a:off x="938583" y="7894439"/>
             <a:ext cx="2033245" cy="904302"/>
             <a:chOff x="77002" y="961720"/>
             <a:chExt cx="2033245" cy="904302"/>
@@ -4405,7 +4405,7 @@
         </p:nvCxnSpPr>
         <p:spPr>
           <a:xfrm flipH="1" flipV="1">
-            <a:off x="1307838" y="4836942"/>
+            <a:off x="2030214" y="8471284"/>
             <a:ext cx="1025880" cy="327457"/>
           </a:xfrm>
           <a:prstGeom prst="line">
@@ -4440,7 +4440,7 @@
         </p:nvGrpSpPr>
         <p:grpSpPr>
           <a:xfrm>
-            <a:off x="7934670" y="4671357"/>
+            <a:off x="7136254" y="8305699"/>
             <a:ext cx="1332664" cy="1238250"/>
             <a:chOff x="5930900" y="1130300"/>
             <a:chExt cx="1332664" cy="1238250"/>
@@ -4531,7 +4531,7 @@
         </p:nvGrpSpPr>
         <p:grpSpPr>
           <a:xfrm>
-            <a:off x="1598536" y="8458926"/>
+            <a:off x="2320912" y="12093268"/>
             <a:ext cx="1212646" cy="1135731"/>
             <a:chOff x="1095271" y="1200778"/>
             <a:chExt cx="1140488" cy="1075174"/>
@@ -4629,8 +4629,8 @@
         </p:nvCxnSpPr>
         <p:spPr>
           <a:xfrm>
-            <a:off x="4081463" y="5289067"/>
-            <a:ext cx="3853207" cy="1415"/>
+            <a:off x="4807948" y="8923410"/>
+            <a:ext cx="2328306" cy="1414"/>
           </a:xfrm>
           <a:prstGeom prst="line">
             <a:avLst/>
@@ -4664,7 +4664,7 @@
         </p:nvGrpSpPr>
         <p:grpSpPr>
           <a:xfrm>
-            <a:off x="11275276" y="5049357"/>
+            <a:off x="10476860" y="8683699"/>
             <a:ext cx="1122687" cy="520498"/>
             <a:chOff x="2725743" y="3980367"/>
             <a:chExt cx="1751806" cy="515714"/>
@@ -4755,7 +4755,7 @@
         </p:nvCxnSpPr>
         <p:spPr>
           <a:xfrm flipV="1">
-            <a:off x="9267385" y="5290481"/>
+            <a:off x="8468969" y="8924823"/>
             <a:ext cx="2007891" cy="1"/>
           </a:xfrm>
           <a:prstGeom prst="line">
@@ -4791,10 +4791,10 @@
         </p:nvGrpSpPr>
         <p:grpSpPr>
           <a:xfrm>
-            <a:off x="7880853" y="1596460"/>
-            <a:ext cx="1433205" cy="515715"/>
+            <a:off x="13838357" y="9286387"/>
+            <a:ext cx="1797387" cy="515715"/>
             <a:chOff x="2531026" y="3974531"/>
-            <a:chExt cx="1751806" cy="515714"/>
+            <a:chExt cx="1930479" cy="515714"/>
           </a:xfrm>
         </p:grpSpPr>
         <p:sp>
@@ -4851,8 +4851,8 @@
           </p:nvSpPr>
           <p:spPr>
             <a:xfrm>
-              <a:off x="2859387" y="4027194"/>
-              <a:ext cx="904416" cy="417806"/>
+              <a:off x="2609531" y="4026684"/>
+              <a:ext cx="1851974" cy="417806"/>
             </a:xfrm>
             <a:prstGeom prst="rect">
               <a:avLst/>
@@ -4867,235 +4867,7 @@
             <a:p>
               <a:r>
                 <a:rPr lang="es-ES" sz="2115" dirty="0" smtClean="0"/>
-                <a:t>period</a:t>
-              </a:r>
-              <a:endParaRPr lang="en-US" sz="2115" dirty="0"/>
-            </a:p>
-          </p:txBody>
-        </p:sp>
-      </p:grpSp>
-      <p:grpSp>
-        <p:nvGrpSpPr>
-          <p:cNvPr id="105" name="Group 104"/>
-          <p:cNvGrpSpPr/>
-          <p:nvPr/>
-        </p:nvGrpSpPr>
-        <p:grpSpPr>
-          <a:xfrm>
-            <a:off x="8040157" y="2545596"/>
-            <a:ext cx="1114598" cy="735848"/>
-            <a:chOff x="1987422" y="1147198"/>
-            <a:chExt cx="1114594" cy="735849"/>
-          </a:xfrm>
-        </p:grpSpPr>
-        <p:sp>
-          <p:nvSpPr>
-            <p:cNvPr id="106" name="Isosceles Triangle 105"/>
-            <p:cNvSpPr/>
-            <p:nvPr/>
-          </p:nvSpPr>
-          <p:spPr>
-            <a:xfrm flipV="1">
-              <a:off x="1987422" y="1147198"/>
-              <a:ext cx="1114594" cy="735849"/>
-            </a:xfrm>
-            <a:prstGeom prst="triangle">
-              <a:avLst/>
-            </a:prstGeom>
-            <a:noFill/>
-            <a:ln w="19050">
-              <a:solidFill>
-                <a:schemeClr val="tx1"/>
-              </a:solidFill>
-            </a:ln>
-          </p:spPr>
-          <p:style>
-            <a:lnRef idx="2">
-              <a:schemeClr val="accent1">
-                <a:shade val="50000"/>
-              </a:schemeClr>
-            </a:lnRef>
-            <a:fillRef idx="1">
-              <a:schemeClr val="accent1"/>
-            </a:fillRef>
-            <a:effectRef idx="0">
-              <a:schemeClr val="accent1"/>
-            </a:effectRef>
-            <a:fontRef idx="minor">
-              <a:schemeClr val="lt1"/>
-            </a:fontRef>
-          </p:style>
-          <p:txBody>
-            <a:bodyPr rot="0" spcFirstLastPara="0" vertOverflow="overflow" horzOverflow="overflow" vert="horz" wrap="square" lIns="91440" tIns="45720" rIns="91440" bIns="45720" numCol="1" spcCol="0" rtlCol="0" fromWordArt="0" anchor="ctr" anchorCtr="0" forceAA="0" compatLnSpc="1">
-              <a:prstTxWarp prst="textNoShape">
-                <a:avLst/>
-              </a:prstTxWarp>
-              <a:noAutofit/>
-            </a:bodyPr>
-            <a:lstStyle/>
-            <a:p>
-              <a:pPr algn="ctr"/>
-              <a:endParaRPr lang="en-US" sz="2115"/>
-            </a:p>
-          </p:txBody>
-        </p:sp>
-        <p:sp>
-          <p:nvSpPr>
-            <p:cNvPr id="107" name="TextBox 106"/>
-            <p:cNvSpPr txBox="1"/>
-            <p:nvPr/>
-          </p:nvSpPr>
-          <p:spPr>
-            <a:xfrm>
-              <a:off x="2246401" y="1227528"/>
-              <a:ext cx="596636" cy="417808"/>
-            </a:xfrm>
-            <a:prstGeom prst="rect">
-              <a:avLst/>
-            </a:prstGeom>
-            <a:noFill/>
-          </p:spPr>
-          <p:txBody>
-            <a:bodyPr wrap="none" rtlCol="0">
-              <a:spAutoFit/>
-            </a:bodyPr>
-            <a:lstStyle/>
-            <a:p>
-              <a:r>
-                <a:rPr lang="es-ES" sz="2115" dirty="0"/>
-                <a:t>IS A</a:t>
-              </a:r>
-              <a:endParaRPr lang="en-US" sz="2115" dirty="0"/>
-            </a:p>
-          </p:txBody>
-        </p:sp>
-      </p:grpSp>
-      <p:cxnSp>
-        <p:nvCxnSpPr>
-          <p:cNvPr id="108" name="Straight Connector 107"/>
-          <p:cNvCxnSpPr>
-            <a:endCxn id="106" idx="3"/>
-          </p:cNvCxnSpPr>
-          <p:nvPr/>
-        </p:nvCxnSpPr>
-        <p:spPr>
-          <a:xfrm>
-            <a:off x="8597459" y="2118014"/>
-            <a:ext cx="0" cy="427583"/>
-          </a:xfrm>
-          <a:prstGeom prst="line">
-            <a:avLst/>
-          </a:prstGeom>
-          <a:ln w="63500" cmpd="dbl">
-            <a:solidFill>
-              <a:schemeClr val="tx1"/>
-            </a:solidFill>
-          </a:ln>
-        </p:spPr>
-        <p:style>
-          <a:lnRef idx="1">
-            <a:schemeClr val="accent1"/>
-          </a:lnRef>
-          <a:fillRef idx="0">
-            <a:schemeClr val="accent1"/>
-          </a:fillRef>
-          <a:effectRef idx="0">
-            <a:schemeClr val="accent1"/>
-          </a:effectRef>
-          <a:fontRef idx="minor">
-            <a:schemeClr val="tx1"/>
-          </a:fontRef>
-        </p:style>
-      </p:cxnSp>
-      <p:grpSp>
-        <p:nvGrpSpPr>
-          <p:cNvPr id="109" name="Group 108"/>
-          <p:cNvGrpSpPr/>
-          <p:nvPr/>
-        </p:nvGrpSpPr>
-        <p:grpSpPr>
-          <a:xfrm>
-            <a:off x="7721553" y="3718543"/>
-            <a:ext cx="1751805" cy="515715"/>
-            <a:chOff x="2725743" y="3980367"/>
-            <a:chExt cx="1751806" cy="515714"/>
-          </a:xfrm>
-        </p:grpSpPr>
-        <p:sp>
-          <p:nvSpPr>
-            <p:cNvPr id="110" name="Rectangle 109"/>
-            <p:cNvSpPr/>
-            <p:nvPr/>
-          </p:nvSpPr>
-          <p:spPr>
-            <a:xfrm>
-              <a:off x="2725743" y="3980367"/>
-              <a:ext cx="1751806" cy="515714"/>
-            </a:xfrm>
-            <a:prstGeom prst="rect">
-              <a:avLst/>
-            </a:prstGeom>
-            <a:noFill/>
-            <a:ln w="19050" cmpd="sng">
-              <a:solidFill>
-                <a:schemeClr val="tx1"/>
-              </a:solidFill>
-            </a:ln>
-          </p:spPr>
-          <p:style>
-            <a:lnRef idx="2">
-              <a:schemeClr val="accent1">
-                <a:shade val="50000"/>
-              </a:schemeClr>
-            </a:lnRef>
-            <a:fillRef idx="1">
-              <a:schemeClr val="accent1"/>
-            </a:fillRef>
-            <a:effectRef idx="0">
-              <a:schemeClr val="accent1"/>
-            </a:effectRef>
-            <a:fontRef idx="minor">
-              <a:schemeClr val="lt1"/>
-            </a:fontRef>
-          </p:style>
-          <p:txBody>
-            <a:bodyPr rtlCol="0" anchor="ctr"/>
-            <a:lstStyle/>
-            <a:p>
-              <a:pPr algn="ctr"/>
-              <a:endParaRPr lang="en-US" sz="2115" dirty="0"/>
-            </a:p>
-          </p:txBody>
-        </p:sp>
-        <p:sp>
-          <p:nvSpPr>
-            <p:cNvPr id="111" name="TextBox 110"/>
-            <p:cNvSpPr txBox="1"/>
-            <p:nvPr/>
-          </p:nvSpPr>
-          <p:spPr>
-            <a:xfrm>
-              <a:off x="2855287" y="4026121"/>
-              <a:ext cx="1492717" cy="417806"/>
-            </a:xfrm>
-            <a:prstGeom prst="rect">
-              <a:avLst/>
-            </a:prstGeom>
-            <a:noFill/>
-          </p:spPr>
-          <p:txBody>
-            <a:bodyPr wrap="none" rtlCol="0">
-              <a:spAutoFit/>
-            </a:bodyPr>
-            <a:lstStyle/>
-            <a:p>
-              <a:r>
-                <a:rPr lang="es-ES" sz="2115" dirty="0"/>
-                <a:t>p</a:t>
-              </a:r>
-              <a:r>
-                <a:rPr lang="es-ES" sz="2115" dirty="0" smtClean="0"/>
-                <a:t>eriod_plus</a:t>
+                <a:t>high_period</a:t>
               </a:r>
               <a:endParaRPr lang="en-US" sz="2115" dirty="0"/>
             </a:p>
@@ -5107,52 +4879,13 @@
           <p:cNvPr id="115" name="Straight Connector 114"/>
           <p:cNvCxnSpPr>
             <a:stCxn id="84" idx="0"/>
-            <a:endCxn id="110" idx="2"/>
           </p:cNvCxnSpPr>
           <p:nvPr/>
         </p:nvCxnSpPr>
         <p:spPr>
           <a:xfrm flipH="1" flipV="1">
-            <a:off x="8597456" y="4234258"/>
+            <a:off x="7799040" y="7868600"/>
             <a:ext cx="3546" cy="437099"/>
-          </a:xfrm>
-          <a:prstGeom prst="line">
-            <a:avLst/>
-          </a:prstGeom>
-          <a:ln w="19050">
-            <a:solidFill>
-              <a:schemeClr val="tx1"/>
-            </a:solidFill>
-          </a:ln>
-        </p:spPr>
-        <p:style>
-          <a:lnRef idx="1">
-            <a:schemeClr val="accent1"/>
-          </a:lnRef>
-          <a:fillRef idx="0">
-            <a:schemeClr val="accent1"/>
-          </a:fillRef>
-          <a:effectRef idx="0">
-            <a:schemeClr val="accent1"/>
-          </a:effectRef>
-          <a:fontRef idx="minor">
-            <a:schemeClr val="tx1"/>
-          </a:fontRef>
-        </p:style>
-      </p:cxnSp>
-      <p:cxnSp>
-        <p:nvCxnSpPr>
-          <p:cNvPr id="123" name="Straight Connector 122"/>
-          <p:cNvCxnSpPr>
-            <a:stCxn id="106" idx="0"/>
-            <a:endCxn id="110" idx="0"/>
-          </p:cNvCxnSpPr>
-          <p:nvPr/>
-        </p:nvCxnSpPr>
-        <p:spPr>
-          <a:xfrm>
-            <a:off x="8597456" y="3281444"/>
-            <a:ext cx="0" cy="437099"/>
           </a:xfrm>
           <a:prstGeom prst="line">
             <a:avLst/>
@@ -5186,7 +4919,7 @@
         </p:nvGrpSpPr>
         <p:grpSpPr>
           <a:xfrm>
-            <a:off x="11156990" y="7820296"/>
+            <a:off x="11879366" y="11454638"/>
             <a:ext cx="1359256" cy="515715"/>
             <a:chOff x="2725743" y="3980367"/>
             <a:chExt cx="1751806" cy="515714"/>
@@ -5277,7 +5010,7 @@
         </p:nvGrpSpPr>
         <p:grpSpPr>
           <a:xfrm>
-            <a:off x="13155048" y="7390001"/>
+            <a:off x="13877424" y="11024343"/>
             <a:ext cx="1537206" cy="1376301"/>
             <a:chOff x="5930900" y="1130300"/>
             <a:chExt cx="1378361" cy="1238250"/>
@@ -5366,46 +5099,6 @@
       </p:grpSp>
       <p:cxnSp>
         <p:nvCxnSpPr>
-          <p:cNvPr id="131" name="Elbow Connector 130"/>
-          <p:cNvCxnSpPr>
-            <a:endCxn id="128" idx="0"/>
-          </p:cNvCxnSpPr>
-          <p:nvPr/>
-        </p:nvCxnSpPr>
-        <p:spPr>
-          <a:xfrm rot="16200000" flipH="1">
-            <a:off x="8967201" y="2459032"/>
-            <a:ext cx="5277826" cy="4584112"/>
-          </a:xfrm>
-          <a:prstGeom prst="bentConnector3">
-            <a:avLst>
-              <a:gd name="adj1" fmla="val -3435"/>
-            </a:avLst>
-          </a:prstGeom>
-          <a:ln w="19050">
-            <a:solidFill>
-              <a:schemeClr val="tx1"/>
-            </a:solidFill>
-            <a:tailEnd type="none"/>
-          </a:ln>
-        </p:spPr>
-        <p:style>
-          <a:lnRef idx="1">
-            <a:schemeClr val="accent1"/>
-          </a:lnRef>
-          <a:fillRef idx="0">
-            <a:schemeClr val="accent1"/>
-          </a:fillRef>
-          <a:effectRef idx="0">
-            <a:schemeClr val="accent1"/>
-          </a:effectRef>
-          <a:fontRef idx="minor">
-            <a:schemeClr val="tx1"/>
-          </a:fontRef>
-        </p:style>
-      </p:cxnSp>
-      <p:cxnSp>
-        <p:nvCxnSpPr>
           <p:cNvPr id="137" name="Straight Connector 136"/>
           <p:cNvCxnSpPr>
             <a:stCxn id="125" idx="3"/>
@@ -5415,7 +5108,7 @@
         </p:nvCxnSpPr>
         <p:spPr>
           <a:xfrm flipV="1">
-            <a:off x="12516246" y="8078152"/>
+            <a:off x="13238622" y="11712494"/>
             <a:ext cx="638802" cy="2"/>
           </a:xfrm>
           <a:prstGeom prst="line">
@@ -5452,7 +5145,7 @@
         </p:nvCxnSpPr>
         <p:spPr>
           <a:xfrm rot="5400000" flipH="1">
-            <a:off x="12830399" y="7698531"/>
+            <a:off x="13552775" y="11332873"/>
             <a:ext cx="408394" cy="1727148"/>
           </a:xfrm>
           <a:prstGeom prst="bentConnector4">
@@ -5490,7 +5183,7 @@
         </p:nvGrpSpPr>
         <p:grpSpPr>
           <a:xfrm>
-            <a:off x="13155048" y="9482783"/>
+            <a:off x="13877424" y="13117125"/>
             <a:ext cx="1486243" cy="1376301"/>
             <a:chOff x="5930900" y="1130300"/>
             <a:chExt cx="1332664" cy="1238250"/>
@@ -5581,7 +5274,7 @@
         </p:nvGrpSpPr>
         <p:grpSpPr>
           <a:xfrm>
-            <a:off x="13022265" y="11315546"/>
+            <a:off x="13744641" y="14949888"/>
             <a:ext cx="1751805" cy="515715"/>
             <a:chOff x="2725743" y="3980367"/>
             <a:chExt cx="1751806" cy="515714"/>
@@ -5674,7 +5367,7 @@
         </p:nvCxnSpPr>
         <p:spPr>
           <a:xfrm rot="16200000" flipH="1">
-            <a:off x="11410194" y="8426079"/>
+            <a:off x="12132570" y="12060421"/>
             <a:ext cx="1834923" cy="1654786"/>
           </a:xfrm>
           <a:prstGeom prst="bentConnector2">
@@ -5712,8 +5405,640 @@
         </p:nvCxnSpPr>
         <p:spPr>
           <a:xfrm flipH="1">
-            <a:off x="13898168" y="10859084"/>
+            <a:off x="14620544" y="14493426"/>
             <a:ext cx="2" cy="456462"/>
+          </a:xfrm>
+          <a:prstGeom prst="line">
+            <a:avLst/>
+          </a:prstGeom>
+          <a:ln w="19050">
+            <a:solidFill>
+              <a:schemeClr val="tx1"/>
+            </a:solidFill>
+          </a:ln>
+        </p:spPr>
+        <p:style>
+          <a:lnRef idx="1">
+            <a:schemeClr val="accent1"/>
+          </a:lnRef>
+          <a:fillRef idx="0">
+            <a:schemeClr val="accent1"/>
+          </a:fillRef>
+          <a:effectRef idx="0">
+            <a:schemeClr val="accent1"/>
+          </a:effectRef>
+          <a:fontRef idx="minor">
+            <a:schemeClr val="tx1"/>
+          </a:fontRef>
+        </p:style>
+      </p:cxnSp>
+      <p:grpSp>
+        <p:nvGrpSpPr>
+          <p:cNvPr id="90" name="Group 89"/>
+          <p:cNvGrpSpPr/>
+          <p:nvPr/>
+        </p:nvGrpSpPr>
+        <p:grpSpPr>
+          <a:xfrm>
+            <a:off x="5670486" y="4753634"/>
+            <a:ext cx="2380331" cy="752922"/>
+            <a:chOff x="5367366" y="876525"/>
+            <a:chExt cx="1682712" cy="897324"/>
+          </a:xfrm>
+        </p:grpSpPr>
+        <p:sp>
+          <p:nvSpPr>
+            <p:cNvPr id="92" name="Oval 91"/>
+            <p:cNvSpPr/>
+            <p:nvPr/>
+          </p:nvSpPr>
+          <p:spPr>
+            <a:xfrm>
+              <a:off x="5367366" y="876525"/>
+              <a:ext cx="1682712" cy="578940"/>
+            </a:xfrm>
+            <a:prstGeom prst="ellipse">
+              <a:avLst/>
+            </a:prstGeom>
+            <a:noFill/>
+            <a:ln w="20320">
+              <a:solidFill>
+                <a:schemeClr val="tx1"/>
+              </a:solidFill>
+            </a:ln>
+          </p:spPr>
+          <p:style>
+            <a:lnRef idx="2">
+              <a:schemeClr val="accent1">
+                <a:shade val="50000"/>
+              </a:schemeClr>
+            </a:lnRef>
+            <a:fillRef idx="1">
+              <a:schemeClr val="accent1"/>
+            </a:fillRef>
+            <a:effectRef idx="0">
+              <a:schemeClr val="accent1"/>
+            </a:effectRef>
+            <a:fontRef idx="minor">
+              <a:schemeClr val="lt1"/>
+            </a:fontRef>
+          </p:style>
+          <p:txBody>
+            <a:bodyPr rot="0" spcFirstLastPara="0" vertOverflow="overflow" horzOverflow="overflow" vert="horz" wrap="square" lIns="91440" tIns="45720" rIns="91440" bIns="45720" numCol="1" spcCol="0" rtlCol="0" fromWordArt="0" anchor="ctr" anchorCtr="0" forceAA="0" compatLnSpc="1">
+              <a:prstTxWarp prst="textNoShape">
+                <a:avLst/>
+              </a:prstTxWarp>
+              <a:noAutofit/>
+            </a:bodyPr>
+            <a:lstStyle/>
+            <a:p>
+              <a:pPr algn="ctr"/>
+              <a:endParaRPr lang="en-US" sz="2115" dirty="0"/>
+            </a:p>
+          </p:txBody>
+        </p:sp>
+        <p:sp>
+          <p:nvSpPr>
+            <p:cNvPr id="93" name="TextBox 92"/>
+            <p:cNvSpPr txBox="1"/>
+            <p:nvPr/>
+          </p:nvSpPr>
+          <p:spPr>
+            <a:xfrm>
+              <a:off x="5549192" y="888015"/>
+              <a:ext cx="1403662" cy="885834"/>
+            </a:xfrm>
+            <a:prstGeom prst="rect">
+              <a:avLst/>
+            </a:prstGeom>
+            <a:noFill/>
+          </p:spPr>
+          <p:txBody>
+            <a:bodyPr wrap="square" rtlCol="0">
+              <a:spAutoFit/>
+            </a:bodyPr>
+            <a:lstStyle/>
+            <a:p>
+              <a:r>
+                <a:rPr lang="es-ES" sz="2115" dirty="0"/>
+                <a:t>s</a:t>
+              </a:r>
+              <a:r>
+                <a:rPr lang="es-ES" sz="2115" dirty="0" smtClean="0"/>
+                <a:t>_d</a:t>
+              </a:r>
+              <a:r>
+                <a:rPr lang="es-ES" sz="2115" dirty="0" smtClean="0"/>
+                <a:t>ay_of_week</a:t>
+              </a:r>
+              <a:endParaRPr lang="en-US" sz="2115" dirty="0"/>
+            </a:p>
+          </p:txBody>
+        </p:sp>
+      </p:grpSp>
+      <p:grpSp>
+        <p:nvGrpSpPr>
+          <p:cNvPr id="94" name="Group 93"/>
+          <p:cNvGrpSpPr/>
+          <p:nvPr/>
+        </p:nvGrpSpPr>
+        <p:grpSpPr>
+          <a:xfrm>
+            <a:off x="10838361" y="10604233"/>
+            <a:ext cx="1323509" cy="769855"/>
+            <a:chOff x="5367366" y="876525"/>
+            <a:chExt cx="1682712" cy="917505"/>
+          </a:xfrm>
+        </p:grpSpPr>
+        <p:sp>
+          <p:nvSpPr>
+            <p:cNvPr id="95" name="Oval 94"/>
+            <p:cNvSpPr/>
+            <p:nvPr/>
+          </p:nvSpPr>
+          <p:spPr>
+            <a:xfrm>
+              <a:off x="5367366" y="876525"/>
+              <a:ext cx="1682712" cy="578940"/>
+            </a:xfrm>
+            <a:prstGeom prst="ellipse">
+              <a:avLst/>
+            </a:prstGeom>
+            <a:noFill/>
+            <a:ln w="20320">
+              <a:solidFill>
+                <a:schemeClr val="tx1"/>
+              </a:solidFill>
+            </a:ln>
+          </p:spPr>
+          <p:style>
+            <a:lnRef idx="2">
+              <a:schemeClr val="accent1">
+                <a:shade val="50000"/>
+              </a:schemeClr>
+            </a:lnRef>
+            <a:fillRef idx="1">
+              <a:schemeClr val="accent1"/>
+            </a:fillRef>
+            <a:effectRef idx="0">
+              <a:schemeClr val="accent1"/>
+            </a:effectRef>
+            <a:fontRef idx="minor">
+              <a:schemeClr val="lt1"/>
+            </a:fontRef>
+          </p:style>
+          <p:txBody>
+            <a:bodyPr rot="0" spcFirstLastPara="0" vertOverflow="overflow" horzOverflow="overflow" vert="horz" wrap="square" lIns="91440" tIns="45720" rIns="91440" bIns="45720" numCol="1" spcCol="0" rtlCol="0" fromWordArt="0" anchor="ctr" anchorCtr="0" forceAA="0" compatLnSpc="1">
+              <a:prstTxWarp prst="textNoShape">
+                <a:avLst/>
+              </a:prstTxWarp>
+              <a:noAutofit/>
+            </a:bodyPr>
+            <a:lstStyle/>
+            <a:p>
+              <a:pPr algn="ctr"/>
+              <a:endParaRPr lang="en-US" sz="2115" dirty="0"/>
+            </a:p>
+          </p:txBody>
+        </p:sp>
+        <p:sp>
+          <p:nvSpPr>
+            <p:cNvPr id="96" name="TextBox 95"/>
+            <p:cNvSpPr txBox="1"/>
+            <p:nvPr/>
+          </p:nvSpPr>
+          <p:spPr>
+            <a:xfrm>
+              <a:off x="5542125" y="908197"/>
+              <a:ext cx="1403662" cy="885833"/>
+            </a:xfrm>
+            <a:prstGeom prst="rect">
+              <a:avLst/>
+            </a:prstGeom>
+            <a:noFill/>
+          </p:spPr>
+          <p:txBody>
+            <a:bodyPr wrap="square" rtlCol="0">
+              <a:spAutoFit/>
+            </a:bodyPr>
+            <a:lstStyle/>
+            <a:p>
+              <a:r>
+                <a:rPr lang="es-ES" sz="2115" dirty="0" smtClean="0"/>
+                <a:t>address</a:t>
+              </a:r>
+              <a:endParaRPr lang="en-US" sz="2115" dirty="0"/>
+            </a:p>
+          </p:txBody>
+        </p:sp>
+      </p:grpSp>
+      <p:grpSp>
+        <p:nvGrpSpPr>
+          <p:cNvPr id="101" name="Group 100"/>
+          <p:cNvGrpSpPr/>
+          <p:nvPr/>
+        </p:nvGrpSpPr>
+        <p:grpSpPr>
+          <a:xfrm>
+            <a:off x="11256561" y="9892730"/>
+            <a:ext cx="1885133" cy="986961"/>
+            <a:chOff x="5367366" y="876525"/>
+            <a:chExt cx="1682712" cy="940208"/>
+          </a:xfrm>
+        </p:grpSpPr>
+        <p:sp>
+          <p:nvSpPr>
+            <p:cNvPr id="112" name="Oval 111"/>
+            <p:cNvSpPr/>
+            <p:nvPr/>
+          </p:nvSpPr>
+          <p:spPr>
+            <a:xfrm>
+              <a:off x="5367366" y="876525"/>
+              <a:ext cx="1682712" cy="578940"/>
+            </a:xfrm>
+            <a:prstGeom prst="ellipse">
+              <a:avLst/>
+            </a:prstGeom>
+            <a:noFill/>
+            <a:ln w="20320">
+              <a:solidFill>
+                <a:schemeClr val="tx1"/>
+              </a:solidFill>
+            </a:ln>
+          </p:spPr>
+          <p:style>
+            <a:lnRef idx="2">
+              <a:schemeClr val="accent1">
+                <a:shade val="50000"/>
+              </a:schemeClr>
+            </a:lnRef>
+            <a:fillRef idx="1">
+              <a:schemeClr val="accent1"/>
+            </a:fillRef>
+            <a:effectRef idx="0">
+              <a:schemeClr val="accent1"/>
+            </a:effectRef>
+            <a:fontRef idx="minor">
+              <a:schemeClr val="lt1"/>
+            </a:fontRef>
+          </p:style>
+          <p:txBody>
+            <a:bodyPr rot="0" spcFirstLastPara="0" vertOverflow="overflow" horzOverflow="overflow" vert="horz" wrap="square" lIns="91440" tIns="45720" rIns="91440" bIns="45720" numCol="1" spcCol="0" rtlCol="0" fromWordArt="0" anchor="ctr" anchorCtr="0" forceAA="0" compatLnSpc="1">
+              <a:prstTxWarp prst="textNoShape">
+                <a:avLst/>
+              </a:prstTxWarp>
+              <a:noAutofit/>
+            </a:bodyPr>
+            <a:lstStyle/>
+            <a:p>
+              <a:pPr algn="ctr"/>
+              <a:endParaRPr lang="en-US" sz="2115" dirty="0"/>
+            </a:p>
+          </p:txBody>
+        </p:sp>
+        <p:sp>
+          <p:nvSpPr>
+            <p:cNvPr id="113" name="TextBox 112"/>
+            <p:cNvSpPr txBox="1"/>
+            <p:nvPr/>
+          </p:nvSpPr>
+          <p:spPr>
+            <a:xfrm>
+              <a:off x="5513784" y="930900"/>
+              <a:ext cx="1403662" cy="885833"/>
+            </a:xfrm>
+            <a:prstGeom prst="rect">
+              <a:avLst/>
+            </a:prstGeom>
+            <a:noFill/>
+          </p:spPr>
+          <p:txBody>
+            <a:bodyPr wrap="square" rtlCol="0">
+              <a:spAutoFit/>
+            </a:bodyPr>
+            <a:lstStyle/>
+            <a:p>
+              <a:r>
+                <a:rPr lang="es-ES" sz="2115" dirty="0" smtClean="0"/>
+                <a:t>NHS number</a:t>
+              </a:r>
+              <a:endParaRPr lang="en-US" sz="2115" dirty="0"/>
+            </a:p>
+          </p:txBody>
+        </p:sp>
+      </p:grpSp>
+      <p:cxnSp>
+        <p:nvCxnSpPr>
+          <p:cNvPr id="114" name="Straight Connector 113"/>
+          <p:cNvCxnSpPr/>
+          <p:nvPr/>
+        </p:nvCxnSpPr>
+        <p:spPr>
+          <a:xfrm>
+            <a:off x="11475159" y="10295417"/>
+            <a:ext cx="1437289" cy="0"/>
+          </a:xfrm>
+          <a:prstGeom prst="line">
+            <a:avLst/>
+          </a:prstGeom>
+          <a:ln w="15875">
+            <a:solidFill>
+              <a:schemeClr val="tx1"/>
+            </a:solidFill>
+          </a:ln>
+        </p:spPr>
+        <p:style>
+          <a:lnRef idx="1">
+            <a:schemeClr val="accent1"/>
+          </a:lnRef>
+          <a:fillRef idx="0">
+            <a:schemeClr val="accent1"/>
+          </a:fillRef>
+          <a:effectRef idx="0">
+            <a:schemeClr val="accent1"/>
+          </a:effectRef>
+          <a:fontRef idx="minor">
+            <a:schemeClr val="tx1"/>
+          </a:fontRef>
+        </p:style>
+      </p:cxnSp>
+      <p:cxnSp>
+        <p:nvCxnSpPr>
+          <p:cNvPr id="5" name="Straight Connector 4"/>
+          <p:cNvCxnSpPr>
+            <a:endCxn id="125" idx="0"/>
+          </p:cNvCxnSpPr>
+          <p:nvPr/>
+        </p:nvCxnSpPr>
+        <p:spPr>
+          <a:xfrm>
+            <a:off x="12222638" y="10500459"/>
+            <a:ext cx="336356" cy="954179"/>
+          </a:xfrm>
+          <a:prstGeom prst="line">
+            <a:avLst/>
+          </a:prstGeom>
+          <a:ln w="19050"/>
+        </p:spPr>
+        <p:style>
+          <a:lnRef idx="1">
+            <a:schemeClr val="dk1"/>
+          </a:lnRef>
+          <a:fillRef idx="0">
+            <a:schemeClr val="dk1"/>
+          </a:fillRef>
+          <a:effectRef idx="0">
+            <a:schemeClr val="dk1"/>
+          </a:effectRef>
+          <a:fontRef idx="minor">
+            <a:schemeClr val="tx1"/>
+          </a:fontRef>
+        </p:style>
+      </p:cxnSp>
+      <p:cxnSp>
+        <p:nvCxnSpPr>
+          <p:cNvPr id="13" name="Straight Connector 12"/>
+          <p:cNvCxnSpPr/>
+          <p:nvPr/>
+        </p:nvCxnSpPr>
+        <p:spPr>
+          <a:xfrm>
+            <a:off x="11663426" y="11090007"/>
+            <a:ext cx="498444" cy="364631"/>
+          </a:xfrm>
+          <a:prstGeom prst="line">
+            <a:avLst/>
+          </a:prstGeom>
+          <a:ln w="19050">
+            <a:solidFill>
+              <a:schemeClr val="tx1"/>
+            </a:solidFill>
+          </a:ln>
+        </p:spPr>
+        <p:style>
+          <a:lnRef idx="1">
+            <a:schemeClr val="accent1"/>
+          </a:lnRef>
+          <a:fillRef idx="0">
+            <a:schemeClr val="accent1"/>
+          </a:fillRef>
+          <a:effectRef idx="0">
+            <a:schemeClr val="accent1"/>
+          </a:effectRef>
+          <a:fontRef idx="minor">
+            <a:schemeClr val="tx1"/>
+          </a:fontRef>
+        </p:style>
+      </p:cxnSp>
+      <p:grpSp>
+        <p:nvGrpSpPr>
+          <p:cNvPr id="116" name="Group 115"/>
+          <p:cNvGrpSpPr/>
+          <p:nvPr/>
+        </p:nvGrpSpPr>
+        <p:grpSpPr>
+          <a:xfrm>
+            <a:off x="13663434" y="15772620"/>
+            <a:ext cx="1005224" cy="485774"/>
+            <a:chOff x="5367366" y="876525"/>
+            <a:chExt cx="1682712" cy="578940"/>
+          </a:xfrm>
+        </p:grpSpPr>
+        <p:sp>
+          <p:nvSpPr>
+            <p:cNvPr id="117" name="Oval 116"/>
+            <p:cNvSpPr/>
+            <p:nvPr/>
+          </p:nvSpPr>
+          <p:spPr>
+            <a:xfrm>
+              <a:off x="5367366" y="876525"/>
+              <a:ext cx="1682712" cy="578940"/>
+            </a:xfrm>
+            <a:prstGeom prst="ellipse">
+              <a:avLst/>
+            </a:prstGeom>
+            <a:noFill/>
+            <a:ln w="20320">
+              <a:solidFill>
+                <a:schemeClr val="tx1"/>
+              </a:solidFill>
+            </a:ln>
+          </p:spPr>
+          <p:style>
+            <a:lnRef idx="2">
+              <a:schemeClr val="accent1">
+                <a:shade val="50000"/>
+              </a:schemeClr>
+            </a:lnRef>
+            <a:fillRef idx="1">
+              <a:schemeClr val="accent1"/>
+            </a:fillRef>
+            <a:effectRef idx="0">
+              <a:schemeClr val="accent1"/>
+            </a:effectRef>
+            <a:fontRef idx="minor">
+              <a:schemeClr val="lt1"/>
+            </a:fontRef>
+          </p:style>
+          <p:txBody>
+            <a:bodyPr rot="0" spcFirstLastPara="0" vertOverflow="overflow" horzOverflow="overflow" vert="horz" wrap="square" lIns="91440" tIns="45720" rIns="91440" bIns="45720" numCol="1" spcCol="0" rtlCol="0" fromWordArt="0" anchor="ctr" anchorCtr="0" forceAA="0" compatLnSpc="1">
+              <a:prstTxWarp prst="textNoShape">
+                <a:avLst/>
+              </a:prstTxWarp>
+              <a:noAutofit/>
+            </a:bodyPr>
+            <a:lstStyle/>
+            <a:p>
+              <a:pPr algn="ctr"/>
+              <a:endParaRPr lang="en-US" sz="2115" dirty="0"/>
+            </a:p>
+          </p:txBody>
+        </p:sp>
+        <p:sp>
+          <p:nvSpPr>
+            <p:cNvPr id="118" name="TextBox 117"/>
+            <p:cNvSpPr txBox="1"/>
+            <p:nvPr/>
+          </p:nvSpPr>
+          <p:spPr>
+            <a:xfrm>
+              <a:off x="5542125" y="908197"/>
+              <a:ext cx="1403662" cy="497938"/>
+            </a:xfrm>
+            <a:prstGeom prst="rect">
+              <a:avLst/>
+            </a:prstGeom>
+            <a:noFill/>
+          </p:spPr>
+          <p:txBody>
+            <a:bodyPr wrap="square" rtlCol="0">
+              <a:spAutoFit/>
+            </a:bodyPr>
+            <a:lstStyle/>
+            <a:p>
+              <a:r>
+                <a:rPr lang="es-ES" sz="2115" dirty="0" smtClean="0"/>
+                <a:t>name</a:t>
+              </a:r>
+              <a:endParaRPr lang="en-US" sz="2115" dirty="0"/>
+            </a:p>
+          </p:txBody>
+        </p:sp>
+      </p:grpSp>
+      <p:grpSp>
+        <p:nvGrpSpPr>
+          <p:cNvPr id="119" name="Group 118"/>
+          <p:cNvGrpSpPr/>
+          <p:nvPr/>
+        </p:nvGrpSpPr>
+        <p:grpSpPr>
+          <a:xfrm>
+            <a:off x="14857011" y="15730087"/>
+            <a:ext cx="1670515" cy="538634"/>
+            <a:chOff x="5405742" y="870290"/>
+            <a:chExt cx="1682712" cy="584023"/>
+          </a:xfrm>
+        </p:grpSpPr>
+        <p:sp>
+          <p:nvSpPr>
+            <p:cNvPr id="120" name="Oval 119"/>
+            <p:cNvSpPr/>
+            <p:nvPr/>
+          </p:nvSpPr>
+          <p:spPr>
+            <a:xfrm>
+              <a:off x="5405742" y="875373"/>
+              <a:ext cx="1682712" cy="578940"/>
+            </a:xfrm>
+            <a:prstGeom prst="ellipse">
+              <a:avLst/>
+            </a:prstGeom>
+            <a:noFill/>
+            <a:ln w="20320">
+              <a:solidFill>
+                <a:schemeClr val="tx1"/>
+              </a:solidFill>
+            </a:ln>
+          </p:spPr>
+          <p:style>
+            <a:lnRef idx="2">
+              <a:schemeClr val="accent1">
+                <a:shade val="50000"/>
+              </a:schemeClr>
+            </a:lnRef>
+            <a:fillRef idx="1">
+              <a:schemeClr val="accent1"/>
+            </a:fillRef>
+            <a:effectRef idx="0">
+              <a:schemeClr val="accent1"/>
+            </a:effectRef>
+            <a:fontRef idx="minor">
+              <a:schemeClr val="lt1"/>
+            </a:fontRef>
+          </p:style>
+          <p:txBody>
+            <a:bodyPr rot="0" spcFirstLastPara="0" vertOverflow="overflow" horzOverflow="overflow" vert="horz" wrap="square" lIns="91440" tIns="45720" rIns="91440" bIns="45720" numCol="1" spcCol="0" rtlCol="0" fromWordArt="0" anchor="ctr" anchorCtr="0" forceAA="0" compatLnSpc="1">
+              <a:prstTxWarp prst="textNoShape">
+                <a:avLst/>
+              </a:prstTxWarp>
+              <a:noAutofit/>
+            </a:bodyPr>
+            <a:lstStyle/>
+            <a:p>
+              <a:pPr algn="ctr"/>
+              <a:endParaRPr lang="en-US" sz="2115" dirty="0"/>
+            </a:p>
+          </p:txBody>
+        </p:sp>
+        <p:sp>
+          <p:nvSpPr>
+            <p:cNvPr id="121" name="TextBox 120"/>
+            <p:cNvSpPr txBox="1"/>
+            <p:nvPr/>
+          </p:nvSpPr>
+          <p:spPr>
+            <a:xfrm>
+              <a:off x="5614434" y="870290"/>
+              <a:ext cx="1403662" cy="398015"/>
+            </a:xfrm>
+            <a:prstGeom prst="rect">
+              <a:avLst/>
+            </a:prstGeom>
+            <a:noFill/>
+          </p:spPr>
+          <p:txBody>
+            <a:bodyPr wrap="square" rtlCol="0">
+              <a:spAutoFit/>
+            </a:bodyPr>
+            <a:lstStyle/>
+            <a:p>
+              <a:r>
+                <a:rPr lang="es-ES" sz="2115" dirty="0"/>
+                <a:t>d</a:t>
+              </a:r>
+              <a:r>
+                <a:rPr lang="es-ES" sz="2115" dirty="0" smtClean="0"/>
+                <a:t>igit code</a:t>
+              </a:r>
+              <a:endParaRPr lang="en-US" sz="2115" dirty="0"/>
+            </a:p>
+          </p:txBody>
+        </p:sp>
+      </p:grpSp>
+      <p:cxnSp>
+        <p:nvCxnSpPr>
+          <p:cNvPr id="28" name="Straight Connector 27"/>
+          <p:cNvCxnSpPr>
+            <a:endCxn id="117" idx="0"/>
+          </p:cNvCxnSpPr>
+          <p:nvPr/>
+        </p:nvCxnSpPr>
+        <p:spPr>
+          <a:xfrm flipH="1">
+            <a:off x="14166046" y="15465603"/>
+            <a:ext cx="234230" cy="307017"/>
           </a:xfrm>
           <a:prstGeom prst="line">
             <a:avLst/>
@@ -5741,22 +6066,19 @@
       </p:cxnSp>
       <p:cxnSp>
         <p:nvCxnSpPr>
-          <p:cNvPr id="160" name="Elbow Connector 159"/>
+          <p:cNvPr id="33" name="Straight Connector 32"/>
           <p:cNvCxnSpPr>
-            <a:endCxn id="141" idx="3"/>
+            <a:endCxn id="120" idx="0"/>
           </p:cNvCxnSpPr>
           <p:nvPr/>
         </p:nvCxnSpPr>
         <p:spPr>
-          <a:xfrm rot="16200000" flipH="1">
-            <a:off x="7716769" y="3246411"/>
-            <a:ext cx="8521811" cy="5327233"/>
-          </a:xfrm>
-          <a:prstGeom prst="bentConnector4">
-            <a:avLst>
-              <a:gd name="adj1" fmla="val 783"/>
-              <a:gd name="adj2" fmla="val 110073"/>
-            </a:avLst>
+          <a:xfrm>
+            <a:off x="15095940" y="15459253"/>
+            <a:ext cx="596329" cy="275522"/>
+          </a:xfrm>
+          <a:prstGeom prst="line">
+            <a:avLst/>
           </a:prstGeom>
           <a:ln w="19050">
             <a:solidFill>
@@ -5779,6 +6101,2817 @@
           </a:fontRef>
         </p:style>
       </p:cxnSp>
+      <p:cxnSp>
+        <p:nvCxnSpPr>
+          <p:cNvPr id="122" name="Straight Connector 121"/>
+          <p:cNvCxnSpPr/>
+          <p:nvPr/>
+        </p:nvCxnSpPr>
+        <p:spPr>
+          <a:xfrm>
+            <a:off x="15079726" y="16090725"/>
+            <a:ext cx="1216886" cy="0"/>
+          </a:xfrm>
+          <a:prstGeom prst="line">
+            <a:avLst/>
+          </a:prstGeom>
+          <a:ln w="15875">
+            <a:solidFill>
+              <a:schemeClr val="tx1"/>
+            </a:solidFill>
+          </a:ln>
+        </p:spPr>
+        <p:style>
+          <a:lnRef idx="1">
+            <a:schemeClr val="accent1"/>
+          </a:lnRef>
+          <a:fillRef idx="0">
+            <a:schemeClr val="accent1"/>
+          </a:fillRef>
+          <a:effectRef idx="0">
+            <a:schemeClr val="accent1"/>
+          </a:effectRef>
+          <a:fontRef idx="minor">
+            <a:schemeClr val="tx1"/>
+          </a:fontRef>
+        </p:style>
+      </p:cxnSp>
+      <p:grpSp>
+        <p:nvGrpSpPr>
+          <p:cNvPr id="130" name="Group 129"/>
+          <p:cNvGrpSpPr/>
+          <p:nvPr/>
+        </p:nvGrpSpPr>
+        <p:grpSpPr>
+          <a:xfrm>
+            <a:off x="9782082" y="7924129"/>
+            <a:ext cx="1132609" cy="576845"/>
+            <a:chOff x="77002" y="961721"/>
+            <a:chExt cx="2033245" cy="576845"/>
+          </a:xfrm>
+        </p:grpSpPr>
+        <p:grpSp>
+          <p:nvGrpSpPr>
+            <p:cNvPr id="132" name="Group 131"/>
+            <p:cNvGrpSpPr/>
+            <p:nvPr/>
+          </p:nvGrpSpPr>
+          <p:grpSpPr>
+            <a:xfrm>
+              <a:off x="77002" y="961721"/>
+              <a:ext cx="2033245" cy="576845"/>
+              <a:chOff x="5367366" y="876525"/>
+              <a:chExt cx="1682712" cy="578940"/>
+            </a:xfrm>
+          </p:grpSpPr>
+          <p:sp>
+            <p:nvSpPr>
+              <p:cNvPr id="134" name="Oval 133"/>
+              <p:cNvSpPr/>
+              <p:nvPr/>
+            </p:nvSpPr>
+            <p:spPr>
+              <a:xfrm>
+                <a:off x="5367366" y="876525"/>
+                <a:ext cx="1682712" cy="578940"/>
+              </a:xfrm>
+              <a:prstGeom prst="ellipse">
+                <a:avLst/>
+              </a:prstGeom>
+              <a:noFill/>
+              <a:ln w="20320">
+                <a:solidFill>
+                  <a:schemeClr val="tx1"/>
+                </a:solidFill>
+              </a:ln>
+            </p:spPr>
+            <p:style>
+              <a:lnRef idx="2">
+                <a:schemeClr val="accent1">
+                  <a:shade val="50000"/>
+                </a:schemeClr>
+              </a:lnRef>
+              <a:fillRef idx="1">
+                <a:schemeClr val="accent1"/>
+              </a:fillRef>
+              <a:effectRef idx="0">
+                <a:schemeClr val="accent1"/>
+              </a:effectRef>
+              <a:fontRef idx="minor">
+                <a:schemeClr val="lt1"/>
+              </a:fontRef>
+            </p:style>
+            <p:txBody>
+              <a:bodyPr rot="0" spcFirstLastPara="0" vertOverflow="overflow" horzOverflow="overflow" vert="horz" wrap="square" lIns="91440" tIns="45720" rIns="91440" bIns="45720" numCol="1" spcCol="0" rtlCol="0" fromWordArt="0" anchor="ctr" anchorCtr="0" forceAA="0" compatLnSpc="1">
+                <a:prstTxWarp prst="textNoShape">
+                  <a:avLst/>
+                </a:prstTxWarp>
+                <a:noAutofit/>
+              </a:bodyPr>
+              <a:lstStyle/>
+              <a:p>
+                <a:pPr algn="ctr"/>
+                <a:endParaRPr lang="en-US" sz="2115" dirty="0"/>
+              </a:p>
+            </p:txBody>
+          </p:sp>
+          <p:sp>
+            <p:nvSpPr>
+              <p:cNvPr id="135" name="TextBox 134"/>
+              <p:cNvSpPr txBox="1"/>
+              <p:nvPr/>
+            </p:nvSpPr>
+            <p:spPr>
+              <a:xfrm>
+                <a:off x="5497422" y="911025"/>
+                <a:ext cx="1546753" cy="419325"/>
+              </a:xfrm>
+              <a:prstGeom prst="rect">
+                <a:avLst/>
+              </a:prstGeom>
+              <a:noFill/>
+            </p:spPr>
+            <p:txBody>
+              <a:bodyPr wrap="square" rtlCol="0">
+                <a:spAutoFit/>
+              </a:bodyPr>
+              <a:lstStyle/>
+              <a:p>
+                <a:r>
+                  <a:rPr lang="es-ES" sz="2115" dirty="0" smtClean="0"/>
+                  <a:t>domain</a:t>
+                </a:r>
+                <a:endParaRPr lang="en-US" sz="2115" dirty="0"/>
+              </a:p>
+            </p:txBody>
+          </p:sp>
+        </p:grpSp>
+        <p:cxnSp>
+          <p:nvCxnSpPr>
+            <p:cNvPr id="133" name="Straight Connector 132"/>
+            <p:cNvCxnSpPr/>
+            <p:nvPr/>
+          </p:nvCxnSpPr>
+          <p:spPr>
+            <a:xfrm>
+              <a:off x="384266" y="1366987"/>
+              <a:ext cx="1437290" cy="0"/>
+            </a:xfrm>
+            <a:prstGeom prst="line">
+              <a:avLst/>
+            </a:prstGeom>
+            <a:ln w="15875">
+              <a:solidFill>
+                <a:schemeClr val="tx1"/>
+              </a:solidFill>
+            </a:ln>
+          </p:spPr>
+          <p:style>
+            <a:lnRef idx="1">
+              <a:schemeClr val="accent1"/>
+            </a:lnRef>
+            <a:fillRef idx="0">
+              <a:schemeClr val="accent1"/>
+            </a:fillRef>
+            <a:effectRef idx="0">
+              <a:schemeClr val="accent1"/>
+            </a:effectRef>
+            <a:fontRef idx="minor">
+              <a:schemeClr val="tx1"/>
+            </a:fontRef>
+          </p:style>
+        </p:cxnSp>
+      </p:grpSp>
+      <p:grpSp>
+        <p:nvGrpSpPr>
+          <p:cNvPr id="136" name="Group 135"/>
+          <p:cNvGrpSpPr/>
+          <p:nvPr/>
+        </p:nvGrpSpPr>
+        <p:grpSpPr>
+          <a:xfrm>
+            <a:off x="10710596" y="7508865"/>
+            <a:ext cx="2074761" cy="760989"/>
+            <a:chOff x="5367366" y="876525"/>
+            <a:chExt cx="1682712" cy="906938"/>
+          </a:xfrm>
+        </p:grpSpPr>
+        <p:sp>
+          <p:nvSpPr>
+            <p:cNvPr id="138" name="Oval 137"/>
+            <p:cNvSpPr/>
+            <p:nvPr/>
+          </p:nvSpPr>
+          <p:spPr>
+            <a:xfrm>
+              <a:off x="5367366" y="876525"/>
+              <a:ext cx="1682712" cy="578940"/>
+            </a:xfrm>
+            <a:prstGeom prst="ellipse">
+              <a:avLst/>
+            </a:prstGeom>
+            <a:noFill/>
+            <a:ln w="20320">
+              <a:solidFill>
+                <a:schemeClr val="tx1"/>
+              </a:solidFill>
+            </a:ln>
+          </p:spPr>
+          <p:style>
+            <a:lnRef idx="2">
+              <a:schemeClr val="accent1">
+                <a:shade val="50000"/>
+              </a:schemeClr>
+            </a:lnRef>
+            <a:fillRef idx="1">
+              <a:schemeClr val="accent1"/>
+            </a:fillRef>
+            <a:effectRef idx="0">
+              <a:schemeClr val="accent1"/>
+            </a:effectRef>
+            <a:fontRef idx="minor">
+              <a:schemeClr val="lt1"/>
+            </a:fontRef>
+          </p:style>
+          <p:txBody>
+            <a:bodyPr rot="0" spcFirstLastPara="0" vertOverflow="overflow" horzOverflow="overflow" vert="horz" wrap="square" lIns="91440" tIns="45720" rIns="91440" bIns="45720" numCol="1" spcCol="0" rtlCol="0" fromWordArt="0" anchor="ctr" anchorCtr="0" forceAA="0" compatLnSpc="1">
+              <a:prstTxWarp prst="textNoShape">
+                <a:avLst/>
+              </a:prstTxWarp>
+              <a:noAutofit/>
+            </a:bodyPr>
+            <a:lstStyle/>
+            <a:p>
+              <a:pPr algn="ctr"/>
+              <a:endParaRPr lang="en-US" sz="2115" dirty="0"/>
+            </a:p>
+          </p:txBody>
+        </p:sp>
+        <p:sp>
+          <p:nvSpPr>
+            <p:cNvPr id="143" name="TextBox 142"/>
+            <p:cNvSpPr txBox="1"/>
+            <p:nvPr/>
+          </p:nvSpPr>
+          <p:spPr>
+            <a:xfrm>
+              <a:off x="5433783" y="897630"/>
+              <a:ext cx="1546753" cy="885833"/>
+            </a:xfrm>
+            <a:prstGeom prst="rect">
+              <a:avLst/>
+            </a:prstGeom>
+            <a:noFill/>
+          </p:spPr>
+          <p:txBody>
+            <a:bodyPr wrap="square" rtlCol="0">
+              <a:spAutoFit/>
+            </a:bodyPr>
+            <a:lstStyle/>
+            <a:p>
+              <a:r>
+                <a:rPr lang="es-ES" sz="2115" dirty="0"/>
+                <a:t>p</a:t>
+              </a:r>
+              <a:r>
+                <a:rPr lang="es-ES" sz="2115" dirty="0" smtClean="0"/>
+                <a:t>hone_number</a:t>
+              </a:r>
+              <a:endParaRPr lang="en-US" sz="2115" dirty="0"/>
+            </a:p>
+          </p:txBody>
+        </p:sp>
+      </p:grpSp>
+      <p:cxnSp>
+        <p:nvCxnSpPr>
+          <p:cNvPr id="38" name="Straight Connector 37"/>
+          <p:cNvCxnSpPr/>
+          <p:nvPr/>
+        </p:nvCxnSpPr>
+        <p:spPr>
+          <a:xfrm>
+            <a:off x="10641078" y="8467093"/>
+            <a:ext cx="166620" cy="216606"/>
+          </a:xfrm>
+          <a:prstGeom prst="line">
+            <a:avLst/>
+          </a:prstGeom>
+          <a:ln w="19050">
+            <a:solidFill>
+              <a:schemeClr val="tx1"/>
+            </a:solidFill>
+          </a:ln>
+        </p:spPr>
+        <p:style>
+          <a:lnRef idx="1">
+            <a:schemeClr val="accent1"/>
+          </a:lnRef>
+          <a:fillRef idx="0">
+            <a:schemeClr val="accent1"/>
+          </a:fillRef>
+          <a:effectRef idx="0">
+            <a:schemeClr val="accent1"/>
+          </a:effectRef>
+          <a:fontRef idx="minor">
+            <a:schemeClr val="tx1"/>
+          </a:fontRef>
+        </p:style>
+      </p:cxnSp>
+      <p:cxnSp>
+        <p:nvCxnSpPr>
+          <p:cNvPr id="42" name="Straight Connector 41"/>
+          <p:cNvCxnSpPr/>
+          <p:nvPr/>
+        </p:nvCxnSpPr>
+        <p:spPr>
+          <a:xfrm flipV="1">
+            <a:off x="11299079" y="7987533"/>
+            <a:ext cx="212149" cy="685376"/>
+          </a:xfrm>
+          <a:prstGeom prst="line">
+            <a:avLst/>
+          </a:prstGeom>
+          <a:ln w="19050">
+            <a:solidFill>
+              <a:schemeClr val="tx1"/>
+            </a:solidFill>
+          </a:ln>
+        </p:spPr>
+        <p:style>
+          <a:lnRef idx="1">
+            <a:schemeClr val="accent1"/>
+          </a:lnRef>
+          <a:fillRef idx="0">
+            <a:schemeClr val="accent1"/>
+          </a:fillRef>
+          <a:effectRef idx="0">
+            <a:schemeClr val="accent1"/>
+          </a:effectRef>
+          <a:fontRef idx="minor">
+            <a:schemeClr val="tx1"/>
+          </a:fontRef>
+        </p:style>
+      </p:cxnSp>
+      <p:grpSp>
+        <p:nvGrpSpPr>
+          <p:cNvPr id="57" name="Group 56"/>
+          <p:cNvGrpSpPr/>
+          <p:nvPr/>
+        </p:nvGrpSpPr>
+        <p:grpSpPr>
+          <a:xfrm>
+            <a:off x="940363" y="14022853"/>
+            <a:ext cx="1113860" cy="534087"/>
+            <a:chOff x="559492" y="9619042"/>
+            <a:chExt cx="1113860" cy="534087"/>
+          </a:xfrm>
+        </p:grpSpPr>
+        <p:grpSp>
+          <p:nvGrpSpPr>
+            <p:cNvPr id="144" name="Group 143"/>
+            <p:cNvGrpSpPr/>
+            <p:nvPr/>
+          </p:nvGrpSpPr>
+          <p:grpSpPr>
+            <a:xfrm>
+              <a:off x="559492" y="9619042"/>
+              <a:ext cx="1113860" cy="534087"/>
+              <a:chOff x="5367366" y="818945"/>
+              <a:chExt cx="1834804" cy="636520"/>
+            </a:xfrm>
+          </p:grpSpPr>
+          <p:sp>
+            <p:nvSpPr>
+              <p:cNvPr id="145" name="Oval 144"/>
+              <p:cNvSpPr/>
+              <p:nvPr/>
+            </p:nvSpPr>
+            <p:spPr>
+              <a:xfrm>
+                <a:off x="5367366" y="876525"/>
+                <a:ext cx="1682712" cy="578940"/>
+              </a:xfrm>
+              <a:prstGeom prst="ellipse">
+                <a:avLst/>
+              </a:prstGeom>
+              <a:noFill/>
+              <a:ln w="20320">
+                <a:solidFill>
+                  <a:schemeClr val="tx1"/>
+                </a:solidFill>
+              </a:ln>
+            </p:spPr>
+            <p:style>
+              <a:lnRef idx="2">
+                <a:schemeClr val="accent1">
+                  <a:shade val="50000"/>
+                </a:schemeClr>
+              </a:lnRef>
+              <a:fillRef idx="1">
+                <a:schemeClr val="accent1"/>
+              </a:fillRef>
+              <a:effectRef idx="0">
+                <a:schemeClr val="accent1"/>
+              </a:effectRef>
+              <a:fontRef idx="minor">
+                <a:schemeClr val="lt1"/>
+              </a:fontRef>
+            </p:style>
+            <p:txBody>
+              <a:bodyPr rot="0" spcFirstLastPara="0" vertOverflow="overflow" horzOverflow="overflow" vert="horz" wrap="square" lIns="91440" tIns="45720" rIns="91440" bIns="45720" numCol="1" spcCol="0" rtlCol="0" fromWordArt="0" anchor="ctr" anchorCtr="0" forceAA="0" compatLnSpc="1">
+                <a:prstTxWarp prst="textNoShape">
+                  <a:avLst/>
+                </a:prstTxWarp>
+                <a:noAutofit/>
+              </a:bodyPr>
+              <a:lstStyle/>
+              <a:p>
+                <a:pPr algn="ctr"/>
+                <a:endParaRPr lang="en-US" sz="2115" dirty="0"/>
+              </a:p>
+            </p:txBody>
+          </p:sp>
+          <p:sp>
+            <p:nvSpPr>
+              <p:cNvPr id="149" name="TextBox 148"/>
+              <p:cNvSpPr txBox="1"/>
+              <p:nvPr/>
+            </p:nvSpPr>
+            <p:spPr>
+              <a:xfrm>
+                <a:off x="5655419" y="818945"/>
+                <a:ext cx="1546751" cy="497936"/>
+              </a:xfrm>
+              <a:prstGeom prst="rect">
+                <a:avLst/>
+              </a:prstGeom>
+              <a:noFill/>
+            </p:spPr>
+            <p:txBody>
+              <a:bodyPr wrap="square" rtlCol="0">
+                <a:spAutoFit/>
+              </a:bodyPr>
+              <a:lstStyle/>
+              <a:p>
+                <a:r>
+                  <a:rPr lang="es-ES" sz="2115" dirty="0" smtClean="0"/>
+                  <a:t>time</a:t>
+                </a:r>
+                <a:endParaRPr lang="en-US" sz="2115" dirty="0"/>
+              </a:p>
+            </p:txBody>
+          </p:sp>
+        </p:grpSp>
+        <p:cxnSp>
+          <p:nvCxnSpPr>
+            <p:cNvPr id="151" name="Straight Connector 150"/>
+            <p:cNvCxnSpPr/>
+            <p:nvPr/>
+          </p:nvCxnSpPr>
+          <p:spPr>
+            <a:xfrm>
+              <a:off x="795528" y="9990827"/>
+              <a:ext cx="557784" cy="0"/>
+            </a:xfrm>
+            <a:prstGeom prst="line">
+              <a:avLst/>
+            </a:prstGeom>
+            <a:ln w="15875">
+              <a:solidFill>
+                <a:schemeClr val="tx1"/>
+              </a:solidFill>
+              <a:prstDash val="lgDash"/>
+            </a:ln>
+          </p:spPr>
+          <p:style>
+            <a:lnRef idx="1">
+              <a:schemeClr val="accent1"/>
+            </a:lnRef>
+            <a:fillRef idx="0">
+              <a:schemeClr val="accent1"/>
+            </a:fillRef>
+            <a:effectRef idx="0">
+              <a:schemeClr val="accent1"/>
+            </a:effectRef>
+            <a:fontRef idx="minor">
+              <a:schemeClr val="tx1"/>
+            </a:fontRef>
+          </p:style>
+        </p:cxnSp>
+      </p:grpSp>
+      <p:cxnSp>
+        <p:nvCxnSpPr>
+          <p:cNvPr id="59" name="Straight Connector 58"/>
+          <p:cNvCxnSpPr/>
+          <p:nvPr/>
+        </p:nvCxnSpPr>
+        <p:spPr>
+          <a:xfrm flipV="1">
+            <a:off x="1968916" y="14298597"/>
+            <a:ext cx="337684" cy="15456"/>
+          </a:xfrm>
+          <a:prstGeom prst="line">
+            <a:avLst/>
+          </a:prstGeom>
+          <a:ln w="19050"/>
+        </p:spPr>
+        <p:style>
+          <a:lnRef idx="1">
+            <a:schemeClr val="dk1"/>
+          </a:lnRef>
+          <a:fillRef idx="0">
+            <a:schemeClr val="dk1"/>
+          </a:fillRef>
+          <a:effectRef idx="0">
+            <a:schemeClr val="dk1"/>
+          </a:effectRef>
+          <a:fontRef idx="minor">
+            <a:schemeClr val="tx1"/>
+          </a:fontRef>
+        </p:style>
+      </p:cxnSp>
+      <p:grpSp>
+        <p:nvGrpSpPr>
+          <p:cNvPr id="153" name="Group 152"/>
+          <p:cNvGrpSpPr/>
+          <p:nvPr/>
+        </p:nvGrpSpPr>
+        <p:grpSpPr>
+          <a:xfrm>
+            <a:off x="5942140" y="13653025"/>
+            <a:ext cx="888898" cy="500451"/>
+            <a:chOff x="559493" y="9652678"/>
+            <a:chExt cx="1051424" cy="500451"/>
+          </a:xfrm>
+        </p:grpSpPr>
+        <p:grpSp>
+          <p:nvGrpSpPr>
+            <p:cNvPr id="154" name="Group 153"/>
+            <p:cNvGrpSpPr/>
+            <p:nvPr/>
+          </p:nvGrpSpPr>
+          <p:grpSpPr>
+            <a:xfrm>
+              <a:off x="559493" y="9652678"/>
+              <a:ext cx="1051424" cy="500451"/>
+              <a:chOff x="5367366" y="859032"/>
+              <a:chExt cx="1731956" cy="596433"/>
+            </a:xfrm>
+          </p:grpSpPr>
+          <p:sp>
+            <p:nvSpPr>
+              <p:cNvPr id="156" name="Oval 155"/>
+              <p:cNvSpPr/>
+              <p:nvPr/>
+            </p:nvSpPr>
+            <p:spPr>
+              <a:xfrm>
+                <a:off x="5367366" y="876525"/>
+                <a:ext cx="1682712" cy="578940"/>
+              </a:xfrm>
+              <a:prstGeom prst="ellipse">
+                <a:avLst/>
+              </a:prstGeom>
+              <a:noFill/>
+              <a:ln w="20320">
+                <a:solidFill>
+                  <a:schemeClr val="tx1"/>
+                </a:solidFill>
+              </a:ln>
+            </p:spPr>
+            <p:style>
+              <a:lnRef idx="2">
+                <a:schemeClr val="accent1">
+                  <a:shade val="50000"/>
+                </a:schemeClr>
+              </a:lnRef>
+              <a:fillRef idx="1">
+                <a:schemeClr val="accent1"/>
+              </a:fillRef>
+              <a:effectRef idx="0">
+                <a:schemeClr val="accent1"/>
+              </a:effectRef>
+              <a:fontRef idx="minor">
+                <a:schemeClr val="lt1"/>
+              </a:fontRef>
+            </p:style>
+            <p:txBody>
+              <a:bodyPr rot="0" spcFirstLastPara="0" vertOverflow="overflow" horzOverflow="overflow" vert="horz" wrap="square" lIns="91440" tIns="45720" rIns="91440" bIns="45720" numCol="1" spcCol="0" rtlCol="0" fromWordArt="0" anchor="ctr" anchorCtr="0" forceAA="0" compatLnSpc="1">
+                <a:prstTxWarp prst="textNoShape">
+                  <a:avLst/>
+                </a:prstTxWarp>
+                <a:noAutofit/>
+              </a:bodyPr>
+              <a:lstStyle/>
+              <a:p>
+                <a:pPr algn="ctr"/>
+                <a:endParaRPr lang="en-US" sz="2115" dirty="0"/>
+              </a:p>
+            </p:txBody>
+          </p:sp>
+          <p:sp>
+            <p:nvSpPr>
+              <p:cNvPr id="157" name="TextBox 156"/>
+              <p:cNvSpPr txBox="1"/>
+              <p:nvPr/>
+            </p:nvSpPr>
+            <p:spPr>
+              <a:xfrm>
+                <a:off x="5552570" y="859032"/>
+                <a:ext cx="1546752" cy="497937"/>
+              </a:xfrm>
+              <a:prstGeom prst="rect">
+                <a:avLst/>
+              </a:prstGeom>
+              <a:noFill/>
+            </p:spPr>
+            <p:txBody>
+              <a:bodyPr wrap="square" rtlCol="0">
+                <a:spAutoFit/>
+              </a:bodyPr>
+              <a:lstStyle/>
+              <a:p>
+                <a:r>
+                  <a:rPr lang="es-ES" sz="2115" dirty="0" smtClean="0"/>
+                  <a:t>time</a:t>
+                </a:r>
+                <a:endParaRPr lang="en-US" sz="2115" dirty="0"/>
+              </a:p>
+            </p:txBody>
+          </p:sp>
+        </p:grpSp>
+        <p:cxnSp>
+          <p:nvCxnSpPr>
+            <p:cNvPr id="155" name="Straight Connector 154"/>
+            <p:cNvCxnSpPr/>
+            <p:nvPr/>
+          </p:nvCxnSpPr>
+          <p:spPr>
+            <a:xfrm>
+              <a:off x="785511" y="10016227"/>
+              <a:ext cx="557783" cy="0"/>
+            </a:xfrm>
+            <a:prstGeom prst="line">
+              <a:avLst/>
+            </a:prstGeom>
+            <a:ln w="15875">
+              <a:solidFill>
+                <a:schemeClr val="tx1"/>
+              </a:solidFill>
+              <a:prstDash val="lgDash"/>
+            </a:ln>
+          </p:spPr>
+          <p:style>
+            <a:lnRef idx="1">
+              <a:schemeClr val="accent1"/>
+            </a:lnRef>
+            <a:fillRef idx="0">
+              <a:schemeClr val="accent1"/>
+            </a:fillRef>
+            <a:effectRef idx="0">
+              <a:schemeClr val="accent1"/>
+            </a:effectRef>
+            <a:fontRef idx="minor">
+              <a:schemeClr val="tx1"/>
+            </a:fontRef>
+          </p:style>
+        </p:cxnSp>
+      </p:grpSp>
+      <p:grpSp>
+        <p:nvGrpSpPr>
+          <p:cNvPr id="158" name="Group 157"/>
+          <p:cNvGrpSpPr/>
+          <p:nvPr/>
+        </p:nvGrpSpPr>
+        <p:grpSpPr>
+          <a:xfrm>
+            <a:off x="6003746" y="14278047"/>
+            <a:ext cx="897463" cy="514837"/>
+            <a:chOff x="559491" y="9638292"/>
+            <a:chExt cx="1021529" cy="514837"/>
+          </a:xfrm>
+        </p:grpSpPr>
+        <p:grpSp>
+          <p:nvGrpSpPr>
+            <p:cNvPr id="159" name="Group 158"/>
+            <p:cNvGrpSpPr/>
+            <p:nvPr/>
+          </p:nvGrpSpPr>
+          <p:grpSpPr>
+            <a:xfrm>
+              <a:off x="559491" y="9638292"/>
+              <a:ext cx="1021529" cy="514837"/>
+              <a:chOff x="5367366" y="841887"/>
+              <a:chExt cx="1682712" cy="613578"/>
+            </a:xfrm>
+          </p:grpSpPr>
+          <p:sp>
+            <p:nvSpPr>
+              <p:cNvPr id="162" name="Oval 161"/>
+              <p:cNvSpPr/>
+              <p:nvPr/>
+            </p:nvSpPr>
+            <p:spPr>
+              <a:xfrm>
+                <a:off x="5367366" y="876525"/>
+                <a:ext cx="1682712" cy="578940"/>
+              </a:xfrm>
+              <a:prstGeom prst="ellipse">
+                <a:avLst/>
+              </a:prstGeom>
+              <a:noFill/>
+              <a:ln w="20320">
+                <a:solidFill>
+                  <a:schemeClr val="tx1"/>
+                </a:solidFill>
+              </a:ln>
+            </p:spPr>
+            <p:style>
+              <a:lnRef idx="2">
+                <a:schemeClr val="accent1">
+                  <a:shade val="50000"/>
+                </a:schemeClr>
+              </a:lnRef>
+              <a:fillRef idx="1">
+                <a:schemeClr val="accent1"/>
+              </a:fillRef>
+              <a:effectRef idx="0">
+                <a:schemeClr val="accent1"/>
+              </a:effectRef>
+              <a:fontRef idx="minor">
+                <a:schemeClr val="lt1"/>
+              </a:fontRef>
+            </p:style>
+            <p:txBody>
+              <a:bodyPr rot="0" spcFirstLastPara="0" vertOverflow="overflow" horzOverflow="overflow" vert="horz" wrap="square" lIns="91440" tIns="45720" rIns="91440" bIns="45720" numCol="1" spcCol="0" rtlCol="0" fromWordArt="0" anchor="ctr" anchorCtr="0" forceAA="0" compatLnSpc="1">
+                <a:prstTxWarp prst="textNoShape">
+                  <a:avLst/>
+                </a:prstTxWarp>
+                <a:noAutofit/>
+              </a:bodyPr>
+              <a:lstStyle/>
+              <a:p>
+                <a:pPr algn="ctr"/>
+                <a:endParaRPr lang="en-US" sz="2115" dirty="0"/>
+              </a:p>
+            </p:txBody>
+          </p:sp>
+          <p:sp>
+            <p:nvSpPr>
+              <p:cNvPr id="163" name="TextBox 162"/>
+              <p:cNvSpPr txBox="1"/>
+              <p:nvPr/>
+            </p:nvSpPr>
+            <p:spPr>
+              <a:xfrm>
+                <a:off x="5487399" y="841887"/>
+                <a:ext cx="1546751" cy="497936"/>
+              </a:xfrm>
+              <a:prstGeom prst="rect">
+                <a:avLst/>
+              </a:prstGeom>
+              <a:noFill/>
+            </p:spPr>
+            <p:txBody>
+              <a:bodyPr wrap="square" rtlCol="0">
+                <a:spAutoFit/>
+              </a:bodyPr>
+              <a:lstStyle/>
+              <a:p>
+                <a:r>
+                  <a:rPr lang="es-ES" sz="2115" dirty="0" smtClean="0"/>
+                  <a:t>value</a:t>
+                </a:r>
+                <a:endParaRPr lang="en-US" sz="2115" dirty="0"/>
+              </a:p>
+            </p:txBody>
+          </p:sp>
+        </p:grpSp>
+        <p:cxnSp>
+          <p:nvCxnSpPr>
+            <p:cNvPr id="161" name="Straight Connector 160"/>
+            <p:cNvCxnSpPr/>
+            <p:nvPr/>
+          </p:nvCxnSpPr>
+          <p:spPr>
+            <a:xfrm>
+              <a:off x="776278" y="9990827"/>
+              <a:ext cx="557784" cy="0"/>
+            </a:xfrm>
+            <a:prstGeom prst="line">
+              <a:avLst/>
+            </a:prstGeom>
+            <a:ln w="15875">
+              <a:solidFill>
+                <a:schemeClr val="tx1"/>
+              </a:solidFill>
+              <a:prstDash val="lgDash"/>
+            </a:ln>
+          </p:spPr>
+          <p:style>
+            <a:lnRef idx="1">
+              <a:schemeClr val="accent1"/>
+            </a:lnRef>
+            <a:fillRef idx="0">
+              <a:schemeClr val="accent1"/>
+            </a:fillRef>
+            <a:effectRef idx="0">
+              <a:schemeClr val="accent1"/>
+            </a:effectRef>
+            <a:fontRef idx="minor">
+              <a:schemeClr val="tx1"/>
+            </a:fontRef>
+          </p:style>
+        </p:cxnSp>
+      </p:grpSp>
+      <p:cxnSp>
+        <p:nvCxnSpPr>
+          <p:cNvPr id="76" name="Straight Connector 75"/>
+          <p:cNvCxnSpPr>
+            <a:endCxn id="156" idx="3"/>
+          </p:cNvCxnSpPr>
+          <p:nvPr/>
+        </p:nvCxnSpPr>
+        <p:spPr>
+          <a:xfrm flipV="1">
+            <a:off x="5698067" y="14082336"/>
+            <a:ext cx="370548" cy="71140"/>
+          </a:xfrm>
+          <a:prstGeom prst="line">
+            <a:avLst/>
+          </a:prstGeom>
+          <a:ln w="19050"/>
+        </p:spPr>
+        <p:style>
+          <a:lnRef idx="1">
+            <a:schemeClr val="dk1"/>
+          </a:lnRef>
+          <a:fillRef idx="0">
+            <a:schemeClr val="dk1"/>
+          </a:fillRef>
+          <a:effectRef idx="0">
+            <a:schemeClr val="dk1"/>
+          </a:effectRef>
+          <a:fontRef idx="minor">
+            <a:schemeClr val="tx1"/>
+          </a:fontRef>
+        </p:style>
+      </p:cxnSp>
+      <p:cxnSp>
+        <p:nvCxnSpPr>
+          <p:cNvPr id="82" name="Straight Connector 81"/>
+          <p:cNvCxnSpPr/>
+          <p:nvPr/>
+        </p:nvCxnSpPr>
+        <p:spPr>
+          <a:xfrm>
+            <a:off x="5688494" y="14382730"/>
+            <a:ext cx="315252" cy="132071"/>
+          </a:xfrm>
+          <a:prstGeom prst="line">
+            <a:avLst/>
+          </a:prstGeom>
+          <a:ln w="19050">
+            <a:solidFill>
+              <a:schemeClr val="tx1"/>
+            </a:solidFill>
+          </a:ln>
+        </p:spPr>
+        <p:style>
+          <a:lnRef idx="1">
+            <a:schemeClr val="accent1"/>
+          </a:lnRef>
+          <a:fillRef idx="0">
+            <a:schemeClr val="accent1"/>
+          </a:fillRef>
+          <a:effectRef idx="0">
+            <a:schemeClr val="accent1"/>
+          </a:effectRef>
+          <a:fontRef idx="minor">
+            <a:schemeClr val="tx1"/>
+          </a:fontRef>
+        </p:style>
+      </p:cxnSp>
+      <p:grpSp>
+        <p:nvGrpSpPr>
+          <p:cNvPr id="182" name="Group 181"/>
+          <p:cNvGrpSpPr/>
+          <p:nvPr/>
+        </p:nvGrpSpPr>
+        <p:grpSpPr>
+          <a:xfrm>
+            <a:off x="3801234" y="17239109"/>
+            <a:ext cx="897463" cy="514837"/>
+            <a:chOff x="559491" y="9638292"/>
+            <a:chExt cx="1021529" cy="514837"/>
+          </a:xfrm>
+        </p:grpSpPr>
+        <p:grpSp>
+          <p:nvGrpSpPr>
+            <p:cNvPr id="183" name="Group 182"/>
+            <p:cNvGrpSpPr/>
+            <p:nvPr/>
+          </p:nvGrpSpPr>
+          <p:grpSpPr>
+            <a:xfrm>
+              <a:off x="559491" y="9638292"/>
+              <a:ext cx="1021529" cy="514837"/>
+              <a:chOff x="5367366" y="841887"/>
+              <a:chExt cx="1682712" cy="613578"/>
+            </a:xfrm>
+          </p:grpSpPr>
+          <p:sp>
+            <p:nvSpPr>
+              <p:cNvPr id="185" name="Oval 184"/>
+              <p:cNvSpPr/>
+              <p:nvPr/>
+            </p:nvSpPr>
+            <p:spPr>
+              <a:xfrm>
+                <a:off x="5367366" y="876525"/>
+                <a:ext cx="1682712" cy="578940"/>
+              </a:xfrm>
+              <a:prstGeom prst="ellipse">
+                <a:avLst/>
+              </a:prstGeom>
+              <a:noFill/>
+              <a:ln w="20320">
+                <a:solidFill>
+                  <a:schemeClr val="tx1"/>
+                </a:solidFill>
+              </a:ln>
+            </p:spPr>
+            <p:style>
+              <a:lnRef idx="2">
+                <a:schemeClr val="accent1">
+                  <a:shade val="50000"/>
+                </a:schemeClr>
+              </a:lnRef>
+              <a:fillRef idx="1">
+                <a:schemeClr val="accent1"/>
+              </a:fillRef>
+              <a:effectRef idx="0">
+                <a:schemeClr val="accent1"/>
+              </a:effectRef>
+              <a:fontRef idx="minor">
+                <a:schemeClr val="lt1"/>
+              </a:fontRef>
+            </p:style>
+            <p:txBody>
+              <a:bodyPr rot="0" spcFirstLastPara="0" vertOverflow="overflow" horzOverflow="overflow" vert="horz" wrap="square" lIns="91440" tIns="45720" rIns="91440" bIns="45720" numCol="1" spcCol="0" rtlCol="0" fromWordArt="0" anchor="ctr" anchorCtr="0" forceAA="0" compatLnSpc="1">
+                <a:prstTxWarp prst="textNoShape">
+                  <a:avLst/>
+                </a:prstTxWarp>
+                <a:noAutofit/>
+              </a:bodyPr>
+              <a:lstStyle/>
+              <a:p>
+                <a:pPr algn="ctr"/>
+                <a:endParaRPr lang="en-US" sz="2115" dirty="0"/>
+              </a:p>
+            </p:txBody>
+          </p:sp>
+          <p:sp>
+            <p:nvSpPr>
+              <p:cNvPr id="186" name="TextBox 185"/>
+              <p:cNvSpPr txBox="1"/>
+              <p:nvPr/>
+            </p:nvSpPr>
+            <p:spPr>
+              <a:xfrm>
+                <a:off x="5487399" y="841887"/>
+                <a:ext cx="1546751" cy="497936"/>
+              </a:xfrm>
+              <a:prstGeom prst="rect">
+                <a:avLst/>
+              </a:prstGeom>
+              <a:noFill/>
+            </p:spPr>
+            <p:txBody>
+              <a:bodyPr wrap="square" rtlCol="0">
+                <a:spAutoFit/>
+              </a:bodyPr>
+              <a:lstStyle/>
+              <a:p>
+                <a:r>
+                  <a:rPr lang="es-ES" sz="2115" dirty="0" smtClean="0"/>
+                  <a:t>value</a:t>
+                </a:r>
+                <a:endParaRPr lang="en-US" sz="2115" dirty="0"/>
+              </a:p>
+            </p:txBody>
+          </p:sp>
+        </p:grpSp>
+        <p:cxnSp>
+          <p:nvCxnSpPr>
+            <p:cNvPr id="184" name="Straight Connector 183"/>
+            <p:cNvCxnSpPr/>
+            <p:nvPr/>
+          </p:nvCxnSpPr>
+          <p:spPr>
+            <a:xfrm>
+              <a:off x="776278" y="9990827"/>
+              <a:ext cx="557784" cy="0"/>
+            </a:xfrm>
+            <a:prstGeom prst="line">
+              <a:avLst/>
+            </a:prstGeom>
+            <a:ln w="15875">
+              <a:solidFill>
+                <a:schemeClr val="tx1"/>
+              </a:solidFill>
+              <a:prstDash val="lgDash"/>
+            </a:ln>
+          </p:spPr>
+          <p:style>
+            <a:lnRef idx="1">
+              <a:schemeClr val="accent1"/>
+            </a:lnRef>
+            <a:fillRef idx="0">
+              <a:schemeClr val="accent1"/>
+            </a:fillRef>
+            <a:effectRef idx="0">
+              <a:schemeClr val="accent1"/>
+            </a:effectRef>
+            <a:fontRef idx="minor">
+              <a:schemeClr val="tx1"/>
+            </a:fontRef>
+          </p:style>
+        </p:cxnSp>
+      </p:grpSp>
+      <p:grpSp>
+        <p:nvGrpSpPr>
+          <p:cNvPr id="187" name="Group 186"/>
+          <p:cNvGrpSpPr/>
+          <p:nvPr/>
+        </p:nvGrpSpPr>
+        <p:grpSpPr>
+          <a:xfrm>
+            <a:off x="1040850" y="17237178"/>
+            <a:ext cx="1054477" cy="743280"/>
+            <a:chOff x="559493" y="9652678"/>
+            <a:chExt cx="1051424" cy="743280"/>
+          </a:xfrm>
+        </p:grpSpPr>
+        <p:grpSp>
+          <p:nvGrpSpPr>
+            <p:cNvPr id="188" name="Group 187"/>
+            <p:cNvGrpSpPr/>
+            <p:nvPr/>
+          </p:nvGrpSpPr>
+          <p:grpSpPr>
+            <a:xfrm>
+              <a:off x="559493" y="9652678"/>
+              <a:ext cx="1051424" cy="743280"/>
+              <a:chOff x="5367366" y="859032"/>
+              <a:chExt cx="1731956" cy="885834"/>
+            </a:xfrm>
+          </p:grpSpPr>
+          <p:sp>
+            <p:nvSpPr>
+              <p:cNvPr id="190" name="Oval 189"/>
+              <p:cNvSpPr/>
+              <p:nvPr/>
+            </p:nvSpPr>
+            <p:spPr>
+              <a:xfrm>
+                <a:off x="5367366" y="876525"/>
+                <a:ext cx="1682712" cy="578940"/>
+              </a:xfrm>
+              <a:prstGeom prst="ellipse">
+                <a:avLst/>
+              </a:prstGeom>
+              <a:noFill/>
+              <a:ln w="20320">
+                <a:solidFill>
+                  <a:schemeClr val="tx1"/>
+                </a:solidFill>
+              </a:ln>
+            </p:spPr>
+            <p:style>
+              <a:lnRef idx="2">
+                <a:schemeClr val="accent1">
+                  <a:shade val="50000"/>
+                </a:schemeClr>
+              </a:lnRef>
+              <a:fillRef idx="1">
+                <a:schemeClr val="accent1"/>
+              </a:fillRef>
+              <a:effectRef idx="0">
+                <a:schemeClr val="accent1"/>
+              </a:effectRef>
+              <a:fontRef idx="minor">
+                <a:schemeClr val="lt1"/>
+              </a:fontRef>
+            </p:style>
+            <p:txBody>
+              <a:bodyPr rot="0" spcFirstLastPara="0" vertOverflow="overflow" horzOverflow="overflow" vert="horz" wrap="square" lIns="91440" tIns="45720" rIns="91440" bIns="45720" numCol="1" spcCol="0" rtlCol="0" fromWordArt="0" anchor="ctr" anchorCtr="0" forceAA="0" compatLnSpc="1">
+                <a:prstTxWarp prst="textNoShape">
+                  <a:avLst/>
+                </a:prstTxWarp>
+                <a:noAutofit/>
+              </a:bodyPr>
+              <a:lstStyle/>
+              <a:p>
+                <a:pPr algn="ctr"/>
+                <a:endParaRPr lang="en-US" sz="2115" dirty="0"/>
+              </a:p>
+            </p:txBody>
+          </p:sp>
+          <p:sp>
+            <p:nvSpPr>
+              <p:cNvPr id="191" name="TextBox 190"/>
+              <p:cNvSpPr txBox="1"/>
+              <p:nvPr/>
+            </p:nvSpPr>
+            <p:spPr>
+              <a:xfrm>
+                <a:off x="5552570" y="859032"/>
+                <a:ext cx="1546752" cy="885834"/>
+              </a:xfrm>
+              <a:prstGeom prst="rect">
+                <a:avLst/>
+              </a:prstGeom>
+              <a:noFill/>
+            </p:spPr>
+            <p:txBody>
+              <a:bodyPr wrap="square" rtlCol="0">
+                <a:spAutoFit/>
+              </a:bodyPr>
+              <a:lstStyle/>
+              <a:p>
+                <a:r>
+                  <a:rPr lang="es-ES" sz="2115" dirty="0" smtClean="0"/>
+                  <a:t>name</a:t>
+                </a:r>
+                <a:endParaRPr lang="en-US" sz="2115" dirty="0"/>
+              </a:p>
+            </p:txBody>
+          </p:sp>
+        </p:grpSp>
+        <p:cxnSp>
+          <p:nvCxnSpPr>
+            <p:cNvPr id="189" name="Straight Connector 188"/>
+            <p:cNvCxnSpPr/>
+            <p:nvPr/>
+          </p:nvCxnSpPr>
+          <p:spPr>
+            <a:xfrm>
+              <a:off x="785511" y="10016227"/>
+              <a:ext cx="557783" cy="0"/>
+            </a:xfrm>
+            <a:prstGeom prst="line">
+              <a:avLst/>
+            </a:prstGeom>
+            <a:ln w="15875">
+              <a:solidFill>
+                <a:schemeClr val="tx1"/>
+              </a:solidFill>
+              <a:prstDash val="lgDash"/>
+            </a:ln>
+          </p:spPr>
+          <p:style>
+            <a:lnRef idx="1">
+              <a:schemeClr val="accent1"/>
+            </a:lnRef>
+            <a:fillRef idx="0">
+              <a:schemeClr val="accent1"/>
+            </a:fillRef>
+            <a:effectRef idx="0">
+              <a:schemeClr val="accent1"/>
+            </a:effectRef>
+            <a:fontRef idx="minor">
+              <a:schemeClr val="tx1"/>
+            </a:fontRef>
+          </p:style>
+        </p:cxnSp>
+      </p:grpSp>
+      <p:cxnSp>
+        <p:nvCxnSpPr>
+          <p:cNvPr id="195" name="Straight Connector 194"/>
+          <p:cNvCxnSpPr/>
+          <p:nvPr/>
+        </p:nvCxnSpPr>
+        <p:spPr>
+          <a:xfrm>
+            <a:off x="2065345" y="17494742"/>
+            <a:ext cx="245756" cy="0"/>
+          </a:xfrm>
+          <a:prstGeom prst="line">
+            <a:avLst/>
+          </a:prstGeom>
+          <a:ln w="19050"/>
+        </p:spPr>
+        <p:style>
+          <a:lnRef idx="1">
+            <a:schemeClr val="dk1"/>
+          </a:lnRef>
+          <a:fillRef idx="0">
+            <a:schemeClr val="dk1"/>
+          </a:fillRef>
+          <a:effectRef idx="0">
+            <a:schemeClr val="dk1"/>
+          </a:effectRef>
+          <a:fontRef idx="minor">
+            <a:schemeClr val="tx1"/>
+          </a:fontRef>
+        </p:style>
+      </p:cxnSp>
+      <p:cxnSp>
+        <p:nvCxnSpPr>
+          <p:cNvPr id="197" name="Straight Connector 196"/>
+          <p:cNvCxnSpPr/>
+          <p:nvPr/>
+        </p:nvCxnSpPr>
+        <p:spPr>
+          <a:xfrm>
+            <a:off x="3555478" y="17488859"/>
+            <a:ext cx="245756" cy="0"/>
+          </a:xfrm>
+          <a:prstGeom prst="line">
+            <a:avLst/>
+          </a:prstGeom>
+          <a:ln w="19050"/>
+        </p:spPr>
+        <p:style>
+          <a:lnRef idx="1">
+            <a:schemeClr val="dk1"/>
+          </a:lnRef>
+          <a:fillRef idx="0">
+            <a:schemeClr val="dk1"/>
+          </a:fillRef>
+          <a:effectRef idx="0">
+            <a:schemeClr val="dk1"/>
+          </a:effectRef>
+          <a:fontRef idx="minor">
+            <a:schemeClr val="tx1"/>
+          </a:fontRef>
+        </p:style>
+      </p:cxnSp>
+      <p:grpSp>
+        <p:nvGrpSpPr>
+          <p:cNvPr id="204" name="Group 203"/>
+          <p:cNvGrpSpPr/>
+          <p:nvPr/>
+        </p:nvGrpSpPr>
+        <p:grpSpPr>
+          <a:xfrm>
+            <a:off x="12792552" y="8353330"/>
+            <a:ext cx="2235900" cy="1071723"/>
+            <a:chOff x="77002" y="961721"/>
+            <a:chExt cx="2033245" cy="845077"/>
+          </a:xfrm>
+        </p:grpSpPr>
+        <p:grpSp>
+          <p:nvGrpSpPr>
+            <p:cNvPr id="205" name="Group 204"/>
+            <p:cNvGrpSpPr/>
+            <p:nvPr/>
+          </p:nvGrpSpPr>
+          <p:grpSpPr>
+            <a:xfrm>
+              <a:off x="77002" y="961721"/>
+              <a:ext cx="2033245" cy="845077"/>
+              <a:chOff x="5367366" y="876525"/>
+              <a:chExt cx="1682712" cy="848143"/>
+            </a:xfrm>
+          </p:grpSpPr>
+          <p:sp>
+            <p:nvSpPr>
+              <p:cNvPr id="207" name="Oval 206"/>
+              <p:cNvSpPr/>
+              <p:nvPr/>
+            </p:nvSpPr>
+            <p:spPr>
+              <a:xfrm>
+                <a:off x="5367366" y="876525"/>
+                <a:ext cx="1682712" cy="578940"/>
+              </a:xfrm>
+              <a:prstGeom prst="ellipse">
+                <a:avLst/>
+              </a:prstGeom>
+              <a:noFill/>
+              <a:ln w="20320">
+                <a:solidFill>
+                  <a:schemeClr val="tx1"/>
+                </a:solidFill>
+              </a:ln>
+            </p:spPr>
+            <p:style>
+              <a:lnRef idx="2">
+                <a:schemeClr val="accent1">
+                  <a:shade val="50000"/>
+                </a:schemeClr>
+              </a:lnRef>
+              <a:fillRef idx="1">
+                <a:schemeClr val="accent1"/>
+              </a:fillRef>
+              <a:effectRef idx="0">
+                <a:schemeClr val="accent1"/>
+              </a:effectRef>
+              <a:fontRef idx="minor">
+                <a:schemeClr val="lt1"/>
+              </a:fontRef>
+            </p:style>
+            <p:txBody>
+              <a:bodyPr rot="0" spcFirstLastPara="0" vertOverflow="overflow" horzOverflow="overflow" vert="horz" wrap="square" lIns="91440" tIns="45720" rIns="91440" bIns="45720" numCol="1" spcCol="0" rtlCol="0" fromWordArt="0" anchor="ctr" anchorCtr="0" forceAA="0" compatLnSpc="1">
+                <a:prstTxWarp prst="textNoShape">
+                  <a:avLst/>
+                </a:prstTxWarp>
+                <a:noAutofit/>
+              </a:bodyPr>
+              <a:lstStyle/>
+              <a:p>
+                <a:pPr algn="ctr"/>
+                <a:endParaRPr lang="en-US" sz="2115" dirty="0"/>
+              </a:p>
+            </p:txBody>
+          </p:sp>
+          <p:sp>
+            <p:nvSpPr>
+              <p:cNvPr id="208" name="TextBox 207"/>
+              <p:cNvSpPr txBox="1"/>
+              <p:nvPr/>
+            </p:nvSpPr>
+            <p:spPr>
+              <a:xfrm>
+                <a:off x="5471934" y="978689"/>
+                <a:ext cx="1546753" cy="745979"/>
+              </a:xfrm>
+              <a:prstGeom prst="rect">
+                <a:avLst/>
+              </a:prstGeom>
+              <a:noFill/>
+            </p:spPr>
+            <p:txBody>
+              <a:bodyPr wrap="square" rtlCol="0">
+                <a:spAutoFit/>
+              </a:bodyPr>
+              <a:lstStyle/>
+              <a:p>
+                <a:r>
+                  <a:rPr lang="es-ES" sz="2115" dirty="0"/>
+                  <a:t>h</a:t>
+                </a:r>
+                <a:r>
+                  <a:rPr lang="es-ES" sz="2115" dirty="0" smtClean="0"/>
+                  <a:t>igh_start_time</a:t>
+                </a:r>
+                <a:endParaRPr lang="en-US" sz="2115" dirty="0"/>
+              </a:p>
+            </p:txBody>
+          </p:sp>
+        </p:grpSp>
+        <p:cxnSp>
+          <p:nvCxnSpPr>
+            <p:cNvPr id="206" name="Straight Connector 205"/>
+            <p:cNvCxnSpPr/>
+            <p:nvPr/>
+          </p:nvCxnSpPr>
+          <p:spPr>
+            <a:xfrm>
+              <a:off x="372867" y="1386037"/>
+              <a:ext cx="1437289" cy="0"/>
+            </a:xfrm>
+            <a:prstGeom prst="line">
+              <a:avLst/>
+            </a:prstGeom>
+            <a:ln w="15875">
+              <a:solidFill>
+                <a:schemeClr val="tx1"/>
+              </a:solidFill>
+            </a:ln>
+          </p:spPr>
+          <p:style>
+            <a:lnRef idx="1">
+              <a:schemeClr val="accent1"/>
+            </a:lnRef>
+            <a:fillRef idx="0">
+              <a:schemeClr val="accent1"/>
+            </a:fillRef>
+            <a:effectRef idx="0">
+              <a:schemeClr val="accent1"/>
+            </a:effectRef>
+            <a:fontRef idx="minor">
+              <a:schemeClr val="tx1"/>
+            </a:fontRef>
+          </p:style>
+        </p:cxnSp>
+      </p:grpSp>
+      <p:grpSp>
+        <p:nvGrpSpPr>
+          <p:cNvPr id="209" name="Group 208"/>
+          <p:cNvGrpSpPr/>
+          <p:nvPr/>
+        </p:nvGrpSpPr>
+        <p:grpSpPr>
+          <a:xfrm>
+            <a:off x="14867463" y="7827002"/>
+            <a:ext cx="2176807" cy="731555"/>
+            <a:chOff x="77002" y="961721"/>
+            <a:chExt cx="2033245" cy="576847"/>
+          </a:xfrm>
+        </p:grpSpPr>
+        <p:grpSp>
+          <p:nvGrpSpPr>
+            <p:cNvPr id="210" name="Group 209"/>
+            <p:cNvGrpSpPr/>
+            <p:nvPr/>
+          </p:nvGrpSpPr>
+          <p:grpSpPr>
+            <a:xfrm>
+              <a:off x="77002" y="961721"/>
+              <a:ext cx="2033245" cy="576847"/>
+              <a:chOff x="5367366" y="876525"/>
+              <a:chExt cx="1682712" cy="578940"/>
+            </a:xfrm>
+          </p:grpSpPr>
+          <p:sp>
+            <p:nvSpPr>
+              <p:cNvPr id="212" name="Oval 211"/>
+              <p:cNvSpPr/>
+              <p:nvPr/>
+            </p:nvSpPr>
+            <p:spPr>
+              <a:xfrm>
+                <a:off x="5367366" y="876525"/>
+                <a:ext cx="1682712" cy="578940"/>
+              </a:xfrm>
+              <a:prstGeom prst="ellipse">
+                <a:avLst/>
+              </a:prstGeom>
+              <a:noFill/>
+              <a:ln w="20320">
+                <a:solidFill>
+                  <a:schemeClr val="tx1"/>
+                </a:solidFill>
+              </a:ln>
+            </p:spPr>
+            <p:style>
+              <a:lnRef idx="2">
+                <a:schemeClr val="accent1">
+                  <a:shade val="50000"/>
+                </a:schemeClr>
+              </a:lnRef>
+              <a:fillRef idx="1">
+                <a:schemeClr val="accent1"/>
+              </a:fillRef>
+              <a:effectRef idx="0">
+                <a:schemeClr val="accent1"/>
+              </a:effectRef>
+              <a:fontRef idx="minor">
+                <a:schemeClr val="lt1"/>
+              </a:fontRef>
+            </p:style>
+            <p:txBody>
+              <a:bodyPr rot="0" spcFirstLastPara="0" vertOverflow="overflow" horzOverflow="overflow" vert="horz" wrap="square" lIns="91440" tIns="45720" rIns="91440" bIns="45720" numCol="1" spcCol="0" rtlCol="0" fromWordArt="0" anchor="ctr" anchorCtr="0" forceAA="0" compatLnSpc="1">
+                <a:prstTxWarp prst="textNoShape">
+                  <a:avLst/>
+                </a:prstTxWarp>
+                <a:noAutofit/>
+              </a:bodyPr>
+              <a:lstStyle/>
+              <a:p>
+                <a:pPr algn="ctr"/>
+                <a:endParaRPr lang="en-US" sz="2115" dirty="0"/>
+              </a:p>
+            </p:txBody>
+          </p:sp>
+          <p:sp>
+            <p:nvSpPr>
+              <p:cNvPr id="213" name="TextBox 212"/>
+              <p:cNvSpPr txBox="1"/>
+              <p:nvPr/>
+            </p:nvSpPr>
+            <p:spPr>
+              <a:xfrm>
+                <a:off x="5471934" y="978689"/>
+                <a:ext cx="1546753" cy="330645"/>
+              </a:xfrm>
+              <a:prstGeom prst="rect">
+                <a:avLst/>
+              </a:prstGeom>
+              <a:noFill/>
+            </p:spPr>
+            <p:txBody>
+              <a:bodyPr wrap="square" rtlCol="0">
+                <a:spAutoFit/>
+              </a:bodyPr>
+              <a:lstStyle/>
+              <a:p>
+                <a:r>
+                  <a:rPr lang="es-ES" sz="2115" dirty="0" smtClean="0"/>
+                  <a:t>high_end_time</a:t>
+                </a:r>
+                <a:endParaRPr lang="en-US" sz="2115" dirty="0"/>
+              </a:p>
+            </p:txBody>
+          </p:sp>
+        </p:grpSp>
+        <p:cxnSp>
+          <p:nvCxnSpPr>
+            <p:cNvPr id="211" name="Straight Connector 210"/>
+            <p:cNvCxnSpPr/>
+            <p:nvPr/>
+          </p:nvCxnSpPr>
+          <p:spPr>
+            <a:xfrm>
+              <a:off x="372867" y="1386037"/>
+              <a:ext cx="1437289" cy="0"/>
+            </a:xfrm>
+            <a:prstGeom prst="line">
+              <a:avLst/>
+            </a:prstGeom>
+            <a:ln w="15875">
+              <a:solidFill>
+                <a:schemeClr val="tx1"/>
+              </a:solidFill>
+            </a:ln>
+          </p:spPr>
+          <p:style>
+            <a:lnRef idx="1">
+              <a:schemeClr val="accent1"/>
+            </a:lnRef>
+            <a:fillRef idx="0">
+              <a:schemeClr val="accent1"/>
+            </a:fillRef>
+            <a:effectRef idx="0">
+              <a:schemeClr val="accent1"/>
+            </a:effectRef>
+            <a:fontRef idx="minor">
+              <a:schemeClr val="tx1"/>
+            </a:fontRef>
+          </p:style>
+        </p:cxnSp>
+      </p:grpSp>
+      <p:cxnSp>
+        <p:nvCxnSpPr>
+          <p:cNvPr id="215" name="Straight Connector 214"/>
+          <p:cNvCxnSpPr/>
+          <p:nvPr/>
+        </p:nvCxnSpPr>
+        <p:spPr>
+          <a:xfrm>
+            <a:off x="14465180" y="9045768"/>
+            <a:ext cx="76200" cy="240975"/>
+          </a:xfrm>
+          <a:prstGeom prst="line">
+            <a:avLst/>
+          </a:prstGeom>
+          <a:ln w="19050">
+            <a:solidFill>
+              <a:schemeClr val="tx1"/>
+            </a:solidFill>
+          </a:ln>
+        </p:spPr>
+        <p:style>
+          <a:lnRef idx="1">
+            <a:schemeClr val="accent1"/>
+          </a:lnRef>
+          <a:fillRef idx="0">
+            <a:schemeClr val="accent1"/>
+          </a:fillRef>
+          <a:effectRef idx="0">
+            <a:schemeClr val="accent1"/>
+          </a:effectRef>
+          <a:fontRef idx="minor">
+            <a:schemeClr val="tx1"/>
+          </a:fontRef>
+        </p:style>
+      </p:cxnSp>
+      <p:cxnSp>
+        <p:nvCxnSpPr>
+          <p:cNvPr id="217" name="Straight Connector 216"/>
+          <p:cNvCxnSpPr/>
+          <p:nvPr/>
+        </p:nvCxnSpPr>
+        <p:spPr>
+          <a:xfrm flipH="1">
+            <a:off x="14957305" y="8542531"/>
+            <a:ext cx="625475" cy="744212"/>
+          </a:xfrm>
+          <a:prstGeom prst="line">
+            <a:avLst/>
+          </a:prstGeom>
+          <a:ln w="19050">
+            <a:solidFill>
+              <a:schemeClr val="tx1"/>
+            </a:solidFill>
+          </a:ln>
+        </p:spPr>
+        <p:style>
+          <a:lnRef idx="1">
+            <a:schemeClr val="accent1"/>
+          </a:lnRef>
+          <a:fillRef idx="0">
+            <a:schemeClr val="accent1"/>
+          </a:fillRef>
+          <a:effectRef idx="0">
+            <a:schemeClr val="accent1"/>
+          </a:effectRef>
+          <a:fontRef idx="minor">
+            <a:schemeClr val="tx1"/>
+          </a:fontRef>
+        </p:style>
+      </p:cxnSp>
+      <p:grpSp>
+        <p:nvGrpSpPr>
+          <p:cNvPr id="218" name="Group 217"/>
+          <p:cNvGrpSpPr/>
+          <p:nvPr/>
+        </p:nvGrpSpPr>
+        <p:grpSpPr>
+          <a:xfrm>
+            <a:off x="7021377" y="7337792"/>
+            <a:ext cx="1631032" cy="515715"/>
+            <a:chOff x="2531026" y="3974531"/>
+            <a:chExt cx="1751806" cy="515714"/>
+          </a:xfrm>
+        </p:grpSpPr>
+        <p:sp>
+          <p:nvSpPr>
+            <p:cNvPr id="219" name="Rectangle 218"/>
+            <p:cNvSpPr/>
+            <p:nvPr/>
+          </p:nvSpPr>
+          <p:spPr>
+            <a:xfrm>
+              <a:off x="2531026" y="3974531"/>
+              <a:ext cx="1751806" cy="515714"/>
+            </a:xfrm>
+            <a:prstGeom prst="rect">
+              <a:avLst/>
+            </a:prstGeom>
+            <a:noFill/>
+            <a:ln w="19050" cmpd="sng">
+              <a:solidFill>
+                <a:schemeClr val="tx1"/>
+              </a:solidFill>
+            </a:ln>
+          </p:spPr>
+          <p:style>
+            <a:lnRef idx="2">
+              <a:schemeClr val="accent1">
+                <a:shade val="50000"/>
+              </a:schemeClr>
+            </a:lnRef>
+            <a:fillRef idx="1">
+              <a:schemeClr val="accent1"/>
+            </a:fillRef>
+            <a:effectRef idx="0">
+              <a:schemeClr val="accent1"/>
+            </a:effectRef>
+            <a:fontRef idx="minor">
+              <a:schemeClr val="lt1"/>
+            </a:fontRef>
+          </p:style>
+          <p:txBody>
+            <a:bodyPr rtlCol="0" anchor="ctr"/>
+            <a:lstStyle/>
+            <a:p>
+              <a:pPr algn="ctr"/>
+              <a:endParaRPr lang="en-US" sz="2115" dirty="0"/>
+            </a:p>
+          </p:txBody>
+        </p:sp>
+        <p:sp>
+          <p:nvSpPr>
+            <p:cNvPr id="220" name="TextBox 219"/>
+            <p:cNvSpPr txBox="1"/>
+            <p:nvPr/>
+          </p:nvSpPr>
+          <p:spPr>
+            <a:xfrm>
+              <a:off x="2619869" y="4045934"/>
+              <a:ext cx="1543541" cy="417806"/>
+            </a:xfrm>
+            <a:prstGeom prst="rect">
+              <a:avLst/>
+            </a:prstGeom>
+            <a:noFill/>
+          </p:spPr>
+          <p:txBody>
+            <a:bodyPr wrap="none" rtlCol="0">
+              <a:spAutoFit/>
+            </a:bodyPr>
+            <a:lstStyle/>
+            <a:p>
+              <a:r>
+                <a:rPr lang="es-ES" sz="2115" dirty="0" smtClean="0"/>
+                <a:t>low</a:t>
+              </a:r>
+              <a:r>
+                <a:rPr lang="es-ES" sz="2115" dirty="0" smtClean="0"/>
+                <a:t>_period</a:t>
+              </a:r>
+              <a:endParaRPr lang="en-US" sz="2115" dirty="0"/>
+            </a:p>
+          </p:txBody>
+        </p:sp>
+      </p:grpSp>
+      <p:grpSp>
+        <p:nvGrpSpPr>
+          <p:cNvPr id="221" name="Group 220"/>
+          <p:cNvGrpSpPr/>
+          <p:nvPr/>
+        </p:nvGrpSpPr>
+        <p:grpSpPr>
+          <a:xfrm>
+            <a:off x="6582373" y="6376983"/>
+            <a:ext cx="1591657" cy="731555"/>
+            <a:chOff x="77004" y="961721"/>
+            <a:chExt cx="2047831" cy="576847"/>
+          </a:xfrm>
+        </p:grpSpPr>
+        <p:grpSp>
+          <p:nvGrpSpPr>
+            <p:cNvPr id="222" name="Group 221"/>
+            <p:cNvGrpSpPr/>
+            <p:nvPr/>
+          </p:nvGrpSpPr>
+          <p:grpSpPr>
+            <a:xfrm>
+              <a:off x="77004" y="961721"/>
+              <a:ext cx="2047831" cy="576847"/>
+              <a:chOff x="5367366" y="876525"/>
+              <a:chExt cx="1694783" cy="578940"/>
+            </a:xfrm>
+          </p:grpSpPr>
+          <p:sp>
+            <p:nvSpPr>
+              <p:cNvPr id="224" name="Oval 223"/>
+              <p:cNvSpPr/>
+              <p:nvPr/>
+            </p:nvSpPr>
+            <p:spPr>
+              <a:xfrm>
+                <a:off x="5367366" y="876525"/>
+                <a:ext cx="1682712" cy="578940"/>
+              </a:xfrm>
+              <a:prstGeom prst="ellipse">
+                <a:avLst/>
+              </a:prstGeom>
+              <a:noFill/>
+              <a:ln w="20320">
+                <a:solidFill>
+                  <a:schemeClr val="tx1"/>
+                </a:solidFill>
+              </a:ln>
+            </p:spPr>
+            <p:style>
+              <a:lnRef idx="2">
+                <a:schemeClr val="accent1">
+                  <a:shade val="50000"/>
+                </a:schemeClr>
+              </a:lnRef>
+              <a:fillRef idx="1">
+                <a:schemeClr val="accent1"/>
+              </a:fillRef>
+              <a:effectRef idx="0">
+                <a:schemeClr val="accent1"/>
+              </a:effectRef>
+              <a:fontRef idx="minor">
+                <a:schemeClr val="lt1"/>
+              </a:fontRef>
+            </p:style>
+            <p:txBody>
+              <a:bodyPr rot="0" spcFirstLastPara="0" vertOverflow="overflow" horzOverflow="overflow" vert="horz" wrap="square" lIns="91440" tIns="45720" rIns="91440" bIns="45720" numCol="1" spcCol="0" rtlCol="0" fromWordArt="0" anchor="ctr" anchorCtr="0" forceAA="0" compatLnSpc="1">
+                <a:prstTxWarp prst="textNoShape">
+                  <a:avLst/>
+                </a:prstTxWarp>
+                <a:noAutofit/>
+              </a:bodyPr>
+              <a:lstStyle/>
+              <a:p>
+                <a:pPr algn="ctr"/>
+                <a:endParaRPr lang="en-US" sz="2115" dirty="0"/>
+              </a:p>
+            </p:txBody>
+          </p:sp>
+          <p:sp>
+            <p:nvSpPr>
+              <p:cNvPr id="225" name="TextBox 224"/>
+              <p:cNvSpPr txBox="1"/>
+              <p:nvPr/>
+            </p:nvSpPr>
+            <p:spPr>
+              <a:xfrm>
+                <a:off x="5515396" y="978689"/>
+                <a:ext cx="1546753" cy="330645"/>
+              </a:xfrm>
+              <a:prstGeom prst="rect">
+                <a:avLst/>
+              </a:prstGeom>
+              <a:noFill/>
+            </p:spPr>
+            <p:txBody>
+              <a:bodyPr wrap="square" rtlCol="0">
+                <a:spAutoFit/>
+              </a:bodyPr>
+              <a:lstStyle/>
+              <a:p>
+                <a:r>
+                  <a:rPr lang="es-ES" sz="2115" dirty="0" smtClean="0"/>
+                  <a:t>start_time</a:t>
+                </a:r>
+                <a:endParaRPr lang="en-US" sz="2115" dirty="0"/>
+              </a:p>
+            </p:txBody>
+          </p:sp>
+        </p:grpSp>
+        <p:cxnSp>
+          <p:nvCxnSpPr>
+            <p:cNvPr id="223" name="Straight Connector 222"/>
+            <p:cNvCxnSpPr/>
+            <p:nvPr/>
+          </p:nvCxnSpPr>
+          <p:spPr>
+            <a:xfrm>
+              <a:off x="348102" y="1378448"/>
+              <a:ext cx="1429228" cy="6929"/>
+            </a:xfrm>
+            <a:prstGeom prst="line">
+              <a:avLst/>
+            </a:prstGeom>
+            <a:ln w="15875">
+              <a:solidFill>
+                <a:schemeClr val="tx1"/>
+              </a:solidFill>
+            </a:ln>
+          </p:spPr>
+          <p:style>
+            <a:lnRef idx="1">
+              <a:schemeClr val="accent1"/>
+            </a:lnRef>
+            <a:fillRef idx="0">
+              <a:schemeClr val="accent1"/>
+            </a:fillRef>
+            <a:effectRef idx="0">
+              <a:schemeClr val="accent1"/>
+            </a:effectRef>
+            <a:fontRef idx="minor">
+              <a:schemeClr val="tx1"/>
+            </a:fontRef>
+          </p:style>
+        </p:cxnSp>
+      </p:grpSp>
+      <p:cxnSp>
+        <p:nvCxnSpPr>
+          <p:cNvPr id="231" name="Straight Connector 230"/>
+          <p:cNvCxnSpPr/>
+          <p:nvPr/>
+        </p:nvCxnSpPr>
+        <p:spPr>
+          <a:xfrm>
+            <a:off x="7569424" y="7096817"/>
+            <a:ext cx="76200" cy="240975"/>
+          </a:xfrm>
+          <a:prstGeom prst="line">
+            <a:avLst/>
+          </a:prstGeom>
+          <a:ln w="19050">
+            <a:solidFill>
+              <a:schemeClr val="tx1"/>
+            </a:solidFill>
+          </a:ln>
+        </p:spPr>
+        <p:style>
+          <a:lnRef idx="1">
+            <a:schemeClr val="accent1"/>
+          </a:lnRef>
+          <a:fillRef idx="0">
+            <a:schemeClr val="accent1"/>
+          </a:fillRef>
+          <a:effectRef idx="0">
+            <a:schemeClr val="accent1"/>
+          </a:effectRef>
+          <a:fontRef idx="minor">
+            <a:schemeClr val="tx1"/>
+          </a:fontRef>
+        </p:style>
+      </p:cxnSp>
+      <p:grpSp>
+        <p:nvGrpSpPr>
+          <p:cNvPr id="241" name="Group 240"/>
+          <p:cNvGrpSpPr/>
+          <p:nvPr/>
+        </p:nvGrpSpPr>
+        <p:grpSpPr>
+          <a:xfrm>
+            <a:off x="8844638" y="6730605"/>
+            <a:ext cx="1639782" cy="731555"/>
+            <a:chOff x="77006" y="961721"/>
+            <a:chExt cx="2109749" cy="576847"/>
+          </a:xfrm>
+        </p:grpSpPr>
+        <p:grpSp>
+          <p:nvGrpSpPr>
+            <p:cNvPr id="242" name="Group 241"/>
+            <p:cNvGrpSpPr/>
+            <p:nvPr/>
+          </p:nvGrpSpPr>
+          <p:grpSpPr>
+            <a:xfrm>
+              <a:off x="77006" y="961721"/>
+              <a:ext cx="2109749" cy="576847"/>
+              <a:chOff x="5367366" y="876525"/>
+              <a:chExt cx="1746026" cy="578940"/>
+            </a:xfrm>
+          </p:grpSpPr>
+          <p:sp>
+            <p:nvSpPr>
+              <p:cNvPr id="244" name="Oval 243"/>
+              <p:cNvSpPr/>
+              <p:nvPr/>
+            </p:nvSpPr>
+            <p:spPr>
+              <a:xfrm>
+                <a:off x="5367366" y="876525"/>
+                <a:ext cx="1682712" cy="578940"/>
+              </a:xfrm>
+              <a:prstGeom prst="ellipse">
+                <a:avLst/>
+              </a:prstGeom>
+              <a:noFill/>
+              <a:ln w="20320">
+                <a:solidFill>
+                  <a:schemeClr val="tx1"/>
+                </a:solidFill>
+              </a:ln>
+            </p:spPr>
+            <p:style>
+              <a:lnRef idx="2">
+                <a:schemeClr val="accent1">
+                  <a:shade val="50000"/>
+                </a:schemeClr>
+              </a:lnRef>
+              <a:fillRef idx="1">
+                <a:schemeClr val="accent1"/>
+              </a:fillRef>
+              <a:effectRef idx="0">
+                <a:schemeClr val="accent1"/>
+              </a:effectRef>
+              <a:fontRef idx="minor">
+                <a:schemeClr val="lt1"/>
+              </a:fontRef>
+            </p:style>
+            <p:txBody>
+              <a:bodyPr rot="0" spcFirstLastPara="0" vertOverflow="overflow" horzOverflow="overflow" vert="horz" wrap="square" lIns="91440" tIns="45720" rIns="91440" bIns="45720" numCol="1" spcCol="0" rtlCol="0" fromWordArt="0" anchor="ctr" anchorCtr="0" forceAA="0" compatLnSpc="1">
+                <a:prstTxWarp prst="textNoShape">
+                  <a:avLst/>
+                </a:prstTxWarp>
+                <a:noAutofit/>
+              </a:bodyPr>
+              <a:lstStyle/>
+              <a:p>
+                <a:pPr algn="ctr"/>
+                <a:endParaRPr lang="en-US" sz="2115" dirty="0"/>
+              </a:p>
+            </p:txBody>
+          </p:sp>
+          <p:sp>
+            <p:nvSpPr>
+              <p:cNvPr id="245" name="TextBox 244"/>
+              <p:cNvSpPr txBox="1"/>
+              <p:nvPr/>
+            </p:nvSpPr>
+            <p:spPr>
+              <a:xfrm>
+                <a:off x="5566640" y="978689"/>
+                <a:ext cx="1546752" cy="330645"/>
+              </a:xfrm>
+              <a:prstGeom prst="rect">
+                <a:avLst/>
+              </a:prstGeom>
+              <a:noFill/>
+            </p:spPr>
+            <p:txBody>
+              <a:bodyPr wrap="square" rtlCol="0">
+                <a:spAutoFit/>
+              </a:bodyPr>
+              <a:lstStyle/>
+              <a:p>
+                <a:r>
+                  <a:rPr lang="es-ES" sz="2115" dirty="0" smtClean="0"/>
+                  <a:t>end_time</a:t>
+                </a:r>
+                <a:endParaRPr lang="en-US" sz="2115" dirty="0"/>
+              </a:p>
+            </p:txBody>
+          </p:sp>
+        </p:grpSp>
+        <p:cxnSp>
+          <p:nvCxnSpPr>
+            <p:cNvPr id="243" name="Straight Connector 242"/>
+            <p:cNvCxnSpPr/>
+            <p:nvPr/>
+          </p:nvCxnSpPr>
+          <p:spPr>
+            <a:xfrm>
+              <a:off x="348102" y="1378448"/>
+              <a:ext cx="1429228" cy="6929"/>
+            </a:xfrm>
+            <a:prstGeom prst="line">
+              <a:avLst/>
+            </a:prstGeom>
+            <a:ln w="15875">
+              <a:solidFill>
+                <a:schemeClr val="tx1"/>
+              </a:solidFill>
+            </a:ln>
+          </p:spPr>
+          <p:style>
+            <a:lnRef idx="1">
+              <a:schemeClr val="accent1"/>
+            </a:lnRef>
+            <a:fillRef idx="0">
+              <a:schemeClr val="accent1"/>
+            </a:fillRef>
+            <a:effectRef idx="0">
+              <a:schemeClr val="accent1"/>
+            </a:effectRef>
+            <a:fontRef idx="minor">
+              <a:schemeClr val="tx1"/>
+            </a:fontRef>
+          </p:style>
+        </p:cxnSp>
+      </p:grpSp>
+      <p:grpSp>
+        <p:nvGrpSpPr>
+          <p:cNvPr id="255" name="Group 254"/>
+          <p:cNvGrpSpPr/>
+          <p:nvPr/>
+        </p:nvGrpSpPr>
+        <p:grpSpPr>
+          <a:xfrm>
+            <a:off x="12810610" y="10813409"/>
+            <a:ext cx="1005224" cy="485774"/>
+            <a:chOff x="5367366" y="876525"/>
+            <a:chExt cx="1682712" cy="578940"/>
+          </a:xfrm>
+        </p:grpSpPr>
+        <p:sp>
+          <p:nvSpPr>
+            <p:cNvPr id="256" name="Oval 255"/>
+            <p:cNvSpPr/>
+            <p:nvPr/>
+          </p:nvSpPr>
+          <p:spPr>
+            <a:xfrm>
+              <a:off x="5367366" y="876525"/>
+              <a:ext cx="1682712" cy="578940"/>
+            </a:xfrm>
+            <a:prstGeom prst="ellipse">
+              <a:avLst/>
+            </a:prstGeom>
+            <a:noFill/>
+            <a:ln w="20320">
+              <a:solidFill>
+                <a:schemeClr val="tx1"/>
+              </a:solidFill>
+            </a:ln>
+          </p:spPr>
+          <p:style>
+            <a:lnRef idx="2">
+              <a:schemeClr val="accent1">
+                <a:shade val="50000"/>
+              </a:schemeClr>
+            </a:lnRef>
+            <a:fillRef idx="1">
+              <a:schemeClr val="accent1"/>
+            </a:fillRef>
+            <a:effectRef idx="0">
+              <a:schemeClr val="accent1"/>
+            </a:effectRef>
+            <a:fontRef idx="minor">
+              <a:schemeClr val="lt1"/>
+            </a:fontRef>
+          </p:style>
+          <p:txBody>
+            <a:bodyPr rot="0" spcFirstLastPara="0" vertOverflow="overflow" horzOverflow="overflow" vert="horz" wrap="square" lIns="91440" tIns="45720" rIns="91440" bIns="45720" numCol="1" spcCol="0" rtlCol="0" fromWordArt="0" anchor="ctr" anchorCtr="0" forceAA="0" compatLnSpc="1">
+              <a:prstTxWarp prst="textNoShape">
+                <a:avLst/>
+              </a:prstTxWarp>
+              <a:noAutofit/>
+            </a:bodyPr>
+            <a:lstStyle/>
+            <a:p>
+              <a:pPr algn="ctr"/>
+              <a:endParaRPr lang="en-US" sz="2115" dirty="0"/>
+            </a:p>
+          </p:txBody>
+        </p:sp>
+        <p:sp>
+          <p:nvSpPr>
+            <p:cNvPr id="257" name="TextBox 256"/>
+            <p:cNvSpPr txBox="1"/>
+            <p:nvPr/>
+          </p:nvSpPr>
+          <p:spPr>
+            <a:xfrm>
+              <a:off x="5542125" y="908197"/>
+              <a:ext cx="1403662" cy="497938"/>
+            </a:xfrm>
+            <a:prstGeom prst="rect">
+              <a:avLst/>
+            </a:prstGeom>
+            <a:noFill/>
+          </p:spPr>
+          <p:txBody>
+            <a:bodyPr wrap="square" rtlCol="0">
+              <a:spAutoFit/>
+            </a:bodyPr>
+            <a:lstStyle/>
+            <a:p>
+              <a:r>
+                <a:rPr lang="es-ES" sz="2115" dirty="0" smtClean="0"/>
+                <a:t>name</a:t>
+              </a:r>
+              <a:endParaRPr lang="en-US" sz="2115" dirty="0"/>
+            </a:p>
+          </p:txBody>
+        </p:sp>
+      </p:grpSp>
+      <p:grpSp>
+        <p:nvGrpSpPr>
+          <p:cNvPr id="261" name="Group 260"/>
+          <p:cNvGrpSpPr/>
+          <p:nvPr/>
+        </p:nvGrpSpPr>
+        <p:grpSpPr>
+          <a:xfrm>
+            <a:off x="5885152" y="5519941"/>
+            <a:ext cx="975499" cy="485774"/>
+            <a:chOff x="5367366" y="876525"/>
+            <a:chExt cx="1682712" cy="578940"/>
+          </a:xfrm>
+        </p:grpSpPr>
+        <p:sp>
+          <p:nvSpPr>
+            <p:cNvPr id="262" name="Oval 261"/>
+            <p:cNvSpPr/>
+            <p:nvPr/>
+          </p:nvSpPr>
+          <p:spPr>
+            <a:xfrm>
+              <a:off x="5367366" y="876525"/>
+              <a:ext cx="1682712" cy="578940"/>
+            </a:xfrm>
+            <a:prstGeom prst="ellipse">
+              <a:avLst/>
+            </a:prstGeom>
+            <a:noFill/>
+            <a:ln w="20320">
+              <a:solidFill>
+                <a:schemeClr val="tx1"/>
+              </a:solidFill>
+            </a:ln>
+          </p:spPr>
+          <p:style>
+            <a:lnRef idx="2">
+              <a:schemeClr val="accent1">
+                <a:shade val="50000"/>
+              </a:schemeClr>
+            </a:lnRef>
+            <a:fillRef idx="1">
+              <a:schemeClr val="accent1"/>
+            </a:fillRef>
+            <a:effectRef idx="0">
+              <a:schemeClr val="accent1"/>
+            </a:effectRef>
+            <a:fontRef idx="minor">
+              <a:schemeClr val="lt1"/>
+            </a:fontRef>
+          </p:style>
+          <p:txBody>
+            <a:bodyPr rot="0" spcFirstLastPara="0" vertOverflow="overflow" horzOverflow="overflow" vert="horz" wrap="square" lIns="91440" tIns="45720" rIns="91440" bIns="45720" numCol="1" spcCol="0" rtlCol="0" fromWordArt="0" anchor="ctr" anchorCtr="0" forceAA="0" compatLnSpc="1">
+              <a:prstTxWarp prst="textNoShape">
+                <a:avLst/>
+              </a:prstTxWarp>
+              <a:noAutofit/>
+            </a:bodyPr>
+            <a:lstStyle/>
+            <a:p>
+              <a:pPr algn="ctr"/>
+              <a:endParaRPr lang="en-US" sz="2115" dirty="0"/>
+            </a:p>
+          </p:txBody>
+        </p:sp>
+        <p:sp>
+          <p:nvSpPr>
+            <p:cNvPr id="263" name="TextBox 262"/>
+            <p:cNvSpPr txBox="1"/>
+            <p:nvPr/>
+          </p:nvSpPr>
+          <p:spPr>
+            <a:xfrm>
+              <a:off x="5549192" y="888015"/>
+              <a:ext cx="1403662" cy="497938"/>
+            </a:xfrm>
+            <a:prstGeom prst="rect">
+              <a:avLst/>
+            </a:prstGeom>
+            <a:noFill/>
+          </p:spPr>
+          <p:txBody>
+            <a:bodyPr wrap="square" rtlCol="0">
+              <a:spAutoFit/>
+            </a:bodyPr>
+            <a:lstStyle/>
+            <a:p>
+              <a:r>
+                <a:rPr lang="es-ES" sz="2115" dirty="0" smtClean="0"/>
+                <a:t>s_d</a:t>
+              </a:r>
+              <a:r>
+                <a:rPr lang="es-ES" sz="2115" dirty="0" smtClean="0"/>
+                <a:t>ay</a:t>
+              </a:r>
+              <a:endParaRPr lang="en-US" sz="2115" dirty="0"/>
+            </a:p>
+          </p:txBody>
+        </p:sp>
+      </p:grpSp>
+      <p:grpSp>
+        <p:nvGrpSpPr>
+          <p:cNvPr id="264" name="Group 263"/>
+          <p:cNvGrpSpPr/>
+          <p:nvPr/>
+        </p:nvGrpSpPr>
+        <p:grpSpPr>
+          <a:xfrm>
+            <a:off x="6873067" y="5711167"/>
+            <a:ext cx="1149291" cy="485774"/>
+            <a:chOff x="5367366" y="876525"/>
+            <a:chExt cx="1682712" cy="578940"/>
+          </a:xfrm>
+        </p:grpSpPr>
+        <p:sp>
+          <p:nvSpPr>
+            <p:cNvPr id="265" name="Oval 264"/>
+            <p:cNvSpPr/>
+            <p:nvPr/>
+          </p:nvSpPr>
+          <p:spPr>
+            <a:xfrm>
+              <a:off x="5367366" y="876525"/>
+              <a:ext cx="1682712" cy="578940"/>
+            </a:xfrm>
+            <a:prstGeom prst="ellipse">
+              <a:avLst/>
+            </a:prstGeom>
+            <a:noFill/>
+            <a:ln w="20320">
+              <a:solidFill>
+                <a:schemeClr val="tx1"/>
+              </a:solidFill>
+            </a:ln>
+          </p:spPr>
+          <p:style>
+            <a:lnRef idx="2">
+              <a:schemeClr val="accent1">
+                <a:shade val="50000"/>
+              </a:schemeClr>
+            </a:lnRef>
+            <a:fillRef idx="1">
+              <a:schemeClr val="accent1"/>
+            </a:fillRef>
+            <a:effectRef idx="0">
+              <a:schemeClr val="accent1"/>
+            </a:effectRef>
+            <a:fontRef idx="minor">
+              <a:schemeClr val="lt1"/>
+            </a:fontRef>
+          </p:style>
+          <p:txBody>
+            <a:bodyPr rot="0" spcFirstLastPara="0" vertOverflow="overflow" horzOverflow="overflow" vert="horz" wrap="square" lIns="91440" tIns="45720" rIns="91440" bIns="45720" numCol="1" spcCol="0" rtlCol="0" fromWordArt="0" anchor="ctr" anchorCtr="0" forceAA="0" compatLnSpc="1">
+              <a:prstTxWarp prst="textNoShape">
+                <a:avLst/>
+              </a:prstTxWarp>
+              <a:noAutofit/>
+            </a:bodyPr>
+            <a:lstStyle/>
+            <a:p>
+              <a:pPr algn="ctr"/>
+              <a:endParaRPr lang="en-US" sz="2115" dirty="0"/>
+            </a:p>
+          </p:txBody>
+        </p:sp>
+        <p:sp>
+          <p:nvSpPr>
+            <p:cNvPr id="266" name="TextBox 265"/>
+            <p:cNvSpPr txBox="1"/>
+            <p:nvPr/>
+          </p:nvSpPr>
+          <p:spPr>
+            <a:xfrm>
+              <a:off x="5549192" y="888015"/>
+              <a:ext cx="1403663" cy="497938"/>
+            </a:xfrm>
+            <a:prstGeom prst="rect">
+              <a:avLst/>
+            </a:prstGeom>
+            <a:noFill/>
+          </p:spPr>
+          <p:txBody>
+            <a:bodyPr wrap="square" rtlCol="0">
+              <a:spAutoFit/>
+            </a:bodyPr>
+            <a:lstStyle/>
+            <a:p>
+              <a:r>
+                <a:rPr lang="es-ES" sz="2115" dirty="0" smtClean="0"/>
+                <a:t>s_year</a:t>
+              </a:r>
+              <a:endParaRPr lang="en-US" sz="2115" dirty="0"/>
+            </a:p>
+          </p:txBody>
+        </p:sp>
+      </p:grpSp>
+      <p:grpSp>
+        <p:nvGrpSpPr>
+          <p:cNvPr id="267" name="Group 266"/>
+          <p:cNvGrpSpPr/>
+          <p:nvPr/>
+        </p:nvGrpSpPr>
+        <p:grpSpPr>
+          <a:xfrm>
+            <a:off x="5460140" y="7779029"/>
+            <a:ext cx="1468127" cy="752921"/>
+            <a:chOff x="5367366" y="876525"/>
+            <a:chExt cx="1682712" cy="897323"/>
+          </a:xfrm>
+        </p:grpSpPr>
+        <p:sp>
+          <p:nvSpPr>
+            <p:cNvPr id="268" name="Oval 267"/>
+            <p:cNvSpPr/>
+            <p:nvPr/>
+          </p:nvSpPr>
+          <p:spPr>
+            <a:xfrm>
+              <a:off x="5367366" y="876525"/>
+              <a:ext cx="1682712" cy="578940"/>
+            </a:xfrm>
+            <a:prstGeom prst="ellipse">
+              <a:avLst/>
+            </a:prstGeom>
+            <a:noFill/>
+            <a:ln w="20320">
+              <a:solidFill>
+                <a:schemeClr val="tx1"/>
+              </a:solidFill>
+            </a:ln>
+          </p:spPr>
+          <p:style>
+            <a:lnRef idx="2">
+              <a:schemeClr val="accent1">
+                <a:shade val="50000"/>
+              </a:schemeClr>
+            </a:lnRef>
+            <a:fillRef idx="1">
+              <a:schemeClr val="accent1"/>
+            </a:fillRef>
+            <a:effectRef idx="0">
+              <a:schemeClr val="accent1"/>
+            </a:effectRef>
+            <a:fontRef idx="minor">
+              <a:schemeClr val="lt1"/>
+            </a:fontRef>
+          </p:style>
+          <p:txBody>
+            <a:bodyPr rot="0" spcFirstLastPara="0" vertOverflow="overflow" horzOverflow="overflow" vert="horz" wrap="square" lIns="91440" tIns="45720" rIns="91440" bIns="45720" numCol="1" spcCol="0" rtlCol="0" fromWordArt="0" anchor="ctr" anchorCtr="0" forceAA="0" compatLnSpc="1">
+              <a:prstTxWarp prst="textNoShape">
+                <a:avLst/>
+              </a:prstTxWarp>
+              <a:noAutofit/>
+            </a:bodyPr>
+            <a:lstStyle/>
+            <a:p>
+              <a:pPr algn="ctr"/>
+              <a:endParaRPr lang="en-US" sz="2115" dirty="0"/>
+            </a:p>
+          </p:txBody>
+        </p:sp>
+        <p:sp>
+          <p:nvSpPr>
+            <p:cNvPr id="269" name="TextBox 268"/>
+            <p:cNvSpPr txBox="1"/>
+            <p:nvPr/>
+          </p:nvSpPr>
+          <p:spPr>
+            <a:xfrm>
+              <a:off x="5549192" y="888015"/>
+              <a:ext cx="1403663" cy="885833"/>
+            </a:xfrm>
+            <a:prstGeom prst="rect">
+              <a:avLst/>
+            </a:prstGeom>
+            <a:noFill/>
+          </p:spPr>
+          <p:txBody>
+            <a:bodyPr wrap="square" rtlCol="0">
+              <a:spAutoFit/>
+            </a:bodyPr>
+            <a:lstStyle/>
+            <a:p>
+              <a:r>
+                <a:rPr lang="es-ES" sz="2115" dirty="0" smtClean="0"/>
+                <a:t>s_month</a:t>
+              </a:r>
+              <a:endParaRPr lang="en-US" sz="2115" dirty="0"/>
+            </a:p>
+          </p:txBody>
+        </p:sp>
+      </p:grpSp>
+      <p:grpSp>
+        <p:nvGrpSpPr>
+          <p:cNvPr id="270" name="Group 269"/>
+          <p:cNvGrpSpPr/>
+          <p:nvPr/>
+        </p:nvGrpSpPr>
+        <p:grpSpPr>
+          <a:xfrm>
+            <a:off x="4249965" y="4112210"/>
+            <a:ext cx="1955704" cy="752921"/>
+            <a:chOff x="5367366" y="876525"/>
+            <a:chExt cx="1682712" cy="897323"/>
+          </a:xfrm>
+        </p:grpSpPr>
+        <p:sp>
+          <p:nvSpPr>
+            <p:cNvPr id="271" name="Oval 270"/>
+            <p:cNvSpPr/>
+            <p:nvPr/>
+          </p:nvSpPr>
+          <p:spPr>
+            <a:xfrm>
+              <a:off x="5367366" y="876525"/>
+              <a:ext cx="1682712" cy="578940"/>
+            </a:xfrm>
+            <a:prstGeom prst="ellipse">
+              <a:avLst/>
+            </a:prstGeom>
+            <a:noFill/>
+            <a:ln w="20320">
+              <a:solidFill>
+                <a:schemeClr val="tx1"/>
+              </a:solidFill>
+            </a:ln>
+          </p:spPr>
+          <p:style>
+            <a:lnRef idx="2">
+              <a:schemeClr val="accent1">
+                <a:shade val="50000"/>
+              </a:schemeClr>
+            </a:lnRef>
+            <a:fillRef idx="1">
+              <a:schemeClr val="accent1"/>
+            </a:fillRef>
+            <a:effectRef idx="0">
+              <a:schemeClr val="accent1"/>
+            </a:effectRef>
+            <a:fontRef idx="minor">
+              <a:schemeClr val="lt1"/>
+            </a:fontRef>
+          </p:style>
+          <p:txBody>
+            <a:bodyPr rot="0" spcFirstLastPara="0" vertOverflow="overflow" horzOverflow="overflow" vert="horz" wrap="square" lIns="91440" tIns="45720" rIns="91440" bIns="45720" numCol="1" spcCol="0" rtlCol="0" fromWordArt="0" anchor="ctr" anchorCtr="0" forceAA="0" compatLnSpc="1">
+              <a:prstTxWarp prst="textNoShape">
+                <a:avLst/>
+              </a:prstTxWarp>
+              <a:noAutofit/>
+            </a:bodyPr>
+            <a:lstStyle/>
+            <a:p>
+              <a:pPr algn="ctr"/>
+              <a:endParaRPr lang="en-US" sz="2115" dirty="0"/>
+            </a:p>
+          </p:txBody>
+        </p:sp>
+        <p:sp>
+          <p:nvSpPr>
+            <p:cNvPr id="272" name="TextBox 271"/>
+            <p:cNvSpPr txBox="1"/>
+            <p:nvPr/>
+          </p:nvSpPr>
+          <p:spPr>
+            <a:xfrm>
+              <a:off x="5549192" y="888015"/>
+              <a:ext cx="1403663" cy="885833"/>
+            </a:xfrm>
+            <a:prstGeom prst="rect">
+              <a:avLst/>
+            </a:prstGeom>
+            <a:noFill/>
+          </p:spPr>
+          <p:txBody>
+            <a:bodyPr wrap="square" rtlCol="0">
+              <a:spAutoFit/>
+            </a:bodyPr>
+            <a:lstStyle/>
+            <a:p>
+              <a:r>
+                <a:rPr lang="es-ES" sz="2115" dirty="0" smtClean="0"/>
+                <a:t>s_time_zone</a:t>
+              </a:r>
+              <a:endParaRPr lang="en-US" sz="2115" dirty="0"/>
+            </a:p>
+          </p:txBody>
+        </p:sp>
+      </p:grpSp>
+      <p:grpSp>
+        <p:nvGrpSpPr>
+          <p:cNvPr id="273" name="Group 272"/>
+          <p:cNvGrpSpPr/>
+          <p:nvPr/>
+        </p:nvGrpSpPr>
+        <p:grpSpPr>
+          <a:xfrm>
+            <a:off x="4468000" y="6545197"/>
+            <a:ext cx="1474140" cy="485774"/>
+            <a:chOff x="5367366" y="876525"/>
+            <a:chExt cx="1682712" cy="578940"/>
+          </a:xfrm>
+        </p:grpSpPr>
+        <p:sp>
+          <p:nvSpPr>
+            <p:cNvPr id="274" name="Oval 273"/>
+            <p:cNvSpPr/>
+            <p:nvPr/>
+          </p:nvSpPr>
+          <p:spPr>
+            <a:xfrm>
+              <a:off x="5367366" y="876525"/>
+              <a:ext cx="1682712" cy="578940"/>
+            </a:xfrm>
+            <a:prstGeom prst="ellipse">
+              <a:avLst/>
+            </a:prstGeom>
+            <a:noFill/>
+            <a:ln w="20320">
+              <a:solidFill>
+                <a:schemeClr val="tx1"/>
+              </a:solidFill>
+            </a:ln>
+          </p:spPr>
+          <p:style>
+            <a:lnRef idx="2">
+              <a:schemeClr val="accent1">
+                <a:shade val="50000"/>
+              </a:schemeClr>
+            </a:lnRef>
+            <a:fillRef idx="1">
+              <a:schemeClr val="accent1"/>
+            </a:fillRef>
+            <a:effectRef idx="0">
+              <a:schemeClr val="accent1"/>
+            </a:effectRef>
+            <a:fontRef idx="minor">
+              <a:schemeClr val="lt1"/>
+            </a:fontRef>
+          </p:style>
+          <p:txBody>
+            <a:bodyPr rot="0" spcFirstLastPara="0" vertOverflow="overflow" horzOverflow="overflow" vert="horz" wrap="square" lIns="91440" tIns="45720" rIns="91440" bIns="45720" numCol="1" spcCol="0" rtlCol="0" fromWordArt="0" anchor="ctr" anchorCtr="0" forceAA="0" compatLnSpc="1">
+              <a:prstTxWarp prst="textNoShape">
+                <a:avLst/>
+              </a:prstTxWarp>
+              <a:noAutofit/>
+            </a:bodyPr>
+            <a:lstStyle/>
+            <a:p>
+              <a:pPr algn="ctr"/>
+              <a:endParaRPr lang="en-US" sz="2115" dirty="0"/>
+            </a:p>
+          </p:txBody>
+        </p:sp>
+        <p:sp>
+          <p:nvSpPr>
+            <p:cNvPr id="275" name="TextBox 274"/>
+            <p:cNvSpPr txBox="1"/>
+            <p:nvPr/>
+          </p:nvSpPr>
+          <p:spPr>
+            <a:xfrm>
+              <a:off x="5549192" y="888015"/>
+              <a:ext cx="1403663" cy="497938"/>
+            </a:xfrm>
+            <a:prstGeom prst="rect">
+              <a:avLst/>
+            </a:prstGeom>
+            <a:noFill/>
+          </p:spPr>
+          <p:txBody>
+            <a:bodyPr wrap="square" rtlCol="0">
+              <a:spAutoFit/>
+            </a:bodyPr>
+            <a:lstStyle/>
+            <a:p>
+              <a:r>
+                <a:rPr lang="es-ES" sz="2115" dirty="0" smtClean="0"/>
+                <a:t>s_second</a:t>
+              </a:r>
+              <a:endParaRPr lang="en-US" sz="2115" dirty="0"/>
+            </a:p>
+          </p:txBody>
+        </p:sp>
+      </p:grpSp>
+      <p:grpSp>
+        <p:nvGrpSpPr>
+          <p:cNvPr id="276" name="Group 275"/>
+          <p:cNvGrpSpPr/>
+          <p:nvPr/>
+        </p:nvGrpSpPr>
+        <p:grpSpPr>
+          <a:xfrm>
+            <a:off x="5330948" y="7116998"/>
+            <a:ext cx="1149291" cy="485774"/>
+            <a:chOff x="5367366" y="876525"/>
+            <a:chExt cx="1682712" cy="578940"/>
+          </a:xfrm>
+        </p:grpSpPr>
+        <p:sp>
+          <p:nvSpPr>
+            <p:cNvPr id="277" name="Oval 276"/>
+            <p:cNvSpPr/>
+            <p:nvPr/>
+          </p:nvSpPr>
+          <p:spPr>
+            <a:xfrm>
+              <a:off x="5367366" y="876525"/>
+              <a:ext cx="1682712" cy="578940"/>
+            </a:xfrm>
+            <a:prstGeom prst="ellipse">
+              <a:avLst/>
+            </a:prstGeom>
+            <a:noFill/>
+            <a:ln w="20320">
+              <a:solidFill>
+                <a:schemeClr val="tx1"/>
+              </a:solidFill>
+            </a:ln>
+          </p:spPr>
+          <p:style>
+            <a:lnRef idx="2">
+              <a:schemeClr val="accent1">
+                <a:shade val="50000"/>
+              </a:schemeClr>
+            </a:lnRef>
+            <a:fillRef idx="1">
+              <a:schemeClr val="accent1"/>
+            </a:fillRef>
+            <a:effectRef idx="0">
+              <a:schemeClr val="accent1"/>
+            </a:effectRef>
+            <a:fontRef idx="minor">
+              <a:schemeClr val="lt1"/>
+            </a:fontRef>
+          </p:style>
+          <p:txBody>
+            <a:bodyPr rot="0" spcFirstLastPara="0" vertOverflow="overflow" horzOverflow="overflow" vert="horz" wrap="square" lIns="91440" tIns="45720" rIns="91440" bIns="45720" numCol="1" spcCol="0" rtlCol="0" fromWordArt="0" anchor="ctr" anchorCtr="0" forceAA="0" compatLnSpc="1">
+              <a:prstTxWarp prst="textNoShape">
+                <a:avLst/>
+              </a:prstTxWarp>
+              <a:noAutofit/>
+            </a:bodyPr>
+            <a:lstStyle/>
+            <a:p>
+              <a:pPr algn="ctr"/>
+              <a:endParaRPr lang="en-US" sz="2115" dirty="0"/>
+            </a:p>
+          </p:txBody>
+        </p:sp>
+        <p:sp>
+          <p:nvSpPr>
+            <p:cNvPr id="278" name="TextBox 277"/>
+            <p:cNvSpPr txBox="1"/>
+            <p:nvPr/>
+          </p:nvSpPr>
+          <p:spPr>
+            <a:xfrm>
+              <a:off x="5549192" y="888015"/>
+              <a:ext cx="1403663" cy="497938"/>
+            </a:xfrm>
+            <a:prstGeom prst="rect">
+              <a:avLst/>
+            </a:prstGeom>
+            <a:noFill/>
+          </p:spPr>
+          <p:txBody>
+            <a:bodyPr wrap="square" rtlCol="0">
+              <a:spAutoFit/>
+            </a:bodyPr>
+            <a:lstStyle/>
+            <a:p>
+              <a:r>
+                <a:rPr lang="es-ES" sz="2115" dirty="0" smtClean="0"/>
+                <a:t>s_hour</a:t>
+              </a:r>
+              <a:endParaRPr lang="en-US" sz="2115" dirty="0"/>
+            </a:p>
+          </p:txBody>
+        </p:sp>
+      </p:grpSp>
+      <p:grpSp>
+        <p:nvGrpSpPr>
+          <p:cNvPr id="279" name="Group 278"/>
+          <p:cNvGrpSpPr/>
+          <p:nvPr/>
+        </p:nvGrpSpPr>
+        <p:grpSpPr>
+          <a:xfrm>
+            <a:off x="4768620" y="5959152"/>
+            <a:ext cx="1474140" cy="752921"/>
+            <a:chOff x="5367366" y="876525"/>
+            <a:chExt cx="1682712" cy="897323"/>
+          </a:xfrm>
+        </p:grpSpPr>
+        <p:sp>
+          <p:nvSpPr>
+            <p:cNvPr id="280" name="Oval 279"/>
+            <p:cNvSpPr/>
+            <p:nvPr/>
+          </p:nvSpPr>
+          <p:spPr>
+            <a:xfrm>
+              <a:off x="5367366" y="876525"/>
+              <a:ext cx="1682712" cy="578940"/>
+            </a:xfrm>
+            <a:prstGeom prst="ellipse">
+              <a:avLst/>
+            </a:prstGeom>
+            <a:noFill/>
+            <a:ln w="20320">
+              <a:solidFill>
+                <a:schemeClr val="tx1"/>
+              </a:solidFill>
+            </a:ln>
+          </p:spPr>
+          <p:style>
+            <a:lnRef idx="2">
+              <a:schemeClr val="accent1">
+                <a:shade val="50000"/>
+              </a:schemeClr>
+            </a:lnRef>
+            <a:fillRef idx="1">
+              <a:schemeClr val="accent1"/>
+            </a:fillRef>
+            <a:effectRef idx="0">
+              <a:schemeClr val="accent1"/>
+            </a:effectRef>
+            <a:fontRef idx="minor">
+              <a:schemeClr val="lt1"/>
+            </a:fontRef>
+          </p:style>
+          <p:txBody>
+            <a:bodyPr rot="0" spcFirstLastPara="0" vertOverflow="overflow" horzOverflow="overflow" vert="horz" wrap="square" lIns="91440" tIns="45720" rIns="91440" bIns="45720" numCol="1" spcCol="0" rtlCol="0" fromWordArt="0" anchor="ctr" anchorCtr="0" forceAA="0" compatLnSpc="1">
+              <a:prstTxWarp prst="textNoShape">
+                <a:avLst/>
+              </a:prstTxWarp>
+              <a:noAutofit/>
+            </a:bodyPr>
+            <a:lstStyle/>
+            <a:p>
+              <a:pPr algn="ctr"/>
+              <a:endParaRPr lang="en-US" sz="2115" dirty="0"/>
+            </a:p>
+          </p:txBody>
+        </p:sp>
+        <p:sp>
+          <p:nvSpPr>
+            <p:cNvPr id="281" name="TextBox 280"/>
+            <p:cNvSpPr txBox="1"/>
+            <p:nvPr/>
+          </p:nvSpPr>
+          <p:spPr>
+            <a:xfrm>
+              <a:off x="5549192" y="888015"/>
+              <a:ext cx="1403663" cy="885833"/>
+            </a:xfrm>
+            <a:prstGeom prst="rect">
+              <a:avLst/>
+            </a:prstGeom>
+            <a:noFill/>
+          </p:spPr>
+          <p:txBody>
+            <a:bodyPr wrap="square" rtlCol="0">
+              <a:spAutoFit/>
+            </a:bodyPr>
+            <a:lstStyle/>
+            <a:p>
+              <a:r>
+                <a:rPr lang="es-ES" sz="2115" dirty="0"/>
+                <a:t>s</a:t>
+              </a:r>
+              <a:r>
+                <a:rPr lang="es-ES" sz="2115" dirty="0" smtClean="0"/>
+                <a:t>_minute</a:t>
+              </a:r>
+              <a:endParaRPr lang="en-US" sz="2115" dirty="0"/>
+            </a:p>
+          </p:txBody>
+        </p:sp>
+      </p:grpSp>
     </p:spTree>
     <p:extLst>
       <p:ext uri="{BB962C8B-B14F-4D97-AF65-F5344CB8AC3E}">

</xml_diff>

<commit_message>
E-R model + conversion tables
</commit_message>
<xml_diff>
--- a/projectBD.pptx
+++ b/projectBD.pptx
@@ -243,7 +243,7 @@
           <a:p>
             <a:fld id="{2716B319-CFB7-4327-A175-11F2E3909532}" type="datetimeFigureOut">
               <a:rPr lang="en-US" smtClean="0"/>
-              <a:t>10/16/2015</a:t>
+              <a:t>10/19/2015</a:t>
             </a:fld>
             <a:endParaRPr lang="en-US"/>
           </a:p>
@@ -413,7 +413,7 @@
           <a:p>
             <a:fld id="{2716B319-CFB7-4327-A175-11F2E3909532}" type="datetimeFigureOut">
               <a:rPr lang="en-US" smtClean="0"/>
-              <a:t>10/16/2015</a:t>
+              <a:t>10/19/2015</a:t>
             </a:fld>
             <a:endParaRPr lang="en-US"/>
           </a:p>
@@ -593,7 +593,7 @@
           <a:p>
             <a:fld id="{2716B319-CFB7-4327-A175-11F2E3909532}" type="datetimeFigureOut">
               <a:rPr lang="en-US" smtClean="0"/>
-              <a:t>10/16/2015</a:t>
+              <a:t>10/19/2015</a:t>
             </a:fld>
             <a:endParaRPr lang="en-US"/>
           </a:p>
@@ -763,7 +763,7 @@
           <a:p>
             <a:fld id="{2716B319-CFB7-4327-A175-11F2E3909532}" type="datetimeFigureOut">
               <a:rPr lang="en-US" smtClean="0"/>
-              <a:t>10/16/2015</a:t>
+              <a:t>10/19/2015</a:t>
             </a:fld>
             <a:endParaRPr lang="en-US"/>
           </a:p>
@@ -1009,7 +1009,7 @@
           <a:p>
             <a:fld id="{2716B319-CFB7-4327-A175-11F2E3909532}" type="datetimeFigureOut">
               <a:rPr lang="en-US" smtClean="0"/>
-              <a:t>10/16/2015</a:t>
+              <a:t>10/19/2015</a:t>
             </a:fld>
             <a:endParaRPr lang="en-US"/>
           </a:p>
@@ -1241,7 +1241,7 @@
           <a:p>
             <a:fld id="{2716B319-CFB7-4327-A175-11F2E3909532}" type="datetimeFigureOut">
               <a:rPr lang="en-US" smtClean="0"/>
-              <a:t>10/16/2015</a:t>
+              <a:t>10/19/2015</a:t>
             </a:fld>
             <a:endParaRPr lang="en-US"/>
           </a:p>
@@ -1608,7 +1608,7 @@
           <a:p>
             <a:fld id="{2716B319-CFB7-4327-A175-11F2E3909532}" type="datetimeFigureOut">
               <a:rPr lang="en-US" smtClean="0"/>
-              <a:t>10/16/2015</a:t>
+              <a:t>10/19/2015</a:t>
             </a:fld>
             <a:endParaRPr lang="en-US"/>
           </a:p>
@@ -1726,7 +1726,7 @@
           <a:p>
             <a:fld id="{2716B319-CFB7-4327-A175-11F2E3909532}" type="datetimeFigureOut">
               <a:rPr lang="en-US" smtClean="0"/>
-              <a:t>10/16/2015</a:t>
+              <a:t>10/19/2015</a:t>
             </a:fld>
             <a:endParaRPr lang="en-US"/>
           </a:p>
@@ -1821,7 +1821,7 @@
           <a:p>
             <a:fld id="{2716B319-CFB7-4327-A175-11F2E3909532}" type="datetimeFigureOut">
               <a:rPr lang="en-US" smtClean="0"/>
-              <a:t>10/16/2015</a:t>
+              <a:t>10/19/2015</a:t>
             </a:fld>
             <a:endParaRPr lang="en-US"/>
           </a:p>
@@ -2098,7 +2098,7 @@
           <a:p>
             <a:fld id="{2716B319-CFB7-4327-A175-11F2E3909532}" type="datetimeFigureOut">
               <a:rPr lang="en-US" smtClean="0"/>
-              <a:t>10/16/2015</a:t>
+              <a:t>10/19/2015</a:t>
             </a:fld>
             <a:endParaRPr lang="en-US"/>
           </a:p>
@@ -2355,7 +2355,7 @@
           <a:p>
             <a:fld id="{2716B319-CFB7-4327-A175-11F2E3909532}" type="datetimeFigureOut">
               <a:rPr lang="en-US" smtClean="0"/>
-              <a:t>10/16/2015</a:t>
+              <a:t>10/19/2015</a:t>
             </a:fld>
             <a:endParaRPr lang="en-US"/>
           </a:p>
@@ -2568,7 +2568,7 @@
           <a:p>
             <a:fld id="{2716B319-CFB7-4327-A175-11F2E3909532}" type="datetimeFigureOut">
               <a:rPr lang="en-US" smtClean="0"/>
-              <a:t>10/16/2015</a:t>
+              <a:t>10/19/2015</a:t>
             </a:fld>
             <a:endParaRPr lang="en-US"/>
           </a:p>
@@ -2981,7 +2981,7 @@
         </p:nvGrpSpPr>
         <p:grpSpPr>
           <a:xfrm>
-            <a:off x="7094635" y="11913508"/>
+            <a:off x="6431552" y="10433371"/>
             <a:ext cx="1212646" cy="1135732"/>
             <a:chOff x="1095271" y="1200778"/>
             <a:chExt cx="1140488" cy="1075174"/>
@@ -3077,7 +3077,7 @@
         </p:nvGrpSpPr>
         <p:grpSpPr>
           <a:xfrm>
-            <a:off x="9263011" y="13865975"/>
+            <a:off x="8599928" y="12385838"/>
             <a:ext cx="1186457" cy="524903"/>
             <a:chOff x="2725743" y="3980367"/>
             <a:chExt cx="1186459" cy="524902"/>
@@ -3168,7 +3168,7 @@
         </p:nvGrpSpPr>
         <p:grpSpPr>
           <a:xfrm>
-            <a:off x="7069365" y="13853790"/>
+            <a:off x="6406282" y="12373653"/>
             <a:ext cx="1186463" cy="524902"/>
             <a:chOff x="5629717" y="-842841"/>
             <a:chExt cx="1186459" cy="524902"/>
@@ -3259,7 +3259,7 @@
         </p:nvCxnSpPr>
         <p:spPr>
           <a:xfrm>
-            <a:off x="9853072" y="13080618"/>
+            <a:off x="9189989" y="11600481"/>
             <a:ext cx="0" cy="775208"/>
           </a:xfrm>
           <a:prstGeom prst="line">
@@ -3294,7 +3294,7 @@
         </p:nvCxnSpPr>
         <p:spPr>
           <a:xfrm>
-            <a:off x="7700982" y="13063911"/>
+            <a:off x="7037899" y="11583774"/>
             <a:ext cx="0" cy="775208"/>
           </a:xfrm>
           <a:prstGeom prst="line">
@@ -3329,10 +3329,10 @@
         </p:nvGrpSpPr>
         <p:grpSpPr>
           <a:xfrm>
-            <a:off x="7822015" y="8530757"/>
-            <a:ext cx="1817742" cy="515716"/>
+            <a:off x="7158932" y="7050620"/>
+            <a:ext cx="1891480" cy="515716"/>
             <a:chOff x="2710653" y="3980367"/>
-            <a:chExt cx="1817744" cy="515714"/>
+            <a:chExt cx="1891482" cy="515714"/>
           </a:xfrm>
         </p:grpSpPr>
         <p:sp>
@@ -3390,7 +3390,7 @@
           <p:spPr>
             <a:xfrm>
               <a:off x="2710653" y="4021965"/>
-              <a:ext cx="1817744" cy="417933"/>
+              <a:ext cx="1891482" cy="417933"/>
             </a:xfrm>
             <a:prstGeom prst="rect">
               <a:avLst/>
@@ -3405,7 +3405,11 @@
             <a:p>
               <a:r>
                 <a:rPr lang="es-ES" sz="2116" dirty="0"/>
-                <a:t>medical device</a:t>
+                <a:t>m</a:t>
+              </a:r>
+              <a:r>
+                <a:rPr lang="es-ES" sz="2116" dirty="0" smtClean="0"/>
+                <a:t>edical_device</a:t>
               </a:r>
               <a:endParaRPr lang="en-US" sz="2116" dirty="0"/>
             </a:p>
@@ -3420,7 +3424,7 @@
         </p:nvGrpSpPr>
         <p:grpSpPr>
           <a:xfrm>
-            <a:off x="8155704" y="9474052"/>
+            <a:off x="7492621" y="7993915"/>
             <a:ext cx="1114598" cy="735848"/>
             <a:chOff x="1987422" y="1147198"/>
             <a:chExt cx="1114594" cy="735849"/>
@@ -3518,7 +3522,7 @@
         </p:nvCxnSpPr>
         <p:spPr>
           <a:xfrm>
-            <a:off x="8713007" y="9046468"/>
+            <a:off x="8049924" y="7566331"/>
             <a:ext cx="0" cy="427582"/>
           </a:xfrm>
           <a:prstGeom prst="line">
@@ -3553,7 +3557,7 @@
         </p:nvGrpSpPr>
         <p:grpSpPr>
           <a:xfrm>
-            <a:off x="7074632" y="10605986"/>
+            <a:off x="6411549" y="9125849"/>
             <a:ext cx="1175925" cy="485908"/>
             <a:chOff x="2725743" y="3980367"/>
             <a:chExt cx="1751806" cy="515714"/>
@@ -3647,7 +3651,7 @@
         </p:nvCxnSpPr>
         <p:spPr>
           <a:xfrm flipH="1">
-            <a:off x="7662595" y="9841974"/>
+            <a:off x="6999512" y="8361837"/>
             <a:ext cx="771761" cy="764011"/>
           </a:xfrm>
           <a:prstGeom prst="line">
@@ -3681,7 +3685,7 @@
         </p:nvCxnSpPr>
         <p:spPr>
           <a:xfrm>
-            <a:off x="8991655" y="9841972"/>
+            <a:off x="8328572" y="8361835"/>
             <a:ext cx="850057" cy="789955"/>
           </a:xfrm>
           <a:prstGeom prst="line">
@@ -3712,7 +3716,7 @@
         </p:nvCxnSpPr>
         <p:spPr>
           <a:xfrm flipV="1">
-            <a:off x="9848840" y="11121996"/>
+            <a:off x="9185757" y="9641859"/>
             <a:ext cx="3172" cy="795511"/>
           </a:xfrm>
           <a:prstGeom prst="straightConnector1">
@@ -3748,7 +3752,7 @@
         </p:nvGrpSpPr>
         <p:grpSpPr>
           <a:xfrm>
-            <a:off x="11182922" y="13590831"/>
+            <a:off x="10519839" y="12110694"/>
             <a:ext cx="1140487" cy="1075177"/>
             <a:chOff x="1095271" y="1200778"/>
             <a:chExt cx="1140488" cy="1075174"/>
@@ -3844,7 +3848,7 @@
         </p:nvGrpSpPr>
         <p:grpSpPr>
           <a:xfrm>
-            <a:off x="5671564" y="9130774"/>
+            <a:off x="5008481" y="7650637"/>
             <a:ext cx="1563624" cy="485775"/>
             <a:chOff x="5367366" y="876525"/>
             <a:chExt cx="1682712" cy="578940"/>
@@ -3943,7 +3947,7 @@
         </p:nvCxnSpPr>
         <p:spPr>
           <a:xfrm flipV="1">
-            <a:off x="7006203" y="8788609"/>
+            <a:off x="6343120" y="7308472"/>
             <a:ext cx="830904" cy="413307"/>
           </a:xfrm>
           <a:prstGeom prst="line">
@@ -3974,7 +3978,7 @@
         </p:nvCxnSpPr>
         <p:spPr>
           <a:xfrm flipV="1">
-            <a:off x="7700960" y="11091497"/>
+            <a:off x="7037877" y="9611360"/>
             <a:ext cx="3172" cy="795511"/>
           </a:xfrm>
           <a:prstGeom prst="straightConnector1">
@@ -4010,7 +4014,7 @@
         </p:nvGrpSpPr>
         <p:grpSpPr>
           <a:xfrm>
-            <a:off x="12984024" y="13865967"/>
+            <a:off x="12320941" y="12385830"/>
             <a:ext cx="1186456" cy="524902"/>
             <a:chOff x="2725743" y="3980367"/>
             <a:chExt cx="1186459" cy="524902"/>
@@ -4101,7 +4105,7 @@
         </p:nvGrpSpPr>
         <p:grpSpPr>
           <a:xfrm>
-            <a:off x="9253751" y="10631928"/>
+            <a:off x="8590668" y="9151791"/>
             <a:ext cx="1248158" cy="485908"/>
             <a:chOff x="2725743" y="3980367"/>
             <a:chExt cx="1859415" cy="515714"/>
@@ -4192,7 +4196,7 @@
         </p:nvGrpSpPr>
         <p:grpSpPr>
           <a:xfrm>
-            <a:off x="5281664" y="8300899"/>
+            <a:off x="4618581" y="6820762"/>
             <a:ext cx="2033244" cy="576845"/>
             <a:chOff x="77002" y="961721"/>
             <a:chExt cx="2033245" cy="576845"/>
@@ -4340,7 +4344,7 @@
         </p:nvCxnSpPr>
         <p:spPr>
           <a:xfrm flipH="1" flipV="1">
-            <a:off x="7314908" y="8589318"/>
+            <a:off x="6651825" y="7109181"/>
             <a:ext cx="522196" cy="67264"/>
           </a:xfrm>
           <a:prstGeom prst="line">
@@ -4375,7 +4379,7 @@
         </p:nvGrpSpPr>
         <p:grpSpPr>
           <a:xfrm>
-            <a:off x="10670568" y="8169482"/>
+            <a:off x="10007485" y="6689345"/>
             <a:ext cx="1332664" cy="1238251"/>
             <a:chOff x="5930900" y="1130300"/>
             <a:chExt cx="1332664" cy="1238250"/>
@@ -4466,7 +4470,7 @@
         </p:nvGrpSpPr>
         <p:grpSpPr>
           <a:xfrm>
-            <a:off x="9245691" y="11930388"/>
+            <a:off x="8582608" y="10450251"/>
             <a:ext cx="1212645" cy="1135733"/>
             <a:chOff x="1095271" y="1200778"/>
             <a:chExt cx="1140488" cy="1075174"/>
@@ -4565,7 +4569,7 @@
         </p:nvCxnSpPr>
         <p:spPr>
           <a:xfrm flipV="1">
-            <a:off x="9588908" y="8788607"/>
+            <a:off x="8925825" y="7308470"/>
             <a:ext cx="1081658" cy="0"/>
           </a:xfrm>
           <a:prstGeom prst="line">
@@ -4600,7 +4604,7 @@
         </p:nvGrpSpPr>
         <p:grpSpPr>
           <a:xfrm>
-            <a:off x="13066132" y="8506741"/>
+            <a:off x="12293394" y="7003348"/>
             <a:ext cx="1122688" cy="591879"/>
             <a:chOff x="2725743" y="3980367"/>
             <a:chExt cx="1751806" cy="515714"/>
@@ -4683,45 +4687,6 @@
           </p:txBody>
         </p:sp>
       </p:grpSp>
-      <p:cxnSp>
-        <p:nvCxnSpPr>
-          <p:cNvPr id="100" name="Straight Connector 99"/>
-          <p:cNvCxnSpPr>
-            <a:stCxn id="84" idx="3"/>
-            <a:endCxn id="98" idx="1"/>
-          </p:cNvCxnSpPr>
-          <p:nvPr/>
-        </p:nvCxnSpPr>
-        <p:spPr>
-          <a:xfrm>
-            <a:off x="12003234" y="8788608"/>
-            <a:ext cx="1062898" cy="14078"/>
-          </a:xfrm>
-          <a:prstGeom prst="line">
-            <a:avLst/>
-          </a:prstGeom>
-          <a:ln w="19050">
-            <a:solidFill>
-              <a:schemeClr val="tx1"/>
-            </a:solidFill>
-            <a:tailEnd type="arrow"/>
-          </a:ln>
-        </p:spPr>
-        <p:style>
-          <a:lnRef idx="1">
-            <a:schemeClr val="accent1"/>
-          </a:lnRef>
-          <a:fillRef idx="0">
-            <a:schemeClr val="accent1"/>
-          </a:fillRef>
-          <a:effectRef idx="0">
-            <a:schemeClr val="accent1"/>
-          </a:effectRef>
-          <a:fontRef idx="minor">
-            <a:schemeClr val="tx1"/>
-          </a:fontRef>
-        </p:style>
-      </p:cxnSp>
       <p:grpSp>
         <p:nvGrpSpPr>
           <p:cNvPr id="102" name="Group 101"/>
@@ -4730,7 +4695,7 @@
         </p:nvGrpSpPr>
         <p:grpSpPr>
           <a:xfrm>
-            <a:off x="20119701" y="3255352"/>
+            <a:off x="17685965" y="11342623"/>
             <a:ext cx="1631031" cy="515715"/>
             <a:chOff x="2531026" y="3974531"/>
             <a:chExt cx="1751806" cy="515714"/>
@@ -4813,44 +4778,6 @@
           </p:txBody>
         </p:sp>
       </p:grpSp>
-      <p:cxnSp>
-        <p:nvCxnSpPr>
-          <p:cNvPr id="115" name="Straight Connector 114"/>
-          <p:cNvCxnSpPr>
-            <a:stCxn id="84" idx="0"/>
-            <a:endCxn id="219" idx="2"/>
-          </p:cNvCxnSpPr>
-          <p:nvPr/>
-        </p:nvCxnSpPr>
-        <p:spPr>
-          <a:xfrm flipH="1" flipV="1">
-            <a:off x="11294591" y="4928378"/>
-            <a:ext cx="42306" cy="3241106"/>
-          </a:xfrm>
-          <a:prstGeom prst="line">
-            <a:avLst/>
-          </a:prstGeom>
-          <a:ln w="19050">
-            <a:solidFill>
-              <a:schemeClr val="tx1"/>
-            </a:solidFill>
-          </a:ln>
-        </p:spPr>
-        <p:style>
-          <a:lnRef idx="1">
-            <a:schemeClr val="accent1"/>
-          </a:lnRef>
-          <a:fillRef idx="0">
-            <a:schemeClr val="accent1"/>
-          </a:fillRef>
-          <a:effectRef idx="0">
-            <a:schemeClr val="accent1"/>
-          </a:effectRef>
-          <a:fontRef idx="minor">
-            <a:schemeClr val="tx1"/>
-          </a:fontRef>
-        </p:style>
-      </p:cxnSp>
       <p:grpSp>
         <p:nvGrpSpPr>
           <p:cNvPr id="124" name="Group 123"/>
@@ -4859,7 +4786,7 @@
         </p:nvGrpSpPr>
         <p:grpSpPr>
           <a:xfrm>
-            <a:off x="21372854" y="9109598"/>
+            <a:off x="21273802" y="7069167"/>
             <a:ext cx="1359256" cy="515715"/>
             <a:chOff x="2725743" y="3980367"/>
             <a:chExt cx="1751806" cy="515714"/>
@@ -4950,7 +4877,7 @@
         </p:nvGrpSpPr>
         <p:grpSpPr>
           <a:xfrm>
-            <a:off x="21290780" y="7289993"/>
+            <a:off x="21202292" y="8533885"/>
             <a:ext cx="1486243" cy="1376300"/>
             <a:chOff x="5930900" y="1130300"/>
             <a:chExt cx="1332664" cy="1238250"/>
@@ -5041,7 +4968,7 @@
         </p:nvGrpSpPr>
         <p:grpSpPr>
           <a:xfrm>
-            <a:off x="24117870" y="6206815"/>
+            <a:off x="21202292" y="10912330"/>
             <a:ext cx="1486242" cy="1376301"/>
             <a:chOff x="5930900" y="1130300"/>
             <a:chExt cx="1332664" cy="1238250"/>
@@ -5132,7 +5059,7 @@
         </p:nvGrpSpPr>
         <p:grpSpPr>
           <a:xfrm>
-            <a:off x="23985090" y="5153467"/>
+            <a:off x="21073519" y="12775911"/>
             <a:ext cx="1751805" cy="515715"/>
             <a:chOff x="2725743" y="3980367"/>
             <a:chExt cx="1751806" cy="515714"/>
@@ -5219,15 +5146,15 @@
         <p:nvCxnSpPr>
           <p:cNvPr id="152" name="Straight Connector 151"/>
           <p:cNvCxnSpPr>
-            <a:stCxn id="141" idx="0"/>
-            <a:endCxn id="147" idx="2"/>
+            <a:stCxn id="141" idx="2"/>
+            <a:endCxn id="147" idx="0"/>
           </p:cNvCxnSpPr>
           <p:nvPr/>
         </p:nvCxnSpPr>
         <p:spPr>
-          <a:xfrm flipV="1">
-            <a:off x="24860993" y="5669188"/>
-            <a:ext cx="0" cy="537627"/>
+          <a:xfrm>
+            <a:off x="21945413" y="12288631"/>
+            <a:ext cx="4009" cy="487280"/>
           </a:xfrm>
           <a:prstGeom prst="line">
             <a:avLst/>
@@ -5261,7 +5188,7 @@
         </p:nvGrpSpPr>
         <p:grpSpPr>
           <a:xfrm>
-            <a:off x="4117610" y="6090778"/>
+            <a:off x="8370197" y="3547192"/>
             <a:ext cx="2380330" cy="485776"/>
             <a:chOff x="5367366" y="876525"/>
             <a:chExt cx="1682712" cy="578940"/>
@@ -5326,7 +5253,7 @@
           </p:nvSpPr>
           <p:spPr>
             <a:xfrm>
-              <a:off x="5549193" y="888013"/>
+              <a:off x="5629689" y="916947"/>
               <a:ext cx="1403662" cy="498089"/>
             </a:xfrm>
             <a:prstGeom prst="rect">
@@ -5341,8 +5268,8 @@
             <a:lstStyle/>
             <a:p>
               <a:r>
-                <a:rPr lang="es-ES" sz="2116" dirty="0"/>
-                <a:t>s_day_of_week</a:t>
+                <a:rPr lang="es-ES" sz="2116" dirty="0" smtClean="0"/>
+                <a:t>s_week_day</a:t>
               </a:r>
               <a:endParaRPr lang="en-US" sz="2116" dirty="0"/>
             </a:p>
@@ -5357,7 +5284,7 @@
         </p:nvGrpSpPr>
         <p:grpSpPr>
           <a:xfrm>
-            <a:off x="23865867" y="10113213"/>
+            <a:off x="19517391" y="5739836"/>
             <a:ext cx="1323508" cy="485776"/>
             <a:chOff x="5367366" y="876525"/>
             <a:chExt cx="1682712" cy="578940"/>
@@ -5453,7 +5380,7 @@
         </p:nvGrpSpPr>
         <p:grpSpPr>
           <a:xfrm>
-            <a:off x="22361070" y="11530120"/>
+            <a:off x="22433611" y="5964326"/>
             <a:ext cx="1885132" cy="607728"/>
             <a:chOff x="5367366" y="876525"/>
             <a:chExt cx="1682712" cy="578940"/>
@@ -5549,7 +5476,7 @@
         </p:nvCxnSpPr>
         <p:spPr>
           <a:xfrm>
-            <a:off x="22583716" y="11946846"/>
+            <a:off x="22633058" y="6407056"/>
             <a:ext cx="1437288" cy="0"/>
           </a:xfrm>
           <a:prstGeom prst="line">
@@ -5580,15 +5507,15 @@
         <p:nvCxnSpPr>
           <p:cNvPr id="5" name="Straight Connector 4"/>
           <p:cNvCxnSpPr>
-            <a:stCxn id="125" idx="2"/>
-            <a:endCxn id="95" idx="0"/>
+            <a:stCxn id="125" idx="0"/>
+            <a:endCxn id="95" idx="5"/>
           </p:cNvCxnSpPr>
           <p:nvPr/>
         </p:nvCxnSpPr>
         <p:spPr>
-          <a:xfrm>
-            <a:off x="22052481" y="9625318"/>
-            <a:ext cx="2475141" cy="487898"/>
+          <a:xfrm flipH="1" flipV="1">
+            <a:off x="20647076" y="6154472"/>
+            <a:ext cx="1306354" cy="914695"/>
           </a:xfrm>
           <a:prstGeom prst="line">
             <a:avLst/>
@@ -5614,15 +5541,15 @@
         <p:nvCxnSpPr>
           <p:cNvPr id="13" name="Straight Connector 12"/>
           <p:cNvCxnSpPr>
-            <a:stCxn id="125" idx="2"/>
-            <a:endCxn id="112" idx="0"/>
+            <a:stCxn id="125" idx="0"/>
+            <a:endCxn id="112" idx="3"/>
           </p:cNvCxnSpPr>
           <p:nvPr/>
         </p:nvCxnSpPr>
         <p:spPr>
-          <a:xfrm>
-            <a:off x="22052480" y="9625316"/>
-            <a:ext cx="1251153" cy="1904802"/>
+          <a:xfrm flipV="1">
+            <a:off x="21953430" y="6483054"/>
+            <a:ext cx="756252" cy="586113"/>
           </a:xfrm>
           <a:prstGeom prst="line">
             <a:avLst/>
@@ -5652,15 +5579,15 @@
         <p:nvCxnSpPr>
           <p:cNvPr id="28" name="Straight Connector 27"/>
           <p:cNvCxnSpPr>
-            <a:stCxn id="256" idx="0"/>
-            <a:endCxn id="125" idx="2"/>
+            <a:stCxn id="256" idx="4"/>
+            <a:endCxn id="125" idx="0"/>
           </p:cNvCxnSpPr>
           <p:nvPr/>
         </p:nvCxnSpPr>
         <p:spPr>
-          <a:xfrm flipH="1" flipV="1">
-            <a:off x="22052483" y="9625318"/>
-            <a:ext cx="1863148" cy="1257753"/>
+          <a:xfrm>
+            <a:off x="21857232" y="6056923"/>
+            <a:ext cx="96198" cy="1012244"/>
           </a:xfrm>
           <a:prstGeom prst="line">
             <a:avLst/>
@@ -5690,15 +5617,15 @@
         <p:nvCxnSpPr>
           <p:cNvPr id="33" name="Straight Connector 32"/>
           <p:cNvCxnSpPr>
-            <a:stCxn id="396" idx="2"/>
-            <a:endCxn id="147" idx="0"/>
+            <a:stCxn id="396" idx="0"/>
+            <a:endCxn id="147" idx="2"/>
           </p:cNvCxnSpPr>
           <p:nvPr/>
         </p:nvCxnSpPr>
         <p:spPr>
-          <a:xfrm flipH="1">
-            <a:off x="24860993" y="4190151"/>
-            <a:ext cx="125568" cy="963320"/>
+          <a:xfrm flipH="1" flipV="1">
+            <a:off x="21949422" y="13291626"/>
+            <a:ext cx="861463" cy="666540"/>
           </a:xfrm>
           <a:prstGeom prst="line">
             <a:avLst/>
@@ -5732,7 +5659,7 @@
         </p:nvGrpSpPr>
         <p:grpSpPr>
           <a:xfrm>
-            <a:off x="13230877" y="9705518"/>
+            <a:off x="12567794" y="8225381"/>
             <a:ext cx="1132608" cy="576845"/>
             <a:chOff x="77002" y="961721"/>
             <a:chExt cx="2033245" cy="576845"/>
@@ -5878,7 +5805,7 @@
         </p:nvGrpSpPr>
         <p:grpSpPr>
           <a:xfrm>
-            <a:off x="10848777" y="9828344"/>
+            <a:off x="10185694" y="8348207"/>
             <a:ext cx="2074762" cy="485775"/>
             <a:chOff x="5367366" y="876525"/>
             <a:chExt cx="1682712" cy="578940"/>
@@ -5977,8 +5904,8 @@
         </p:nvCxnSpPr>
         <p:spPr>
           <a:xfrm>
-            <a:off x="13627475" y="9098624"/>
-            <a:ext cx="169705" cy="606891"/>
+            <a:off x="12854738" y="7595227"/>
+            <a:ext cx="279360" cy="630154"/>
           </a:xfrm>
           <a:prstGeom prst="line">
             <a:avLst/>
@@ -6015,8 +5942,8 @@
         </p:nvCxnSpPr>
         <p:spPr>
           <a:xfrm flipV="1">
-            <a:off x="12619698" y="9098624"/>
-            <a:ext cx="1007780" cy="800861"/>
+            <a:off x="11956614" y="7595227"/>
+            <a:ext cx="898124" cy="824120"/>
           </a:xfrm>
           <a:prstGeom prst="line">
             <a:avLst/>
@@ -6050,7 +5977,7 @@
         </p:nvGrpSpPr>
         <p:grpSpPr>
           <a:xfrm>
-            <a:off x="8518744" y="14686326"/>
+            <a:off x="8032152" y="13235368"/>
             <a:ext cx="1108251" cy="504399"/>
             <a:chOff x="559493" y="9648729"/>
             <a:chExt cx="1108252" cy="504400"/>
@@ -6200,8 +6127,8 @@
         </p:nvCxnSpPr>
         <p:spPr>
           <a:xfrm flipH="1">
-            <a:off x="9029511" y="14390876"/>
-            <a:ext cx="826730" cy="314080"/>
+            <a:off x="8542916" y="12910741"/>
+            <a:ext cx="650241" cy="343254"/>
           </a:xfrm>
           <a:prstGeom prst="line">
             <a:avLst/>
@@ -6231,7 +6158,7 @@
         </p:nvGrpSpPr>
         <p:grpSpPr>
           <a:xfrm>
-            <a:off x="5220469" y="13309061"/>
+            <a:off x="4450498" y="12850970"/>
             <a:ext cx="888897" cy="500451"/>
             <a:chOff x="559493" y="9652678"/>
             <a:chExt cx="1051424" cy="500451"/>
@@ -6378,7 +6305,7 @@
         </p:nvGrpSpPr>
         <p:grpSpPr>
           <a:xfrm>
-            <a:off x="5170937" y="14116253"/>
+            <a:off x="4454334" y="11776995"/>
             <a:ext cx="897464" cy="514837"/>
             <a:chOff x="559491" y="9638292"/>
             <a:chExt cx="1021529" cy="514837"/>
@@ -6522,14 +6449,14 @@
           <p:cNvPr id="76" name="Straight Connector 75"/>
           <p:cNvCxnSpPr>
             <a:stCxn id="18" idx="1"/>
-            <a:endCxn id="156" idx="5"/>
+            <a:endCxn id="156" idx="6"/>
           </p:cNvCxnSpPr>
           <p:nvPr/>
         </p:nvCxnSpPr>
         <p:spPr>
-          <a:xfrm flipH="1" flipV="1">
-            <a:off x="5957619" y="13738375"/>
-            <a:ext cx="1111746" cy="377866"/>
+          <a:xfrm flipH="1">
+            <a:off x="5314121" y="12636104"/>
+            <a:ext cx="1092161" cy="472431"/>
           </a:xfrm>
           <a:prstGeom prst="line">
             <a:avLst/>
@@ -6561,9 +6488,9 @@
           <p:nvPr/>
         </p:nvCxnSpPr>
         <p:spPr>
-          <a:xfrm flipH="1">
-            <a:off x="6068401" y="14116241"/>
-            <a:ext cx="1000961" cy="271952"/>
+          <a:xfrm flipH="1" flipV="1">
+            <a:off x="5351798" y="12048946"/>
+            <a:ext cx="1054484" cy="587158"/>
           </a:xfrm>
           <a:prstGeom prst="line">
             <a:avLst/>
@@ -6597,7 +6524,7 @@
         </p:nvGrpSpPr>
         <p:grpSpPr>
           <a:xfrm>
-            <a:off x="13791098" y="12687128"/>
+            <a:off x="13128015" y="11206991"/>
             <a:ext cx="897464" cy="514837"/>
             <a:chOff x="559491" y="9638292"/>
             <a:chExt cx="1021529" cy="514837"/>
@@ -6744,7 +6671,7 @@
         </p:nvGrpSpPr>
         <p:grpSpPr>
           <a:xfrm>
-            <a:off x="12323408" y="12700986"/>
+            <a:off x="11660325" y="11220849"/>
             <a:ext cx="1054477" cy="500452"/>
             <a:chOff x="559493" y="9652678"/>
             <a:chExt cx="1051424" cy="500451"/>
@@ -6894,7 +6821,7 @@
         </p:nvCxnSpPr>
         <p:spPr>
           <a:xfrm flipH="1" flipV="1">
-            <a:off x="13197868" y="13130282"/>
+            <a:off x="12534785" y="11650145"/>
             <a:ext cx="379384" cy="735689"/>
           </a:xfrm>
           <a:prstGeom prst="line">
@@ -6928,7 +6855,7 @@
         </p:nvCxnSpPr>
         <p:spPr>
           <a:xfrm flipV="1">
-            <a:off x="13577254" y="13130817"/>
+            <a:off x="12914171" y="11650680"/>
             <a:ext cx="345274" cy="735156"/>
           </a:xfrm>
           <a:prstGeom prst="line">
@@ -6959,10 +6886,10 @@
         </p:nvGrpSpPr>
         <p:grpSpPr>
           <a:xfrm>
-            <a:off x="17946436" y="2104698"/>
-            <a:ext cx="2235900" cy="731554"/>
+            <a:off x="17372035" y="12732893"/>
+            <a:ext cx="2403223" cy="770015"/>
             <a:chOff x="77002" y="961720"/>
-            <a:chExt cx="2033245" cy="576847"/>
+            <a:chExt cx="2185402" cy="576847"/>
           </a:xfrm>
         </p:grpSpPr>
         <p:grpSp>
@@ -6974,9 +6901,9 @@
           <p:grpSpPr>
             <a:xfrm>
               <a:off x="77002" y="961720"/>
-              <a:ext cx="2033245" cy="576847"/>
+              <a:ext cx="2185402" cy="576847"/>
               <a:chOff x="5367366" y="876525"/>
-              <a:chExt cx="1682712" cy="578940"/>
+              <a:chExt cx="1808637" cy="578940"/>
             </a:xfrm>
           </p:grpSpPr>
           <p:sp>
@@ -7038,7 +6965,7 @@
             </p:nvSpPr>
             <p:spPr>
               <a:xfrm>
-                <a:off x="5448461" y="974118"/>
+                <a:off x="5629251" y="1014787"/>
                 <a:ext cx="1546752" cy="330747"/>
               </a:xfrm>
               <a:prstGeom prst="rect">
@@ -7054,7 +6981,11 @@
               <a:p>
                 <a:r>
                   <a:rPr lang="es-ES" sz="2116" dirty="0"/>
-                  <a:t>high_start_time</a:t>
+                  <a:t>s</a:t>
+                </a:r>
+                <a:r>
+                  <a:rPr lang="es-ES" sz="2116" dirty="0" smtClean="0"/>
+                  <a:t>_date_time</a:t>
                 </a:r>
                 <a:endParaRPr lang="en-US" sz="2116" dirty="0"/>
               </a:p>
@@ -7105,10 +7036,10 @@
         </p:nvGrpSpPr>
         <p:grpSpPr>
           <a:xfrm>
-            <a:off x="21894795" y="2027673"/>
-            <a:ext cx="2176806" cy="731554"/>
-            <a:chOff x="77002" y="961721"/>
-            <a:chExt cx="2033245" cy="576847"/>
+            <a:off x="17412616" y="9826643"/>
+            <a:ext cx="2325077" cy="678944"/>
+            <a:chOff x="77002" y="961720"/>
+            <a:chExt cx="2171737" cy="576847"/>
           </a:xfrm>
         </p:grpSpPr>
         <p:grpSp>
@@ -7119,10 +7050,10 @@
           </p:nvGrpSpPr>
           <p:grpSpPr>
             <a:xfrm>
-              <a:off x="77002" y="961721"/>
-              <a:ext cx="2033245" cy="576847"/>
-              <a:chOff x="5367366" y="876525"/>
-              <a:chExt cx="1682712" cy="578940"/>
+              <a:off x="77002" y="961720"/>
+              <a:ext cx="2171737" cy="576847"/>
+              <a:chOff x="5367366" y="876524"/>
+              <a:chExt cx="1797328" cy="578940"/>
             </a:xfrm>
           </p:grpSpPr>
           <p:sp>
@@ -7133,7 +7064,7 @@
             </p:nvSpPr>
             <p:spPr>
               <a:xfrm>
-                <a:off x="5367366" y="876525"/>
+                <a:off x="5367366" y="876524"/>
                 <a:ext cx="1682712" cy="578940"/>
               </a:xfrm>
               <a:prstGeom prst="ellipse">
@@ -7184,7 +7115,7 @@
             </p:nvSpPr>
             <p:spPr>
               <a:xfrm>
-                <a:off x="5471934" y="978689"/>
+                <a:off x="5617942" y="978174"/>
                 <a:ext cx="1546752" cy="330747"/>
               </a:xfrm>
               <a:prstGeom prst="rect">
@@ -7200,7 +7131,11 @@
               <a:p>
                 <a:r>
                   <a:rPr lang="es-ES" sz="2116" dirty="0"/>
-                  <a:t>high_end_time</a:t>
+                  <a:t>e</a:t>
+                </a:r>
+                <a:r>
+                  <a:rPr lang="es-ES" sz="2116" dirty="0" smtClean="0"/>
+                  <a:t>_date_time</a:t>
                 </a:r>
                 <a:endParaRPr lang="en-US" sz="2116" dirty="0"/>
               </a:p>
@@ -7215,7 +7150,7 @@
           </p:nvCxnSpPr>
           <p:spPr>
             <a:xfrm>
-              <a:off x="372867" y="1386037"/>
+              <a:off x="400595" y="1414920"/>
               <a:ext cx="1437289" cy="0"/>
             </a:xfrm>
             <a:prstGeom prst="line">
@@ -7247,15 +7182,15 @@
         <p:nvCxnSpPr>
           <p:cNvPr id="215" name="Straight Connector 214"/>
           <p:cNvCxnSpPr>
-            <a:stCxn id="207" idx="6"/>
-            <a:endCxn id="103" idx="0"/>
+            <a:stCxn id="207" idx="0"/>
+            <a:endCxn id="103" idx="2"/>
           </p:cNvCxnSpPr>
           <p:nvPr/>
         </p:nvCxnSpPr>
         <p:spPr>
-          <a:xfrm>
-            <a:off x="20182339" y="2470473"/>
-            <a:ext cx="752879" cy="784876"/>
+          <a:xfrm flipV="1">
+            <a:off x="18489985" y="11858338"/>
+            <a:ext cx="11496" cy="874555"/>
           </a:xfrm>
           <a:prstGeom prst="line">
             <a:avLst/>
@@ -7286,14 +7221,14 @@
           <p:cNvPr id="217" name="Straight Connector 216"/>
           <p:cNvCxnSpPr>
             <a:stCxn id="103" idx="0"/>
-            <a:endCxn id="212" idx="2"/>
+            <a:endCxn id="212" idx="4"/>
           </p:cNvCxnSpPr>
           <p:nvPr/>
         </p:nvCxnSpPr>
         <p:spPr>
-          <a:xfrm flipV="1">
-            <a:off x="20935216" y="2393446"/>
-            <a:ext cx="959579" cy="861903"/>
+          <a:xfrm flipH="1" flipV="1">
+            <a:off x="18501021" y="10505588"/>
+            <a:ext cx="460" cy="837035"/>
           </a:xfrm>
           <a:prstGeom prst="line">
             <a:avLst/>
@@ -7327,7 +7262,7 @@
         </p:nvGrpSpPr>
         <p:grpSpPr>
           <a:xfrm>
-            <a:off x="10479081" y="4412668"/>
+            <a:off x="15540612" y="2940173"/>
             <a:ext cx="1631031" cy="515716"/>
             <a:chOff x="2531026" y="3974531"/>
             <a:chExt cx="1751806" cy="515714"/>
@@ -7418,7 +7353,7 @@
         </p:nvGrpSpPr>
         <p:grpSpPr>
           <a:xfrm>
-            <a:off x="8166217" y="5996722"/>
+            <a:off x="11711025" y="2816344"/>
             <a:ext cx="1591658" cy="731554"/>
             <a:chOff x="77004" y="961721"/>
             <a:chExt cx="2047831" cy="576847"/>
@@ -7560,15 +7495,15 @@
         <p:nvCxnSpPr>
           <p:cNvPr id="231" name="Straight Connector 230"/>
           <p:cNvCxnSpPr>
-            <a:stCxn id="224" idx="7"/>
-            <a:endCxn id="219" idx="2"/>
+            <a:stCxn id="224" idx="6"/>
+            <a:endCxn id="219" idx="1"/>
           </p:cNvCxnSpPr>
           <p:nvPr/>
         </p:nvCxnSpPr>
         <p:spPr>
-          <a:xfrm flipV="1">
-            <a:off x="9515102" y="4928378"/>
-            <a:ext cx="1779493" cy="1175480"/>
+          <a:xfrm>
+            <a:off x="13291347" y="3182121"/>
+            <a:ext cx="2249265" cy="15910"/>
           </a:xfrm>
           <a:prstGeom prst="line">
             <a:avLst/>
@@ -7602,7 +7537,7 @@
         </p:nvGrpSpPr>
         <p:grpSpPr>
           <a:xfrm>
-            <a:off x="7727042" y="2000229"/>
+            <a:off x="19106289" y="2858300"/>
             <a:ext cx="1639782" cy="731555"/>
             <a:chOff x="77006" y="961721"/>
             <a:chExt cx="2109749" cy="576847"/>
@@ -7748,7 +7683,7 @@
         </p:nvGrpSpPr>
         <p:grpSpPr>
           <a:xfrm>
-            <a:off x="23413016" y="10883071"/>
+            <a:off x="21354619" y="5571147"/>
             <a:ext cx="1005225" cy="485776"/>
             <a:chOff x="5367366" y="876525"/>
             <a:chExt cx="1682712" cy="578940"/>
@@ -7844,7 +7779,7 @@
         </p:nvGrpSpPr>
         <p:grpSpPr>
           <a:xfrm>
-            <a:off x="5957410" y="6843698"/>
+            <a:off x="10126845" y="4217311"/>
             <a:ext cx="1955704" cy="485776"/>
             <a:chOff x="5367366" y="876525"/>
             <a:chExt cx="1682712" cy="578940"/>
@@ -7940,7 +7875,7 @@
         </p:nvGrpSpPr>
         <p:grpSpPr>
           <a:xfrm>
-            <a:off x="8997033" y="6951614"/>
+            <a:off x="9140403" y="2494663"/>
             <a:ext cx="1868650" cy="485776"/>
             <a:chOff x="5367366" y="876525"/>
             <a:chExt cx="1682712" cy="578940"/>
@@ -8020,7 +7955,7 @@
             <a:lstStyle/>
             <a:p>
               <a:r>
-                <a:rPr lang="es-ES" sz="2116" dirty="0" err="1"/>
+                <a:rPr lang="es-ES" sz="2116" dirty="0"/>
                 <a:t>s_date_time</a:t>
               </a:r>
               <a:endParaRPr lang="en-US" sz="2116" dirty="0"/>
@@ -8038,9 +7973,9 @@
           <p:nvPr/>
         </p:nvCxnSpPr>
         <p:spPr>
-          <a:xfrm>
-            <a:off x="6497940" y="6333663"/>
-            <a:ext cx="1668275" cy="28835"/>
+          <a:xfrm flipV="1">
+            <a:off x="10750527" y="3182121"/>
+            <a:ext cx="960498" cy="607959"/>
           </a:xfrm>
           <a:prstGeom prst="line">
             <a:avLst/>
@@ -8066,15 +8001,14 @@
         <p:nvCxnSpPr>
           <p:cNvPr id="214" name="Conexão reta 213"/>
           <p:cNvCxnSpPr>
-            <a:stCxn id="274" idx="0"/>
-            <a:endCxn id="224" idx="5"/>
+            <a:endCxn id="224" idx="2"/>
           </p:cNvCxnSpPr>
           <p:nvPr/>
         </p:nvCxnSpPr>
         <p:spPr>
-          <a:xfrm flipH="1" flipV="1">
-            <a:off x="9515102" y="6621145"/>
-            <a:ext cx="416256" cy="330468"/>
+          <a:xfrm>
+            <a:off x="10818986" y="2909345"/>
+            <a:ext cx="892039" cy="272776"/>
           </a:xfrm>
           <a:prstGeom prst="line">
             <a:avLst/>
@@ -8100,15 +8034,15 @@
         <p:nvCxnSpPr>
           <p:cNvPr id="251" name="Conexão reta 250"/>
           <p:cNvCxnSpPr>
-            <a:stCxn id="271" idx="6"/>
+            <a:stCxn id="271" idx="0"/>
             <a:endCxn id="224" idx="3"/>
           </p:cNvCxnSpPr>
           <p:nvPr/>
         </p:nvCxnSpPr>
         <p:spPr>
           <a:xfrm flipV="1">
-            <a:off x="7913113" y="6621141"/>
-            <a:ext cx="484535" cy="465443"/>
+            <a:off x="11104697" y="3440764"/>
+            <a:ext cx="837761" cy="776547"/>
           </a:xfrm>
           <a:prstGeom prst="line">
             <a:avLst/>
@@ -8138,10 +8072,10 @@
         </p:nvGrpSpPr>
         <p:grpSpPr>
           <a:xfrm>
-            <a:off x="9785051" y="2474623"/>
-            <a:ext cx="2380330" cy="485776"/>
-            <a:chOff x="5367366" y="876525"/>
-            <a:chExt cx="1682712" cy="578940"/>
+            <a:off x="21123218" y="3584559"/>
+            <a:ext cx="2412838" cy="487716"/>
+            <a:chOff x="5367366" y="874213"/>
+            <a:chExt cx="1705693" cy="581252"/>
           </a:xfrm>
         </p:grpSpPr>
         <p:sp>
@@ -8203,7 +8137,7 @@
           </p:nvSpPr>
           <p:spPr>
             <a:xfrm>
-              <a:off x="5549193" y="888013"/>
+              <a:off x="5669397" y="874213"/>
               <a:ext cx="1403662" cy="498089"/>
             </a:xfrm>
             <a:prstGeom prst="rect">
@@ -8218,8 +8152,8 @@
             <a:lstStyle/>
             <a:p>
               <a:r>
-                <a:rPr lang="es-ES" sz="2116" dirty="0" err="1"/>
-                <a:t>e_day_of_week</a:t>
+                <a:rPr lang="es-ES" sz="2116" dirty="0" smtClean="0"/>
+                <a:t>e_week_day</a:t>
               </a:r>
               <a:endParaRPr lang="en-US" sz="2116" dirty="0"/>
             </a:p>
@@ -8237,8 +8171,8 @@
         </p:nvCxnSpPr>
         <p:spPr>
           <a:xfrm>
-            <a:off x="9075931" y="2624647"/>
-            <a:ext cx="709119" cy="92862"/>
+            <a:off x="20455177" y="3482721"/>
+            <a:ext cx="668041" cy="346666"/>
           </a:xfrm>
           <a:prstGeom prst="line">
             <a:avLst/>
@@ -8268,7 +8202,7 @@
         </p:nvGrpSpPr>
         <p:grpSpPr>
           <a:xfrm>
-            <a:off x="6343055" y="2975681"/>
+            <a:off x="17736770" y="3993201"/>
             <a:ext cx="1955704" cy="485776"/>
             <a:chOff x="5367366" y="876525"/>
             <a:chExt cx="1682712" cy="578940"/>
@@ -8348,7 +8282,7 @@
             <a:lstStyle/>
             <a:p>
               <a:r>
-                <a:rPr lang="es-ES" sz="2116" dirty="0" err="1"/>
+                <a:rPr lang="es-ES" sz="2116" dirty="0"/>
                 <a:t>e_time_zone</a:t>
               </a:r>
               <a:endParaRPr lang="en-US" sz="2116" dirty="0"/>
@@ -8364,7 +8298,7 @@
         </p:nvGrpSpPr>
         <p:grpSpPr>
           <a:xfrm>
-            <a:off x="5253192" y="2184635"/>
+            <a:off x="20882466" y="2272399"/>
             <a:ext cx="1983945" cy="485776"/>
             <a:chOff x="5367366" y="876525"/>
             <a:chExt cx="1682712" cy="578940"/>
@@ -8444,7 +8378,7 @@
             <a:lstStyle/>
             <a:p>
               <a:r>
-                <a:rPr lang="es-ES" sz="2116" dirty="0" err="1"/>
+                <a:rPr lang="es-ES" sz="2116" dirty="0"/>
                 <a:t>e_date_time</a:t>
               </a:r>
               <a:endParaRPr lang="en-US" sz="2116" dirty="0"/>
@@ -8456,15 +8390,15 @@
         <p:nvCxnSpPr>
           <p:cNvPr id="310" name="Conexão reta 309"/>
           <p:cNvCxnSpPr>
-            <a:stCxn id="244" idx="4"/>
-            <a:endCxn id="219" idx="0"/>
+            <a:stCxn id="244" idx="2"/>
+            <a:endCxn id="219" idx="3"/>
           </p:cNvCxnSpPr>
           <p:nvPr/>
         </p:nvCxnSpPr>
         <p:spPr>
-          <a:xfrm>
-            <a:off x="8517205" y="2731781"/>
-            <a:ext cx="2777388" cy="1680880"/>
+          <a:xfrm flipH="1" flipV="1">
+            <a:off x="17171643" y="3198031"/>
+            <a:ext cx="1934646" cy="26047"/>
           </a:xfrm>
           <a:prstGeom prst="line">
             <a:avLst/>
@@ -8490,15 +8424,15 @@
         <p:nvCxnSpPr>
           <p:cNvPr id="311" name="Conexão reta 310"/>
           <p:cNvCxnSpPr>
-            <a:stCxn id="305" idx="6"/>
-            <a:endCxn id="244" idx="2"/>
+            <a:stCxn id="305" idx="3"/>
+            <a:endCxn id="244" idx="7"/>
           </p:cNvCxnSpPr>
           <p:nvPr/>
         </p:nvCxnSpPr>
         <p:spPr>
-          <a:xfrm flipV="1">
-            <a:off x="7237137" y="2366006"/>
-            <a:ext cx="489907" cy="61517"/>
+          <a:xfrm flipH="1">
+            <a:off x="20455177" y="2687035"/>
+            <a:ext cx="717831" cy="278399"/>
           </a:xfrm>
           <a:prstGeom prst="line">
             <a:avLst/>
@@ -8524,51 +8458,17 @@
         <p:nvCxnSpPr>
           <p:cNvPr id="315" name="Conexão reta 314"/>
           <p:cNvCxnSpPr>
-            <a:stCxn id="244" idx="3"/>
+            <a:stCxn id="244" idx="4"/>
             <a:endCxn id="302" idx="0"/>
           </p:cNvCxnSpPr>
           <p:nvPr/>
         </p:nvCxnSpPr>
         <p:spPr>
           <a:xfrm flipH="1">
-            <a:off x="7320905" y="2624647"/>
-            <a:ext cx="637571" cy="351033"/>
+            <a:off x="18714622" y="3589855"/>
+            <a:ext cx="1181828" cy="403346"/>
           </a:xfrm>
           <a:prstGeom prst="line">
-            <a:avLst/>
-          </a:prstGeom>
-          <a:ln w="19050"/>
-        </p:spPr>
-        <p:style>
-          <a:lnRef idx="1">
-            <a:schemeClr val="dk1"/>
-          </a:lnRef>
-          <a:fillRef idx="0">
-            <a:schemeClr val="dk1"/>
-          </a:fillRef>
-          <a:effectRef idx="0">
-            <a:schemeClr val="dk1"/>
-          </a:effectRef>
-          <a:fontRef idx="minor">
-            <a:schemeClr val="tx1"/>
-          </a:fontRef>
-        </p:style>
-      </p:cxnSp>
-      <p:cxnSp>
-        <p:nvCxnSpPr>
-          <p:cNvPr id="379" name="Conexão em ângulos retos 378"/>
-          <p:cNvCxnSpPr>
-            <a:stCxn id="103" idx="2"/>
-            <a:endCxn id="128" idx="1"/>
-          </p:cNvCxnSpPr>
-          <p:nvPr/>
-        </p:nvCxnSpPr>
-        <p:spPr>
-          <a:xfrm rot="16200000" flipH="1">
-            <a:off x="19009459" y="5696824"/>
-            <a:ext cx="4207078" cy="355559"/>
-          </a:xfrm>
-          <a:prstGeom prst="bentConnector2">
             <a:avLst/>
           </a:prstGeom>
           <a:ln w="19050"/>
@@ -8596,7 +8496,7 @@
         </p:nvGrpSpPr>
         <p:grpSpPr>
           <a:xfrm>
-            <a:off x="23413016" y="3992802"/>
+            <a:off x="20647076" y="13931592"/>
             <a:ext cx="1005225" cy="485776"/>
             <a:chOff x="5367366" y="876525"/>
             <a:chExt cx="1682712" cy="578940"/>
@@ -8688,15 +8588,15 @@
         <p:nvCxnSpPr>
           <p:cNvPr id="390" name="Straight Connector 32"/>
           <p:cNvCxnSpPr>
-            <a:stCxn id="147" idx="0"/>
-            <a:endCxn id="386" idx="6"/>
+            <a:stCxn id="147" idx="2"/>
+            <a:endCxn id="386" idx="0"/>
           </p:cNvCxnSpPr>
           <p:nvPr/>
         </p:nvCxnSpPr>
         <p:spPr>
-          <a:xfrm flipH="1" flipV="1">
-            <a:off x="24418241" y="4235687"/>
-            <a:ext cx="442752" cy="917783"/>
+          <a:xfrm flipH="1">
+            <a:off x="21149689" y="13291626"/>
+            <a:ext cx="799733" cy="639966"/>
           </a:xfrm>
           <a:prstGeom prst="line">
             <a:avLst/>
@@ -8730,7 +8630,7 @@
         </p:nvGrpSpPr>
         <p:grpSpPr>
           <a:xfrm>
-            <a:off x="24986562" y="3901730"/>
+            <a:off x="22078440" y="13958166"/>
             <a:ext cx="1464889" cy="576845"/>
             <a:chOff x="77002" y="961721"/>
             <a:chExt cx="2033245" cy="576845"/>
@@ -8824,7 +8724,7 @@
               <a:lstStyle/>
               <a:p>
                 <a:r>
-                  <a:rPr lang="es-ES" sz="2116" dirty="0" err="1"/>
+                  <a:rPr lang="es-ES" sz="2116" dirty="0"/>
                   <a:t>digit_code</a:t>
                 </a:r>
                 <a:endParaRPr lang="en-US" sz="2116" dirty="0"/>
@@ -8868,146 +8768,6 @@
           </p:style>
         </p:cxnSp>
       </p:grpSp>
-      <p:cxnSp>
-        <p:nvCxnSpPr>
-          <p:cNvPr id="447" name="Conexão reta 446"/>
-          <p:cNvCxnSpPr>
-            <a:stCxn id="125" idx="0"/>
-            <a:endCxn id="128" idx="2"/>
-          </p:cNvCxnSpPr>
-          <p:nvPr/>
-        </p:nvCxnSpPr>
-        <p:spPr>
-          <a:xfrm flipH="1" flipV="1">
-            <a:off x="22033900" y="8666293"/>
-            <a:ext cx="18585" cy="443308"/>
-          </a:xfrm>
-          <a:prstGeom prst="line">
-            <a:avLst/>
-          </a:prstGeom>
-          <a:ln w="12700"/>
-        </p:spPr>
-        <p:style>
-          <a:lnRef idx="1">
-            <a:schemeClr val="dk1"/>
-          </a:lnRef>
-          <a:fillRef idx="0">
-            <a:schemeClr val="dk1"/>
-          </a:fillRef>
-          <a:effectRef idx="0">
-            <a:schemeClr val="dk1"/>
-          </a:effectRef>
-          <a:fontRef idx="minor">
-            <a:schemeClr val="tx1"/>
-          </a:fontRef>
-        </p:style>
-      </p:cxnSp>
-      <p:cxnSp>
-        <p:nvCxnSpPr>
-          <p:cNvPr id="449" name="Conexão em ângulos retos 448"/>
-          <p:cNvCxnSpPr>
-            <a:stCxn id="128" idx="3"/>
-            <a:endCxn id="125" idx="3"/>
-          </p:cNvCxnSpPr>
-          <p:nvPr/>
-        </p:nvCxnSpPr>
-        <p:spPr>
-          <a:xfrm flipH="1">
-            <a:off x="22732110" y="7978144"/>
-            <a:ext cx="44906" cy="1389316"/>
-          </a:xfrm>
-          <a:prstGeom prst="bentConnector3">
-            <a:avLst>
-              <a:gd name="adj1" fmla="val -509041"/>
-            </a:avLst>
-          </a:prstGeom>
-          <a:ln w="19050"/>
-        </p:spPr>
-        <p:style>
-          <a:lnRef idx="1">
-            <a:schemeClr val="dk1"/>
-          </a:lnRef>
-          <a:fillRef idx="0">
-            <a:schemeClr val="dk1"/>
-          </a:fillRef>
-          <a:effectRef idx="0">
-            <a:schemeClr val="dk1"/>
-          </a:effectRef>
-          <a:fontRef idx="minor">
-            <a:schemeClr val="tx1"/>
-          </a:fontRef>
-        </p:style>
-      </p:cxnSp>
-      <p:cxnSp>
-        <p:nvCxnSpPr>
-          <p:cNvPr id="452" name="Conexão em ângulos retos 451"/>
-          <p:cNvCxnSpPr>
-            <a:stCxn id="141" idx="2"/>
-            <a:endCxn id="125" idx="3"/>
-          </p:cNvCxnSpPr>
-          <p:nvPr/>
-        </p:nvCxnSpPr>
-        <p:spPr>
-          <a:xfrm rot="5400000">
-            <a:off x="22904378" y="7410845"/>
-            <a:ext cx="1784345" cy="2128882"/>
-          </a:xfrm>
-          <a:prstGeom prst="bentConnector2">
-            <a:avLst/>
-          </a:prstGeom>
-          <a:ln w="19050"/>
-        </p:spPr>
-        <p:style>
-          <a:lnRef idx="1">
-            <a:schemeClr val="dk1"/>
-          </a:lnRef>
-          <a:fillRef idx="0">
-            <a:schemeClr val="dk1"/>
-          </a:fillRef>
-          <a:effectRef idx="0">
-            <a:schemeClr val="dk1"/>
-          </a:effectRef>
-          <a:fontRef idx="minor">
-            <a:schemeClr val="tx1"/>
-          </a:fontRef>
-        </p:style>
-      </p:cxnSp>
-      <p:cxnSp>
-        <p:nvCxnSpPr>
-          <p:cNvPr id="458" name="Conexão em ângulos retos 457"/>
-          <p:cNvCxnSpPr>
-            <a:stCxn id="104" idx="3"/>
-            <a:endCxn id="141" idx="1"/>
-          </p:cNvCxnSpPr>
-          <p:nvPr/>
-        </p:nvCxnSpPr>
-        <p:spPr>
-          <a:xfrm>
-            <a:off x="21750732" y="3516472"/>
-            <a:ext cx="2367139" cy="3378494"/>
-          </a:xfrm>
-          <a:prstGeom prst="bentConnector3">
-            <a:avLst>
-              <a:gd name="adj1" fmla="val 50000"/>
-            </a:avLst>
-          </a:prstGeom>
-          <a:ln w="19050"/>
-        </p:spPr>
-        <p:style>
-          <a:lnRef idx="1">
-            <a:schemeClr val="dk1"/>
-          </a:lnRef>
-          <a:fillRef idx="0">
-            <a:schemeClr val="dk1"/>
-          </a:fillRef>
-          <a:effectRef idx="0">
-            <a:schemeClr val="dk1"/>
-          </a:effectRef>
-          <a:fontRef idx="minor">
-            <a:schemeClr val="tx1"/>
-          </a:fontRef>
-        </p:style>
-      </p:cxnSp>
       <p:grpSp>
         <p:nvGrpSpPr>
           <p:cNvPr id="467" name="Group 88"/>
@@ -9016,7 +8776,7 @@
         </p:nvGrpSpPr>
         <p:grpSpPr>
           <a:xfrm>
-            <a:off x="12967933" y="6048662"/>
+            <a:off x="15666069" y="6693615"/>
             <a:ext cx="1332663" cy="1238250"/>
             <a:chOff x="5930900" y="1130300"/>
             <a:chExt cx="1332664" cy="1238250"/>
@@ -9077,7 +8837,7 @@
           <p:spPr>
             <a:xfrm>
               <a:off x="6202704" y="1540522"/>
-              <a:ext cx="756042" cy="417935"/>
+              <a:ext cx="836512" cy="417935"/>
             </a:xfrm>
             <a:prstGeom prst="rect">
               <a:avLst/>
@@ -9091,120 +8851,14 @@
             <a:lstStyle/>
             <a:p>
               <a:r>
-                <a:rPr lang="es-ES" sz="2116" dirty="0" err="1"/>
-                <a:t>worn</a:t>
+                <a:rPr lang="es-ES" sz="2116" dirty="0" smtClean="0"/>
+                <a:t>wears</a:t>
               </a:r>
               <a:endParaRPr lang="en-US" sz="2116" dirty="0"/>
             </a:p>
           </p:txBody>
         </p:sp>
       </p:grpSp>
-      <p:cxnSp>
-        <p:nvCxnSpPr>
-          <p:cNvPr id="476" name="Conexão em ângulos retos 475"/>
-          <p:cNvCxnSpPr>
-            <a:stCxn id="219" idx="3"/>
-            <a:endCxn id="468" idx="0"/>
-          </p:cNvCxnSpPr>
-          <p:nvPr/>
-        </p:nvCxnSpPr>
-        <p:spPr>
-          <a:xfrm>
-            <a:off x="12110110" y="4670518"/>
-            <a:ext cx="1524155" cy="1378142"/>
-          </a:xfrm>
-          <a:prstGeom prst="bentConnector2">
-            <a:avLst/>
-          </a:prstGeom>
-          <a:ln w="19050"/>
-        </p:spPr>
-        <p:style>
-          <a:lnRef idx="1">
-            <a:schemeClr val="dk1"/>
-          </a:lnRef>
-          <a:fillRef idx="0">
-            <a:schemeClr val="dk1"/>
-          </a:fillRef>
-          <a:effectRef idx="0">
-            <a:schemeClr val="dk1"/>
-          </a:effectRef>
-          <a:fontRef idx="minor">
-            <a:schemeClr val="tx1"/>
-          </a:fontRef>
-        </p:style>
-      </p:cxnSp>
-      <p:cxnSp>
-        <p:nvCxnSpPr>
-          <p:cNvPr id="478" name="Conexão em ângulos retos 477"/>
-          <p:cNvCxnSpPr>
-            <a:stCxn id="468" idx="3"/>
-            <a:endCxn id="125" idx="1"/>
-          </p:cNvCxnSpPr>
-          <p:nvPr/>
-        </p:nvCxnSpPr>
-        <p:spPr>
-          <a:xfrm>
-            <a:off x="14300597" y="6667784"/>
-            <a:ext cx="7072257" cy="2699676"/>
-          </a:xfrm>
-          <a:prstGeom prst="bentConnector3">
-            <a:avLst>
-              <a:gd name="adj1" fmla="val 50000"/>
-            </a:avLst>
-          </a:prstGeom>
-          <a:ln w="19050"/>
-        </p:spPr>
-        <p:style>
-          <a:lnRef idx="1">
-            <a:schemeClr val="dk1"/>
-          </a:lnRef>
-          <a:fillRef idx="0">
-            <a:schemeClr val="dk1"/>
-          </a:fillRef>
-          <a:effectRef idx="0">
-            <a:schemeClr val="dk1"/>
-          </a:effectRef>
-          <a:fontRef idx="minor">
-            <a:schemeClr val="tx1"/>
-          </a:fontRef>
-        </p:style>
-      </p:cxnSp>
-      <p:cxnSp>
-        <p:nvCxnSpPr>
-          <p:cNvPr id="483" name="Conexão reta unidirecional 482"/>
-          <p:cNvCxnSpPr>
-            <a:stCxn id="468" idx="2"/>
-            <a:endCxn id="98" idx="0"/>
-          </p:cNvCxnSpPr>
-          <p:nvPr/>
-        </p:nvCxnSpPr>
-        <p:spPr>
-          <a:xfrm flipH="1">
-            <a:off x="13627478" y="7286912"/>
-            <a:ext cx="6787" cy="1219834"/>
-          </a:xfrm>
-          <a:prstGeom prst="straightConnector1">
-            <a:avLst/>
-          </a:prstGeom>
-          <a:ln w="19050">
-            <a:tailEnd type="triangle"/>
-          </a:ln>
-        </p:spPr>
-        <p:style>
-          <a:lnRef idx="1">
-            <a:schemeClr val="dk1"/>
-          </a:lnRef>
-          <a:fillRef idx="0">
-            <a:schemeClr val="dk1"/>
-          </a:fillRef>
-          <a:effectRef idx="0">
-            <a:schemeClr val="dk1"/>
-          </a:effectRef>
-          <a:fontRef idx="minor">
-            <a:schemeClr val="tx1"/>
-          </a:fontRef>
-        </p:style>
-      </p:cxnSp>
       <p:cxnSp>
         <p:nvCxnSpPr>
           <p:cNvPr id="313" name="Straight Connector 46"/>
@@ -9216,7 +8870,7 @@
         </p:nvCxnSpPr>
         <p:spPr>
           <a:xfrm flipV="1">
-            <a:off x="10449467" y="14128423"/>
+            <a:off x="9786384" y="12648286"/>
             <a:ext cx="733454" cy="0"/>
           </a:xfrm>
           <a:prstGeom prst="line">
@@ -9254,7 +8908,7 @@
         </p:nvCxnSpPr>
         <p:spPr>
           <a:xfrm>
-            <a:off x="12323410" y="14128423"/>
+            <a:off x="11660327" y="12648286"/>
             <a:ext cx="660617" cy="0"/>
           </a:xfrm>
           <a:prstGeom prst="line">
@@ -9275,6 +8929,1070 @@
           </a:fillRef>
           <a:effectRef idx="0">
             <a:schemeClr val="accent1"/>
+          </a:effectRef>
+          <a:fontRef idx="minor">
+            <a:schemeClr val="tx1"/>
+          </a:fontRef>
+        </p:style>
+      </p:cxnSp>
+      <p:cxnSp>
+        <p:nvCxnSpPr>
+          <p:cNvPr id="27" name="Conexão reta unidirecional 26"/>
+          <p:cNvCxnSpPr>
+            <a:stCxn id="84" idx="3"/>
+            <a:endCxn id="98" idx="1"/>
+          </p:cNvCxnSpPr>
+          <p:nvPr/>
+        </p:nvCxnSpPr>
+        <p:spPr>
+          <a:xfrm flipV="1">
+            <a:off x="11340149" y="7299288"/>
+            <a:ext cx="953245" cy="9183"/>
+          </a:xfrm>
+          <a:prstGeom prst="straightConnector1">
+            <a:avLst/>
+          </a:prstGeom>
+          <a:ln w="19050">
+            <a:tailEnd type="triangle"/>
+          </a:ln>
+        </p:spPr>
+        <p:style>
+          <a:lnRef idx="1">
+            <a:schemeClr val="dk1"/>
+          </a:lnRef>
+          <a:fillRef idx="0">
+            <a:schemeClr val="dk1"/>
+          </a:fillRef>
+          <a:effectRef idx="0">
+            <a:schemeClr val="dk1"/>
+          </a:effectRef>
+          <a:fontRef idx="minor">
+            <a:schemeClr val="tx1"/>
+          </a:fontRef>
+        </p:style>
+      </p:cxnSp>
+      <p:cxnSp>
+        <p:nvCxnSpPr>
+          <p:cNvPr id="216" name="Conexão reta unidirecional 215"/>
+          <p:cNvCxnSpPr>
+            <a:stCxn id="468" idx="1"/>
+            <a:endCxn id="98" idx="3"/>
+          </p:cNvCxnSpPr>
+          <p:nvPr/>
+        </p:nvCxnSpPr>
+        <p:spPr>
+          <a:xfrm flipH="1" flipV="1">
+            <a:off x="13416082" y="7299288"/>
+            <a:ext cx="2249987" cy="13452"/>
+          </a:xfrm>
+          <a:prstGeom prst="straightConnector1">
+            <a:avLst/>
+          </a:prstGeom>
+          <a:ln w="19050">
+            <a:tailEnd type="triangle"/>
+          </a:ln>
+        </p:spPr>
+        <p:style>
+          <a:lnRef idx="1">
+            <a:schemeClr val="dk1"/>
+          </a:lnRef>
+          <a:fillRef idx="0">
+            <a:schemeClr val="dk1"/>
+          </a:fillRef>
+          <a:effectRef idx="0">
+            <a:schemeClr val="dk1"/>
+          </a:effectRef>
+          <a:fontRef idx="minor">
+            <a:schemeClr val="tx1"/>
+          </a:fontRef>
+        </p:style>
+      </p:cxnSp>
+      <p:cxnSp>
+        <p:nvCxnSpPr>
+          <p:cNvPr id="40" name="Conexão reta 39"/>
+          <p:cNvCxnSpPr>
+            <a:stCxn id="468" idx="3"/>
+            <a:endCxn id="125" idx="1"/>
+          </p:cNvCxnSpPr>
+          <p:nvPr/>
+        </p:nvCxnSpPr>
+        <p:spPr>
+          <a:xfrm>
+            <a:off x="16998732" y="7312740"/>
+            <a:ext cx="4275070" cy="14285"/>
+          </a:xfrm>
+          <a:prstGeom prst="line">
+            <a:avLst/>
+          </a:prstGeom>
+          <a:ln w="19050"/>
+        </p:spPr>
+        <p:style>
+          <a:lnRef idx="1">
+            <a:schemeClr val="dk1"/>
+          </a:lnRef>
+          <a:fillRef idx="0">
+            <a:schemeClr val="dk1"/>
+          </a:fillRef>
+          <a:effectRef idx="0">
+            <a:schemeClr val="dk1"/>
+          </a:effectRef>
+          <a:fontRef idx="minor">
+            <a:schemeClr val="tx1"/>
+          </a:fontRef>
+        </p:style>
+      </p:cxnSp>
+      <p:cxnSp>
+        <p:nvCxnSpPr>
+          <p:cNvPr id="227" name="Straight Connector 230"/>
+          <p:cNvCxnSpPr>
+            <a:stCxn id="468" idx="0"/>
+            <a:endCxn id="219" idx="2"/>
+          </p:cNvCxnSpPr>
+          <p:nvPr/>
+        </p:nvCxnSpPr>
+        <p:spPr>
+          <a:xfrm flipV="1">
+            <a:off x="16332401" y="3455889"/>
+            <a:ext cx="23727" cy="3237726"/>
+          </a:xfrm>
+          <a:prstGeom prst="line">
+            <a:avLst/>
+          </a:prstGeom>
+          <a:ln w="19050">
+            <a:solidFill>
+              <a:schemeClr val="tx1"/>
+            </a:solidFill>
+          </a:ln>
+        </p:spPr>
+        <p:style>
+          <a:lnRef idx="1">
+            <a:schemeClr val="accent1"/>
+          </a:lnRef>
+          <a:fillRef idx="0">
+            <a:schemeClr val="accent1"/>
+          </a:fillRef>
+          <a:effectRef idx="0">
+            <a:schemeClr val="accent1"/>
+          </a:effectRef>
+          <a:fontRef idx="minor">
+            <a:schemeClr val="tx1"/>
+          </a:fontRef>
+        </p:style>
+      </p:cxnSp>
+      <p:cxnSp>
+        <p:nvCxnSpPr>
+          <p:cNvPr id="48" name="Conexão reta 47"/>
+          <p:cNvCxnSpPr>
+            <a:stCxn id="104" idx="3"/>
+            <a:endCxn id="141" idx="1"/>
+          </p:cNvCxnSpPr>
+          <p:nvPr/>
+        </p:nvCxnSpPr>
+        <p:spPr>
+          <a:xfrm flipV="1">
+            <a:off x="19316996" y="11600481"/>
+            <a:ext cx="1885296" cy="3262"/>
+          </a:xfrm>
+          <a:prstGeom prst="line">
+            <a:avLst/>
+          </a:prstGeom>
+          <a:ln w="19050"/>
+        </p:spPr>
+        <p:style>
+          <a:lnRef idx="1">
+            <a:schemeClr val="dk1"/>
+          </a:lnRef>
+          <a:fillRef idx="0">
+            <a:schemeClr val="dk1"/>
+          </a:fillRef>
+          <a:effectRef idx="0">
+            <a:schemeClr val="dk1"/>
+          </a:effectRef>
+          <a:fontRef idx="minor">
+            <a:schemeClr val="tx1"/>
+          </a:fontRef>
+        </p:style>
+      </p:cxnSp>
+      <p:cxnSp>
+        <p:nvCxnSpPr>
+          <p:cNvPr id="50" name="Conexão reta 49"/>
+          <p:cNvCxnSpPr>
+            <a:stCxn id="125" idx="2"/>
+            <a:endCxn id="128" idx="0"/>
+          </p:cNvCxnSpPr>
+          <p:nvPr/>
+        </p:nvCxnSpPr>
+        <p:spPr>
+          <a:xfrm flipH="1">
+            <a:off x="21945414" y="7584882"/>
+            <a:ext cx="8016" cy="949003"/>
+          </a:xfrm>
+          <a:prstGeom prst="line">
+            <a:avLst/>
+          </a:prstGeom>
+          <a:ln w="19050"/>
+        </p:spPr>
+        <p:style>
+          <a:lnRef idx="1">
+            <a:schemeClr val="dk1"/>
+          </a:lnRef>
+          <a:fillRef idx="0">
+            <a:schemeClr val="dk1"/>
+          </a:fillRef>
+          <a:effectRef idx="0">
+            <a:schemeClr val="dk1"/>
+          </a:effectRef>
+          <a:fontRef idx="minor">
+            <a:schemeClr val="tx1"/>
+          </a:fontRef>
+        </p:style>
+      </p:cxnSp>
+      <p:cxnSp>
+        <p:nvCxnSpPr>
+          <p:cNvPr id="58" name="Conexão em ângulos retos 57"/>
+          <p:cNvCxnSpPr>
+            <a:stCxn id="125" idx="3"/>
+            <a:endCxn id="128" idx="3"/>
+          </p:cNvCxnSpPr>
+          <p:nvPr/>
+        </p:nvCxnSpPr>
+        <p:spPr>
+          <a:xfrm>
+            <a:off x="22633058" y="7327025"/>
+            <a:ext cx="55477" cy="1895010"/>
+          </a:xfrm>
+          <a:prstGeom prst="bentConnector3">
+            <a:avLst>
+              <a:gd name="adj1" fmla="val 865259"/>
+            </a:avLst>
+          </a:prstGeom>
+          <a:ln w="19050"/>
+        </p:spPr>
+        <p:style>
+          <a:lnRef idx="1">
+            <a:schemeClr val="dk1"/>
+          </a:lnRef>
+          <a:fillRef idx="0">
+            <a:schemeClr val="dk1"/>
+          </a:fillRef>
+          <a:effectRef idx="0">
+            <a:schemeClr val="dk1"/>
+          </a:effectRef>
+          <a:fontRef idx="minor">
+            <a:schemeClr val="tx1"/>
+          </a:fontRef>
+        </p:style>
+      </p:cxnSp>
+      <p:cxnSp>
+        <p:nvCxnSpPr>
+          <p:cNvPr id="71" name="Conexão em ângulos retos 70"/>
+          <p:cNvCxnSpPr>
+            <a:stCxn id="125" idx="3"/>
+            <a:endCxn id="141" idx="3"/>
+          </p:cNvCxnSpPr>
+          <p:nvPr/>
+        </p:nvCxnSpPr>
+        <p:spPr>
+          <a:xfrm>
+            <a:off x="22633058" y="7327025"/>
+            <a:ext cx="55476" cy="4273456"/>
+          </a:xfrm>
+          <a:prstGeom prst="bentConnector3">
+            <a:avLst>
+              <a:gd name="adj1" fmla="val 2160350"/>
+            </a:avLst>
+          </a:prstGeom>
+          <a:ln w="19050"/>
+        </p:spPr>
+        <p:style>
+          <a:lnRef idx="1">
+            <a:schemeClr val="dk1"/>
+          </a:lnRef>
+          <a:fillRef idx="0">
+            <a:schemeClr val="dk1"/>
+          </a:fillRef>
+          <a:effectRef idx="0">
+            <a:schemeClr val="dk1"/>
+          </a:effectRef>
+          <a:fontRef idx="minor">
+            <a:schemeClr val="tx1"/>
+          </a:fontRef>
+        </p:style>
+      </p:cxnSp>
+      <p:grpSp>
+        <p:nvGrpSpPr>
+          <p:cNvPr id="232" name="Group 272"/>
+          <p:cNvGrpSpPr/>
+          <p:nvPr/>
+        </p:nvGrpSpPr>
+        <p:grpSpPr>
+          <a:xfrm>
+            <a:off x="9588244" y="13502908"/>
+            <a:ext cx="1785224" cy="518230"/>
+            <a:chOff x="5367366" y="876525"/>
+            <a:chExt cx="1682712" cy="578940"/>
+          </a:xfrm>
+        </p:grpSpPr>
+        <p:sp>
+          <p:nvSpPr>
+            <p:cNvPr id="233" name="Oval 232"/>
+            <p:cNvSpPr/>
+            <p:nvPr/>
+          </p:nvSpPr>
+          <p:spPr>
+            <a:xfrm>
+              <a:off x="5367366" y="876525"/>
+              <a:ext cx="1682712" cy="578940"/>
+            </a:xfrm>
+            <a:prstGeom prst="ellipse">
+              <a:avLst/>
+            </a:prstGeom>
+            <a:noFill/>
+            <a:ln w="20320">
+              <a:solidFill>
+                <a:schemeClr val="tx1"/>
+              </a:solidFill>
+            </a:ln>
+          </p:spPr>
+          <p:style>
+            <a:lnRef idx="2">
+              <a:schemeClr val="accent1">
+                <a:shade val="50000"/>
+              </a:schemeClr>
+            </a:lnRef>
+            <a:fillRef idx="1">
+              <a:schemeClr val="accent1"/>
+            </a:fillRef>
+            <a:effectRef idx="0">
+              <a:schemeClr val="accent1"/>
+            </a:effectRef>
+            <a:fontRef idx="minor">
+              <a:schemeClr val="lt1"/>
+            </a:fontRef>
+          </p:style>
+          <p:txBody>
+            <a:bodyPr rot="0" spcFirstLastPara="0" vertOverflow="overflow" horzOverflow="overflow" vert="horz" wrap="square" lIns="91441" tIns="45721" rIns="91441" bIns="45721" numCol="1" spcCol="0" rtlCol="0" fromWordArt="0" anchor="ctr" anchorCtr="0" forceAA="0" compatLnSpc="1">
+              <a:prstTxWarp prst="textNoShape">
+                <a:avLst/>
+              </a:prstTxWarp>
+              <a:noAutofit/>
+            </a:bodyPr>
+            <a:lstStyle/>
+            <a:p>
+              <a:pPr algn="ctr"/>
+              <a:endParaRPr lang="en-US" sz="2116" dirty="0"/>
+            </a:p>
+          </p:txBody>
+        </p:sp>
+        <p:sp>
+          <p:nvSpPr>
+            <p:cNvPr id="234" name="TextBox 274"/>
+            <p:cNvSpPr txBox="1"/>
+            <p:nvPr/>
+          </p:nvSpPr>
+          <p:spPr>
+            <a:xfrm>
+              <a:off x="5604226" y="889254"/>
+              <a:ext cx="1403663" cy="498087"/>
+            </a:xfrm>
+            <a:prstGeom prst="rect">
+              <a:avLst/>
+            </a:prstGeom>
+            <a:noFill/>
+          </p:spPr>
+          <p:txBody>
+            <a:bodyPr wrap="square" rtlCol="0">
+              <a:spAutoFit/>
+            </a:bodyPr>
+            <a:lstStyle/>
+            <a:p>
+              <a:r>
+                <a:rPr lang="es-ES" sz="2116" dirty="0" smtClean="0"/>
+                <a:t>date_time</a:t>
+              </a:r>
+              <a:endParaRPr lang="en-US" sz="2116" dirty="0"/>
+            </a:p>
+          </p:txBody>
+        </p:sp>
+      </p:grpSp>
+      <p:grpSp>
+        <p:nvGrpSpPr>
+          <p:cNvPr id="235" name="Group 89"/>
+          <p:cNvGrpSpPr/>
+          <p:nvPr/>
+        </p:nvGrpSpPr>
+        <p:grpSpPr>
+          <a:xfrm>
+            <a:off x="8813207" y="14430876"/>
+            <a:ext cx="1970652" cy="499796"/>
+            <a:chOff x="5367366" y="876525"/>
+            <a:chExt cx="1682712" cy="578940"/>
+          </a:xfrm>
+        </p:grpSpPr>
+        <p:sp>
+          <p:nvSpPr>
+            <p:cNvPr id="236" name="Oval 235"/>
+            <p:cNvSpPr/>
+            <p:nvPr/>
+          </p:nvSpPr>
+          <p:spPr>
+            <a:xfrm>
+              <a:off x="5367366" y="876525"/>
+              <a:ext cx="1682712" cy="578940"/>
+            </a:xfrm>
+            <a:prstGeom prst="ellipse">
+              <a:avLst/>
+            </a:prstGeom>
+            <a:noFill/>
+            <a:ln w="20320">
+              <a:solidFill>
+                <a:schemeClr val="tx1"/>
+              </a:solidFill>
+            </a:ln>
+          </p:spPr>
+          <p:style>
+            <a:lnRef idx="2">
+              <a:schemeClr val="accent1">
+                <a:shade val="50000"/>
+              </a:schemeClr>
+            </a:lnRef>
+            <a:fillRef idx="1">
+              <a:schemeClr val="accent1"/>
+            </a:fillRef>
+            <a:effectRef idx="0">
+              <a:schemeClr val="accent1"/>
+            </a:effectRef>
+            <a:fontRef idx="minor">
+              <a:schemeClr val="lt1"/>
+            </a:fontRef>
+          </p:style>
+          <p:txBody>
+            <a:bodyPr rot="0" spcFirstLastPara="0" vertOverflow="overflow" horzOverflow="overflow" vert="horz" wrap="square" lIns="91441" tIns="45721" rIns="91441" bIns="45721" numCol="1" spcCol="0" rtlCol="0" fromWordArt="0" anchor="ctr" anchorCtr="0" forceAA="0" compatLnSpc="1">
+              <a:prstTxWarp prst="textNoShape">
+                <a:avLst/>
+              </a:prstTxWarp>
+              <a:noAutofit/>
+            </a:bodyPr>
+            <a:lstStyle/>
+            <a:p>
+              <a:pPr algn="ctr"/>
+              <a:endParaRPr lang="en-US" sz="2116" dirty="0"/>
+            </a:p>
+          </p:txBody>
+        </p:sp>
+        <p:sp>
+          <p:nvSpPr>
+            <p:cNvPr id="237" name="TextBox 92"/>
+            <p:cNvSpPr txBox="1"/>
+            <p:nvPr/>
+          </p:nvSpPr>
+          <p:spPr>
+            <a:xfrm>
+              <a:off x="5639419" y="885398"/>
+              <a:ext cx="1403662" cy="498089"/>
+            </a:xfrm>
+            <a:prstGeom prst="rect">
+              <a:avLst/>
+            </a:prstGeom>
+            <a:noFill/>
+          </p:spPr>
+          <p:txBody>
+            <a:bodyPr wrap="square" rtlCol="0">
+              <a:spAutoFit/>
+            </a:bodyPr>
+            <a:lstStyle/>
+            <a:p>
+              <a:r>
+                <a:rPr lang="es-ES" sz="2116" dirty="0" smtClean="0"/>
+                <a:t>week_day</a:t>
+              </a:r>
+              <a:endParaRPr lang="en-US" sz="2116" dirty="0"/>
+            </a:p>
+          </p:txBody>
+        </p:sp>
+      </p:grpSp>
+      <p:grpSp>
+        <p:nvGrpSpPr>
+          <p:cNvPr id="238" name="Group 269"/>
+          <p:cNvGrpSpPr/>
+          <p:nvPr/>
+        </p:nvGrpSpPr>
+        <p:grpSpPr>
+          <a:xfrm>
+            <a:off x="7050568" y="14722742"/>
+            <a:ext cx="1779213" cy="592766"/>
+            <a:chOff x="5367366" y="876525"/>
+            <a:chExt cx="1682712" cy="578940"/>
+          </a:xfrm>
+        </p:grpSpPr>
+        <p:sp>
+          <p:nvSpPr>
+            <p:cNvPr id="239" name="Oval 238"/>
+            <p:cNvSpPr/>
+            <p:nvPr/>
+          </p:nvSpPr>
+          <p:spPr>
+            <a:xfrm>
+              <a:off x="5367366" y="876525"/>
+              <a:ext cx="1682712" cy="578940"/>
+            </a:xfrm>
+            <a:prstGeom prst="ellipse">
+              <a:avLst/>
+            </a:prstGeom>
+            <a:noFill/>
+            <a:ln w="20320">
+              <a:solidFill>
+                <a:schemeClr val="tx1"/>
+              </a:solidFill>
+            </a:ln>
+          </p:spPr>
+          <p:style>
+            <a:lnRef idx="2">
+              <a:schemeClr val="accent1">
+                <a:shade val="50000"/>
+              </a:schemeClr>
+            </a:lnRef>
+            <a:fillRef idx="1">
+              <a:schemeClr val="accent1"/>
+            </a:fillRef>
+            <a:effectRef idx="0">
+              <a:schemeClr val="accent1"/>
+            </a:effectRef>
+            <a:fontRef idx="minor">
+              <a:schemeClr val="lt1"/>
+            </a:fontRef>
+          </p:style>
+          <p:txBody>
+            <a:bodyPr rot="0" spcFirstLastPara="0" vertOverflow="overflow" horzOverflow="overflow" vert="horz" wrap="square" lIns="91441" tIns="45721" rIns="91441" bIns="45721" numCol="1" spcCol="0" rtlCol="0" fromWordArt="0" anchor="ctr" anchorCtr="0" forceAA="0" compatLnSpc="1">
+              <a:prstTxWarp prst="textNoShape">
+                <a:avLst/>
+              </a:prstTxWarp>
+              <a:noAutofit/>
+            </a:bodyPr>
+            <a:lstStyle/>
+            <a:p>
+              <a:pPr algn="ctr"/>
+              <a:endParaRPr lang="en-US" sz="2116" dirty="0"/>
+            </a:p>
+          </p:txBody>
+        </p:sp>
+        <p:sp>
+          <p:nvSpPr>
+            <p:cNvPr id="240" name="TextBox 271"/>
+            <p:cNvSpPr txBox="1"/>
+            <p:nvPr/>
+          </p:nvSpPr>
+          <p:spPr>
+            <a:xfrm>
+              <a:off x="5549191" y="888013"/>
+              <a:ext cx="1403662" cy="498088"/>
+            </a:xfrm>
+            <a:prstGeom prst="rect">
+              <a:avLst/>
+            </a:prstGeom>
+            <a:noFill/>
+          </p:spPr>
+          <p:txBody>
+            <a:bodyPr wrap="square" rtlCol="0">
+              <a:spAutoFit/>
+            </a:bodyPr>
+            <a:lstStyle/>
+            <a:p>
+              <a:r>
+                <a:rPr lang="es-ES" sz="2116" dirty="0" smtClean="0"/>
+                <a:t>time_zone</a:t>
+              </a:r>
+              <a:endParaRPr lang="en-US" sz="2116" dirty="0"/>
+            </a:p>
+          </p:txBody>
+        </p:sp>
+      </p:grpSp>
+      <p:grpSp>
+        <p:nvGrpSpPr>
+          <p:cNvPr id="246" name="Group 272"/>
+          <p:cNvGrpSpPr/>
+          <p:nvPr/>
+        </p:nvGrpSpPr>
+        <p:grpSpPr>
+          <a:xfrm>
+            <a:off x="2589571" y="13611609"/>
+            <a:ext cx="1785224" cy="518230"/>
+            <a:chOff x="5367366" y="876525"/>
+            <a:chExt cx="1682712" cy="578940"/>
+          </a:xfrm>
+        </p:grpSpPr>
+        <p:sp>
+          <p:nvSpPr>
+            <p:cNvPr id="247" name="Oval 246"/>
+            <p:cNvSpPr/>
+            <p:nvPr/>
+          </p:nvSpPr>
+          <p:spPr>
+            <a:xfrm>
+              <a:off x="5367366" y="876525"/>
+              <a:ext cx="1682712" cy="578940"/>
+            </a:xfrm>
+            <a:prstGeom prst="ellipse">
+              <a:avLst/>
+            </a:prstGeom>
+            <a:noFill/>
+            <a:ln w="20320">
+              <a:solidFill>
+                <a:schemeClr val="tx1"/>
+              </a:solidFill>
+            </a:ln>
+          </p:spPr>
+          <p:style>
+            <a:lnRef idx="2">
+              <a:schemeClr val="accent1">
+                <a:shade val="50000"/>
+              </a:schemeClr>
+            </a:lnRef>
+            <a:fillRef idx="1">
+              <a:schemeClr val="accent1"/>
+            </a:fillRef>
+            <a:effectRef idx="0">
+              <a:schemeClr val="accent1"/>
+            </a:effectRef>
+            <a:fontRef idx="minor">
+              <a:schemeClr val="lt1"/>
+            </a:fontRef>
+          </p:style>
+          <p:txBody>
+            <a:bodyPr rot="0" spcFirstLastPara="0" vertOverflow="overflow" horzOverflow="overflow" vert="horz" wrap="square" lIns="91441" tIns="45721" rIns="91441" bIns="45721" numCol="1" spcCol="0" rtlCol="0" fromWordArt="0" anchor="ctr" anchorCtr="0" forceAA="0" compatLnSpc="1">
+              <a:prstTxWarp prst="textNoShape">
+                <a:avLst/>
+              </a:prstTxWarp>
+              <a:noAutofit/>
+            </a:bodyPr>
+            <a:lstStyle/>
+            <a:p>
+              <a:pPr algn="ctr"/>
+              <a:endParaRPr lang="en-US" sz="2116" dirty="0"/>
+            </a:p>
+          </p:txBody>
+        </p:sp>
+        <p:sp>
+          <p:nvSpPr>
+            <p:cNvPr id="248" name="TextBox 274"/>
+            <p:cNvSpPr txBox="1"/>
+            <p:nvPr/>
+          </p:nvSpPr>
+          <p:spPr>
+            <a:xfrm>
+              <a:off x="5604226" y="889254"/>
+              <a:ext cx="1403663" cy="498087"/>
+            </a:xfrm>
+            <a:prstGeom prst="rect">
+              <a:avLst/>
+            </a:prstGeom>
+            <a:noFill/>
+          </p:spPr>
+          <p:txBody>
+            <a:bodyPr wrap="square" rtlCol="0">
+              <a:spAutoFit/>
+            </a:bodyPr>
+            <a:lstStyle/>
+            <a:p>
+              <a:r>
+                <a:rPr lang="es-ES" sz="2116" dirty="0" smtClean="0"/>
+                <a:t>date_time</a:t>
+              </a:r>
+              <a:endParaRPr lang="en-US" sz="2116" dirty="0"/>
+            </a:p>
+          </p:txBody>
+        </p:sp>
+      </p:grpSp>
+      <p:grpSp>
+        <p:nvGrpSpPr>
+          <p:cNvPr id="249" name="Group 89"/>
+          <p:cNvGrpSpPr/>
+          <p:nvPr/>
+        </p:nvGrpSpPr>
+        <p:grpSpPr>
+          <a:xfrm>
+            <a:off x="4889812" y="14035186"/>
+            <a:ext cx="1970652" cy="499796"/>
+            <a:chOff x="5367366" y="876525"/>
+            <a:chExt cx="1682712" cy="578940"/>
+          </a:xfrm>
+        </p:grpSpPr>
+        <p:sp>
+          <p:nvSpPr>
+            <p:cNvPr id="250" name="Oval 249"/>
+            <p:cNvSpPr/>
+            <p:nvPr/>
+          </p:nvSpPr>
+          <p:spPr>
+            <a:xfrm>
+              <a:off x="5367366" y="876525"/>
+              <a:ext cx="1682712" cy="578940"/>
+            </a:xfrm>
+            <a:prstGeom prst="ellipse">
+              <a:avLst/>
+            </a:prstGeom>
+            <a:noFill/>
+            <a:ln w="20320">
+              <a:solidFill>
+                <a:schemeClr val="tx1"/>
+              </a:solidFill>
+            </a:ln>
+          </p:spPr>
+          <p:style>
+            <a:lnRef idx="2">
+              <a:schemeClr val="accent1">
+                <a:shade val="50000"/>
+              </a:schemeClr>
+            </a:lnRef>
+            <a:fillRef idx="1">
+              <a:schemeClr val="accent1"/>
+            </a:fillRef>
+            <a:effectRef idx="0">
+              <a:schemeClr val="accent1"/>
+            </a:effectRef>
+            <a:fontRef idx="minor">
+              <a:schemeClr val="lt1"/>
+            </a:fontRef>
+          </p:style>
+          <p:txBody>
+            <a:bodyPr rot="0" spcFirstLastPara="0" vertOverflow="overflow" horzOverflow="overflow" vert="horz" wrap="square" lIns="91441" tIns="45721" rIns="91441" bIns="45721" numCol="1" spcCol="0" rtlCol="0" fromWordArt="0" anchor="ctr" anchorCtr="0" forceAA="0" compatLnSpc="1">
+              <a:prstTxWarp prst="textNoShape">
+                <a:avLst/>
+              </a:prstTxWarp>
+              <a:noAutofit/>
+            </a:bodyPr>
+            <a:lstStyle/>
+            <a:p>
+              <a:pPr algn="ctr"/>
+              <a:endParaRPr lang="en-US" sz="2116" dirty="0"/>
+            </a:p>
+          </p:txBody>
+        </p:sp>
+        <p:sp>
+          <p:nvSpPr>
+            <p:cNvPr id="252" name="TextBox 92"/>
+            <p:cNvSpPr txBox="1"/>
+            <p:nvPr/>
+          </p:nvSpPr>
+          <p:spPr>
+            <a:xfrm>
+              <a:off x="5639419" y="885398"/>
+              <a:ext cx="1403662" cy="498089"/>
+            </a:xfrm>
+            <a:prstGeom prst="rect">
+              <a:avLst/>
+            </a:prstGeom>
+            <a:noFill/>
+          </p:spPr>
+          <p:txBody>
+            <a:bodyPr wrap="square" rtlCol="0">
+              <a:spAutoFit/>
+            </a:bodyPr>
+            <a:lstStyle/>
+            <a:p>
+              <a:r>
+                <a:rPr lang="es-ES" sz="2116" dirty="0" smtClean="0"/>
+                <a:t>week_day</a:t>
+              </a:r>
+              <a:endParaRPr lang="en-US" sz="2116" dirty="0"/>
+            </a:p>
+          </p:txBody>
+        </p:sp>
+      </p:grpSp>
+      <p:grpSp>
+        <p:nvGrpSpPr>
+          <p:cNvPr id="253" name="Group 269"/>
+          <p:cNvGrpSpPr/>
+          <p:nvPr/>
+        </p:nvGrpSpPr>
+        <p:grpSpPr>
+          <a:xfrm>
+            <a:off x="3235592" y="14638805"/>
+            <a:ext cx="1779213" cy="592766"/>
+            <a:chOff x="5367366" y="876525"/>
+            <a:chExt cx="1682712" cy="578940"/>
+          </a:xfrm>
+        </p:grpSpPr>
+        <p:sp>
+          <p:nvSpPr>
+            <p:cNvPr id="254" name="Oval 253"/>
+            <p:cNvSpPr/>
+            <p:nvPr/>
+          </p:nvSpPr>
+          <p:spPr>
+            <a:xfrm>
+              <a:off x="5367366" y="876525"/>
+              <a:ext cx="1682712" cy="578940"/>
+            </a:xfrm>
+            <a:prstGeom prst="ellipse">
+              <a:avLst/>
+            </a:prstGeom>
+            <a:noFill/>
+            <a:ln w="20320">
+              <a:solidFill>
+                <a:schemeClr val="tx1"/>
+              </a:solidFill>
+            </a:ln>
+          </p:spPr>
+          <p:style>
+            <a:lnRef idx="2">
+              <a:schemeClr val="accent1">
+                <a:shade val="50000"/>
+              </a:schemeClr>
+            </a:lnRef>
+            <a:fillRef idx="1">
+              <a:schemeClr val="accent1"/>
+            </a:fillRef>
+            <a:effectRef idx="0">
+              <a:schemeClr val="accent1"/>
+            </a:effectRef>
+            <a:fontRef idx="minor">
+              <a:schemeClr val="lt1"/>
+            </a:fontRef>
+          </p:style>
+          <p:txBody>
+            <a:bodyPr rot="0" spcFirstLastPara="0" vertOverflow="overflow" horzOverflow="overflow" vert="horz" wrap="square" lIns="91441" tIns="45721" rIns="91441" bIns="45721" numCol="1" spcCol="0" rtlCol="0" fromWordArt="0" anchor="ctr" anchorCtr="0" forceAA="0" compatLnSpc="1">
+              <a:prstTxWarp prst="textNoShape">
+                <a:avLst/>
+              </a:prstTxWarp>
+              <a:noAutofit/>
+            </a:bodyPr>
+            <a:lstStyle/>
+            <a:p>
+              <a:pPr algn="ctr"/>
+              <a:endParaRPr lang="en-US" sz="2116" dirty="0"/>
+            </a:p>
+          </p:txBody>
+        </p:sp>
+        <p:sp>
+          <p:nvSpPr>
+            <p:cNvPr id="258" name="TextBox 271"/>
+            <p:cNvSpPr txBox="1"/>
+            <p:nvPr/>
+          </p:nvSpPr>
+          <p:spPr>
+            <a:xfrm>
+              <a:off x="5549191" y="888013"/>
+              <a:ext cx="1403662" cy="498088"/>
+            </a:xfrm>
+            <a:prstGeom prst="rect">
+              <a:avLst/>
+            </a:prstGeom>
+            <a:noFill/>
+          </p:spPr>
+          <p:txBody>
+            <a:bodyPr wrap="square" rtlCol="0">
+              <a:spAutoFit/>
+            </a:bodyPr>
+            <a:lstStyle/>
+            <a:p>
+              <a:r>
+                <a:rPr lang="es-ES" sz="2116" dirty="0" smtClean="0"/>
+                <a:t>time_zone</a:t>
+              </a:r>
+              <a:endParaRPr lang="en-US" sz="2116" dirty="0"/>
+            </a:p>
+          </p:txBody>
+        </p:sp>
+      </p:grpSp>
+      <p:cxnSp>
+        <p:nvCxnSpPr>
+          <p:cNvPr id="111" name="Conexão reta 110"/>
+          <p:cNvCxnSpPr>
+            <a:stCxn id="156" idx="3"/>
+            <a:endCxn id="247" idx="7"/>
+          </p:cNvCxnSpPr>
+          <p:nvPr/>
+        </p:nvCxnSpPr>
+        <p:spPr>
+          <a:xfrm flipH="1">
+            <a:off x="4113355" y="13280281"/>
+            <a:ext cx="463618" cy="407221"/>
+          </a:xfrm>
+          <a:prstGeom prst="line">
+            <a:avLst/>
+          </a:prstGeom>
+          <a:ln w="19050"/>
+        </p:spPr>
+        <p:style>
+          <a:lnRef idx="1">
+            <a:schemeClr val="dk1"/>
+          </a:lnRef>
+          <a:fillRef idx="0">
+            <a:schemeClr val="dk1"/>
+          </a:fillRef>
+          <a:effectRef idx="0">
+            <a:schemeClr val="dk1"/>
+          </a:effectRef>
+          <a:fontRef idx="minor">
+            <a:schemeClr val="tx1"/>
+          </a:fontRef>
+        </p:style>
+      </p:cxnSp>
+      <p:cxnSp>
+        <p:nvCxnSpPr>
+          <p:cNvPr id="116" name="Conexão reta 115"/>
+          <p:cNvCxnSpPr>
+            <a:stCxn id="254" idx="0"/>
+            <a:endCxn id="156" idx="4"/>
+          </p:cNvCxnSpPr>
+          <p:nvPr/>
+        </p:nvCxnSpPr>
+        <p:spPr>
+          <a:xfrm flipV="1">
+            <a:off x="4125199" y="13351421"/>
+            <a:ext cx="757111" cy="1287384"/>
+          </a:xfrm>
+          <a:prstGeom prst="line">
+            <a:avLst/>
+          </a:prstGeom>
+          <a:ln w="19050"/>
+        </p:spPr>
+        <p:style>
+          <a:lnRef idx="1">
+            <a:schemeClr val="dk1"/>
+          </a:lnRef>
+          <a:fillRef idx="0">
+            <a:schemeClr val="dk1"/>
+          </a:fillRef>
+          <a:effectRef idx="0">
+            <a:schemeClr val="dk1"/>
+          </a:effectRef>
+          <a:fontRef idx="minor">
+            <a:schemeClr val="tx1"/>
+          </a:fontRef>
+        </p:style>
+      </p:cxnSp>
+      <p:cxnSp>
+        <p:nvCxnSpPr>
+          <p:cNvPr id="119" name="Conexão reta 118"/>
+          <p:cNvCxnSpPr>
+            <a:stCxn id="156" idx="5"/>
+            <a:endCxn id="250" idx="0"/>
+          </p:cNvCxnSpPr>
+          <p:nvPr/>
+        </p:nvCxnSpPr>
+        <p:spPr>
+          <a:xfrm>
+            <a:off x="5187646" y="13280281"/>
+            <a:ext cx="687492" cy="754905"/>
+          </a:xfrm>
+          <a:prstGeom prst="line">
+            <a:avLst/>
+          </a:prstGeom>
+          <a:ln w="19050"/>
+        </p:spPr>
+        <p:style>
+          <a:lnRef idx="1">
+            <a:schemeClr val="dk1"/>
+          </a:lnRef>
+          <a:fillRef idx="0">
+            <a:schemeClr val="dk1"/>
+          </a:fillRef>
+          <a:effectRef idx="0">
+            <a:schemeClr val="dk1"/>
+          </a:effectRef>
+          <a:fontRef idx="minor">
+            <a:schemeClr val="tx1"/>
+          </a:fontRef>
+        </p:style>
+      </p:cxnSp>
+      <p:cxnSp>
+        <p:nvCxnSpPr>
+          <p:cNvPr id="121" name="Conexão reta 120"/>
+          <p:cNvCxnSpPr>
+            <a:stCxn id="145" idx="4"/>
+            <a:endCxn id="239" idx="0"/>
+          </p:cNvCxnSpPr>
+          <p:nvPr/>
+        </p:nvCxnSpPr>
+        <p:spPr>
+          <a:xfrm flipH="1">
+            <a:off x="7940175" y="13739767"/>
+            <a:ext cx="602741" cy="982975"/>
+          </a:xfrm>
+          <a:prstGeom prst="line">
+            <a:avLst/>
+          </a:prstGeom>
+          <a:ln w="19050"/>
+        </p:spPr>
+        <p:style>
+          <a:lnRef idx="1">
+            <a:schemeClr val="dk1"/>
+          </a:lnRef>
+          <a:fillRef idx="0">
+            <a:schemeClr val="dk1"/>
+          </a:fillRef>
+          <a:effectRef idx="0">
+            <a:schemeClr val="dk1"/>
+          </a:effectRef>
+          <a:fontRef idx="minor">
+            <a:schemeClr val="tx1"/>
+          </a:fontRef>
+        </p:style>
+      </p:cxnSp>
+      <p:cxnSp>
+        <p:nvCxnSpPr>
+          <p:cNvPr id="164" name="Conexão reta 163"/>
+          <p:cNvCxnSpPr>
+            <a:stCxn id="145" idx="5"/>
+            <a:endCxn id="236" idx="1"/>
+          </p:cNvCxnSpPr>
+          <p:nvPr/>
+        </p:nvCxnSpPr>
+        <p:spPr>
+          <a:xfrm>
+            <a:off x="8904081" y="13668627"/>
+            <a:ext cx="197721" cy="835442"/>
+          </a:xfrm>
+          <a:prstGeom prst="line">
+            <a:avLst/>
+          </a:prstGeom>
+          <a:ln w="19050"/>
+        </p:spPr>
+        <p:style>
+          <a:lnRef idx="1">
+            <a:schemeClr val="dk1"/>
+          </a:lnRef>
+          <a:fillRef idx="0">
+            <a:schemeClr val="dk1"/>
+          </a:fillRef>
+          <a:effectRef idx="0">
+            <a:schemeClr val="dk1"/>
+          </a:effectRef>
+          <a:fontRef idx="minor">
+            <a:schemeClr val="tx1"/>
+          </a:fontRef>
+        </p:style>
+      </p:cxnSp>
+      <p:cxnSp>
+        <p:nvCxnSpPr>
+          <p:cNvPr id="167" name="Conexão reta 166"/>
+          <p:cNvCxnSpPr>
+            <a:stCxn id="233" idx="2"/>
+            <a:endCxn id="145" idx="6"/>
+          </p:cNvCxnSpPr>
+          <p:nvPr/>
+        </p:nvCxnSpPr>
+        <p:spPr>
+          <a:xfrm flipH="1" flipV="1">
+            <a:off x="9053680" y="13496881"/>
+            <a:ext cx="534564" cy="265142"/>
+          </a:xfrm>
+          <a:prstGeom prst="line">
+            <a:avLst/>
+          </a:prstGeom>
+          <a:ln w="19050"/>
+        </p:spPr>
+        <p:style>
+          <a:lnRef idx="1">
+            <a:schemeClr val="dk1"/>
+          </a:lnRef>
+          <a:fillRef idx="0">
+            <a:schemeClr val="dk1"/>
+          </a:fillRef>
+          <a:effectRef idx="0">
+            <a:schemeClr val="dk1"/>
           </a:effectRef>
           <a:fontRef idx="minor">
             <a:schemeClr val="tx1"/>

</xml_diff>